<commit_message>
add luggage capacity graph
</commit_message>
<xml_diff>
--- a/tesla_model_s_handout_chf.pptx
+++ b/tesla_model_s_handout_chf.pptx
@@ -290,7 +290,7 @@
             <a:fld id="{63BB9708-3311-2149-A02D-BFA98F482279}" type="datetimeFigureOut">
               <a:rPr lang="de-DE" smtClean="0"/>
               <a:pPr/>
-              <a:t>30.07.2014</a:t>
+              <a:t>04.08.2014</a:t>
             </a:fld>
             <a:endParaRPr lang="de-DE"/>
           </a:p>
@@ -457,7 +457,7 @@
             <a:fld id="{63BB9708-3311-2149-A02D-BFA98F482279}" type="datetimeFigureOut">
               <a:rPr lang="de-DE" smtClean="0"/>
               <a:pPr/>
-              <a:t>30.07.2014</a:t>
+              <a:t>04.08.2014</a:t>
             </a:fld>
             <a:endParaRPr lang="de-DE"/>
           </a:p>
@@ -634,7 +634,7 @@
             <a:fld id="{63BB9708-3311-2149-A02D-BFA98F482279}" type="datetimeFigureOut">
               <a:rPr lang="de-DE" smtClean="0"/>
               <a:pPr/>
-              <a:t>30.07.2014</a:t>
+              <a:t>04.08.2014</a:t>
             </a:fld>
             <a:endParaRPr lang="de-DE"/>
           </a:p>
@@ -801,7 +801,7 @@
             <a:fld id="{63BB9708-3311-2149-A02D-BFA98F482279}" type="datetimeFigureOut">
               <a:rPr lang="de-DE" smtClean="0"/>
               <a:pPr/>
-              <a:t>30.07.2014</a:t>
+              <a:t>04.08.2014</a:t>
             </a:fld>
             <a:endParaRPr lang="de-DE"/>
           </a:p>
@@ -1044,7 +1044,7 @@
             <a:fld id="{63BB9708-3311-2149-A02D-BFA98F482279}" type="datetimeFigureOut">
               <a:rPr lang="de-DE" smtClean="0"/>
               <a:pPr/>
-              <a:t>30.07.2014</a:t>
+              <a:t>04.08.2014</a:t>
             </a:fld>
             <a:endParaRPr lang="de-DE"/>
           </a:p>
@@ -1329,7 +1329,7 @@
             <a:fld id="{63BB9708-3311-2149-A02D-BFA98F482279}" type="datetimeFigureOut">
               <a:rPr lang="de-DE" smtClean="0"/>
               <a:pPr/>
-              <a:t>30.07.2014</a:t>
+              <a:t>04.08.2014</a:t>
             </a:fld>
             <a:endParaRPr lang="de-DE"/>
           </a:p>
@@ -1748,7 +1748,7 @@
             <a:fld id="{63BB9708-3311-2149-A02D-BFA98F482279}" type="datetimeFigureOut">
               <a:rPr lang="de-DE" smtClean="0"/>
               <a:pPr/>
-              <a:t>30.07.2014</a:t>
+              <a:t>04.08.2014</a:t>
             </a:fld>
             <a:endParaRPr lang="de-DE"/>
           </a:p>
@@ -1863,7 +1863,7 @@
             <a:fld id="{63BB9708-3311-2149-A02D-BFA98F482279}" type="datetimeFigureOut">
               <a:rPr lang="de-DE" smtClean="0"/>
               <a:pPr/>
-              <a:t>30.07.2014</a:t>
+              <a:t>04.08.2014</a:t>
             </a:fld>
             <a:endParaRPr lang="de-DE"/>
           </a:p>
@@ -1955,7 +1955,7 @@
             <a:fld id="{63BB9708-3311-2149-A02D-BFA98F482279}" type="datetimeFigureOut">
               <a:rPr lang="de-DE" smtClean="0"/>
               <a:pPr/>
-              <a:t>30.07.2014</a:t>
+              <a:t>04.08.2014</a:t>
             </a:fld>
             <a:endParaRPr lang="de-DE"/>
           </a:p>
@@ -2229,7 +2229,7 @@
             <a:fld id="{63BB9708-3311-2149-A02D-BFA98F482279}" type="datetimeFigureOut">
               <a:rPr lang="de-DE" smtClean="0"/>
               <a:pPr/>
-              <a:t>30.07.2014</a:t>
+              <a:t>04.08.2014</a:t>
             </a:fld>
             <a:endParaRPr lang="de-DE"/>
           </a:p>
@@ -2479,7 +2479,7 @@
             <a:fld id="{63BB9708-3311-2149-A02D-BFA98F482279}" type="datetimeFigureOut">
               <a:rPr lang="de-DE" smtClean="0"/>
               <a:pPr/>
-              <a:t>30.07.2014</a:t>
+              <a:t>04.08.2014</a:t>
             </a:fld>
             <a:endParaRPr lang="de-DE"/>
           </a:p>
@@ -2689,7 +2689,7 @@
             <a:fld id="{63BB9708-3311-2149-A02D-BFA98F482279}" type="datetimeFigureOut">
               <a:rPr lang="de-DE" smtClean="0"/>
               <a:pPr/>
-              <a:t>30.07.2014</a:t>
+              <a:t>04.08.2014</a:t>
             </a:fld>
             <a:endParaRPr lang="de-DE"/>
           </a:p>
@@ -3503,15 +3503,7 @@
                   <a:srgbClr val="800000"/>
                 </a:solidFill>
               </a:rPr>
-              <a:t>Die Gesamtkosten bei einem Abschreibungszeitraum von 8 Jahren sind vergleichbar mit Benzinern aus der oberen </a:t>
-            </a:r>
-            <a:r>
-              <a:rPr lang="de-DE" sz="700" i="1" dirty="0" smtClean="0">
-                <a:solidFill>
-                  <a:srgbClr val="800000"/>
-                </a:solidFill>
-              </a:rPr>
-              <a:t>Mittelklasse</a:t>
+              <a:t>Die Gesamtkosten bei einem Abschreibungszeitraum von 8 Jahren sind vergleichbar mit Benzinern aus der oberen Mittelklasse</a:t>
             </a:r>
           </a:p>
           <a:p>
@@ -4192,8 +4184,8 @@
         </p:nvSpPr>
         <p:spPr>
           <a:xfrm>
-            <a:off x="4464390" y="48418"/>
-            <a:ext cx="2505558" cy="646331"/>
+            <a:off x="4464326" y="48418"/>
+            <a:ext cx="2505622" cy="830997"/>
           </a:xfrm>
           <a:prstGeom prst="rect">
             <a:avLst/>
@@ -4268,8 +4260,65 @@
                   </a:outerShdw>
                 </a:effectLst>
               </a:rPr>
-              <a:t>Version 0.3</a:t>
-            </a:r>
+              <a:t>Version </a:t>
+            </a:r>
+            <a:r>
+              <a:rPr lang="de-CH" sz="1200" b="1" dirty="0" smtClean="0">
+                <a:ln w="18415" cmpd="sng">
+                  <a:noFill/>
+                  <a:prstDash val="solid"/>
+                </a:ln>
+                <a:solidFill>
+                  <a:srgbClr val="FFFFFF"/>
+                </a:solidFill>
+                <a:effectLst>
+                  <a:outerShdw blurRad="38100" dist="38100" dir="2700000" algn="tl">
+                    <a:srgbClr val="000000">
+                      <a:alpha val="43137"/>
+                    </a:srgbClr>
+                  </a:outerShdw>
+                </a:effectLst>
+              </a:rPr>
+              <a:t>0.4</a:t>
+            </a:r>
+          </a:p>
+          <a:p>
+            <a:pPr algn="r"/>
+            <a:r>
+              <a:rPr lang="de-CH" sz="1200" b="1" dirty="0" smtClean="0">
+                <a:ln w="18415" cmpd="sng">
+                  <a:noFill/>
+                  <a:prstDash val="solid"/>
+                </a:ln>
+                <a:solidFill>
+                  <a:srgbClr val="FFFFFF"/>
+                </a:solidFill>
+                <a:effectLst>
+                  <a:outerShdw blurRad="38100" dist="38100" dir="2700000" algn="tl">
+                    <a:srgbClr val="000000">
+                      <a:alpha val="43137"/>
+                    </a:srgbClr>
+                  </a:outerShdw>
+                </a:effectLst>
+              </a:rPr>
+              <a:t>CHF Edition</a:t>
+            </a:r>
+            <a:endParaRPr lang="de-CH" sz="1200" b="1" dirty="0" smtClean="0">
+              <a:ln w="18415" cmpd="sng">
+                <a:noFill/>
+                <a:prstDash val="solid"/>
+              </a:ln>
+              <a:solidFill>
+                <a:srgbClr val="FFFFFF"/>
+              </a:solidFill>
+              <a:effectLst>
+                <a:outerShdw blurRad="38100" dist="38100" dir="2700000" algn="tl">
+                  <a:srgbClr val="000000">
+                    <a:alpha val="43137"/>
+                  </a:srgbClr>
+                </a:outerShdw>
+              </a:effectLst>
+            </a:endParaRPr>
           </a:p>
         </p:txBody>
       </p:sp>
@@ -4477,7 +4526,7 @@
         </p:nvSpPr>
         <p:spPr>
           <a:xfrm>
-            <a:off x="2971432" y="4930985"/>
+            <a:off x="2961907" y="4930985"/>
             <a:ext cx="1164101" cy="323165"/>
           </a:xfrm>
           <a:prstGeom prst="rect">
@@ -4810,679 +4859,60 @@
           <a:chExt cx="0" cy="0"/>
         </a:xfrm>
       </p:grpSpPr>
-      <p:grpSp>
-        <p:nvGrpSpPr>
-          <p:cNvPr id="23" name="Gruppieren 22"/>
-          <p:cNvGrpSpPr/>
+      <p:pic>
+        <p:nvPicPr>
+          <p:cNvPr id="1027" name="Picture 3"/>
+          <p:cNvPicPr>
+            <a:picLocks noChangeAspect="1" noChangeArrowheads="1"/>
+          </p:cNvPicPr>
           <p:nvPr/>
-        </p:nvGrpSpPr>
-        <p:grpSpPr>
-          <a:xfrm>
-            <a:off x="6425386" y="4506094"/>
-            <a:ext cx="3421763" cy="2214301"/>
-            <a:chOff x="7049081" y="5141116"/>
-            <a:chExt cx="2815649" cy="1552900"/>
-          </a:xfrm>
-        </p:grpSpPr>
-        <p:pic>
-          <p:nvPicPr>
-            <p:cNvPr id="8" name="Picture 6"/>
-            <p:cNvPicPr>
-              <a:picLocks noChangeAspect="1" noChangeArrowheads="1"/>
-            </p:cNvPicPr>
-            <p:nvPr/>
-          </p:nvPicPr>
-          <p:blipFill>
-            <a:blip r:embed="rId2" cstate="print">
-              <a:extLst>
-                <a:ext uri="{28A0092B-C50C-407E-A947-70E740481C1C}">
-                  <a14:useLocalDpi xmlns:a14="http://schemas.microsoft.com/office/drawing/2010/main"/>
-                </a:ext>
-              </a:extLst>
-            </a:blip>
-            <a:srcRect/>
-            <a:stretch>
-              <a:fillRect/>
-            </a:stretch>
-          </p:blipFill>
-          <p:spPr bwMode="auto">
-            <a:xfrm>
-              <a:off x="8197970" y="5736991"/>
-              <a:ext cx="1599681" cy="957025"/>
-            </a:xfrm>
-            <a:prstGeom prst="rect">
-              <a:avLst/>
-            </a:prstGeom>
-            <a:noFill/>
-            <a:ln>
-              <a:noFill/>
-            </a:ln>
+        </p:nvPicPr>
+        <p:blipFill>
+          <a:blip r:embed="rId2">
             <a:extLst>
-              <a:ext uri="{909E8E84-426E-40DD-AFC4-6F175D3DCCD1}">
-                <a14:hiddenFill xmlns:a14="http://schemas.microsoft.com/office/drawing/2010/main">
-                  <a:solidFill>
-                    <a:schemeClr val="accent1"/>
-                  </a:solidFill>
-                </a14:hiddenFill>
-              </a:ext>
-              <a:ext uri="{91240B29-F687-4F45-9708-019B960494DF}">
-                <a14:hiddenLine xmlns:a14="http://schemas.microsoft.com/office/drawing/2010/main" w="9525">
-                  <a:solidFill>
-                    <a:schemeClr val="tx1"/>
-                  </a:solidFill>
-                  <a:miter lim="800000"/>
-                  <a:headEnd/>
-                  <a:tailEnd/>
-                </a14:hiddenLine>
+              <a:ext uri="{28A0092B-C50C-407E-A947-70E740481C1C}">
+                <a14:useLocalDpi xmlns:a14="http://schemas.microsoft.com/office/drawing/2010/main" val="0"/>
               </a:ext>
             </a:extLst>
-          </p:spPr>
-        </p:pic>
-        <p:pic>
-          <p:nvPicPr>
-            <p:cNvPr id="1026" name="Picture 2"/>
-            <p:cNvPicPr>
-              <a:picLocks noChangeAspect="1" noChangeArrowheads="1"/>
-            </p:cNvPicPr>
-            <p:nvPr/>
-          </p:nvPicPr>
-          <p:blipFill rotWithShape="1">
-            <a:blip r:embed="rId3" cstate="print">
-              <a:extLst>
-                <a:ext uri="{BEBA8EAE-BF5A-486C-A8C5-ECC9F3942E4B}">
-                  <a14:imgProps xmlns:a14="http://schemas.microsoft.com/office/drawing/2010/main">
-                    <a14:imgLayer r:embed="rId4">
-                      <a14:imgEffect>
-                        <a14:saturation sat="33000"/>
-                      </a14:imgEffect>
-                    </a14:imgLayer>
-                  </a14:imgProps>
-                </a:ext>
-                <a:ext uri="{28A0092B-C50C-407E-A947-70E740481C1C}">
-                  <a14:useLocalDpi xmlns:a14="http://schemas.microsoft.com/office/drawing/2010/main"/>
-                </a:ext>
-              </a:extLst>
-            </a:blip>
-            <a:srcRect/>
-            <a:stretch/>
-          </p:blipFill>
-          <p:spPr bwMode="auto">
-            <a:xfrm>
-              <a:off x="7254938" y="5199708"/>
-              <a:ext cx="985852" cy="1397644"/>
-            </a:xfrm>
-            <a:prstGeom prst="rect">
-              <a:avLst/>
-            </a:prstGeom>
+          </a:blip>
+          <a:srcRect/>
+          <a:stretch>
+            <a:fillRect/>
+          </a:stretch>
+        </p:blipFill>
+        <p:spPr bwMode="auto">
+          <a:xfrm>
+            <a:off x="6412775" y="4467591"/>
+            <a:ext cx="3495389" cy="2363313"/>
+          </a:xfrm>
+          <a:prstGeom prst="rect">
+            <a:avLst/>
+          </a:prstGeom>
+          <a:noFill/>
+          <a:ln>
             <a:noFill/>
-            <a:ln>
-              <a:noFill/>
-            </a:ln>
-            <a:extLst>
-              <a:ext uri="{909E8E84-426E-40DD-AFC4-6F175D3DCCD1}">
-                <a14:hiddenFill xmlns:a14="http://schemas.microsoft.com/office/drawing/2010/main">
-                  <a:solidFill>
-                    <a:schemeClr val="accent1"/>
-                  </a:solidFill>
-                </a14:hiddenFill>
-              </a:ext>
-              <a:ext uri="{91240B29-F687-4F45-9708-019B960494DF}">
-                <a14:hiddenLine xmlns:a14="http://schemas.microsoft.com/office/drawing/2010/main" w="9525">
-                  <a:solidFill>
-                    <a:schemeClr val="tx1"/>
-                  </a:solidFill>
-                  <a:miter lim="800000"/>
-                  <a:headEnd/>
-                  <a:tailEnd/>
-                </a14:hiddenLine>
-              </a:ext>
-            </a:extLst>
-          </p:spPr>
-        </p:pic>
-        <p:pic>
-          <p:nvPicPr>
-            <p:cNvPr id="5" name="Grafik 4"/>
-            <p:cNvPicPr>
-              <a:picLocks noChangeAspect="1"/>
-            </p:cNvPicPr>
-            <p:nvPr/>
-          </p:nvPicPr>
-          <p:blipFill>
-            <a:blip r:embed="rId5" cstate="print">
-              <a:extLst>
-                <a:ext uri="{28A0092B-C50C-407E-A947-70E740481C1C}">
-                  <a14:useLocalDpi xmlns:a14="http://schemas.microsoft.com/office/drawing/2010/main"/>
-                </a:ext>
-              </a:extLst>
-            </a:blip>
-            <a:stretch>
-              <a:fillRect/>
-            </a:stretch>
-          </p:blipFill>
-          <p:spPr>
-            <a:xfrm rot="5400000">
-              <a:off x="7836715" y="5407162"/>
-              <a:ext cx="380411" cy="309085"/>
-            </a:xfrm>
-            <a:prstGeom prst="rect">
-              <a:avLst/>
-            </a:prstGeom>
-          </p:spPr>
-        </p:pic>
-        <p:pic>
-          <p:nvPicPr>
-            <p:cNvPr id="7" name="Grafik 6"/>
-            <p:cNvPicPr>
-              <a:picLocks noChangeAspect="1"/>
-            </p:cNvPicPr>
-            <p:nvPr/>
-          </p:nvPicPr>
-          <p:blipFill>
-            <a:blip r:embed="rId6" cstate="print">
-              <a:extLst>
-                <a:ext uri="{BEBA8EAE-BF5A-486C-A8C5-ECC9F3942E4B}">
-                  <a14:imgProps xmlns:a14="http://schemas.microsoft.com/office/drawing/2010/main">
-                    <a14:imgLayer r:embed="rId7">
-                      <a14:imgEffect>
-                        <a14:backgroundRemoval t="0" b="98264" l="0" r="100000">
-                          <a14:foregroundMark x1="14364" y1="21528" x2="14364" y2="21528"/>
-                          <a14:foregroundMark x1="18364" y1="6944" x2="18364" y2="6944"/>
-                          <a14:foregroundMark x1="16909" y1="8333" x2="16909" y2="8333"/>
-                          <a14:foregroundMark x1="15091" y1="11111" x2="15091" y2="11111"/>
-                          <a14:foregroundMark x1="14909" y1="14931" x2="14909" y2="14931"/>
-                          <a14:foregroundMark x1="13091" y1="20486" x2="13091" y2="20486"/>
-                          <a14:foregroundMark x1="13091" y1="27083" x2="13091" y2="27083"/>
-                          <a14:foregroundMark x1="12364" y1="23611" x2="12364" y2="23611"/>
-                          <a14:foregroundMark x1="12000" y1="27778" x2="12000" y2="27778"/>
-                          <a14:foregroundMark x1="12000" y1="30208" x2="12000" y2="30208"/>
-                          <a14:foregroundMark x1="11636" y1="45486" x2="11636" y2="45486"/>
-                          <a14:foregroundMark x1="4727" y1="61458" x2="4727" y2="61458"/>
-                          <a14:foregroundMark x1="49818" y1="33333" x2="49818" y2="33333"/>
-                          <a14:foregroundMark x1="55636" y1="36806" x2="55636" y2="36806"/>
-                          <a14:foregroundMark x1="55636" y1="38889" x2="55636" y2="38889"/>
-                          <a14:foregroundMark x1="56545" y1="38194" x2="56545" y2="38194"/>
-                          <a14:foregroundMark x1="52364" y1="36111" x2="52364" y2="36111"/>
-                          <a14:foregroundMark x1="51455" y1="34722" x2="51455" y2="34722"/>
-                          <a14:foregroundMark x1="88000" y1="74306" x2="88000" y2="74306"/>
-                          <a14:foregroundMark x1="79273" y1="56250" x2="79273" y2="56250"/>
-                          <a14:foregroundMark x1="77091" y1="55903" x2="77091" y2="55903"/>
-                          <a14:foregroundMark x1="75818" y1="54167" x2="75818" y2="54167"/>
-                          <a14:foregroundMark x1="74000" y1="53819" x2="74000" y2="53819"/>
-                          <a14:foregroundMark x1="52182" y1="79167" x2="52182" y2="79167"/>
-                          <a14:foregroundMark x1="54727" y1="79167" x2="54727" y2="79167"/>
-                          <a14:foregroundMark x1="53636" y1="80903" x2="53636" y2="80903"/>
-                          <a14:foregroundMark x1="42182" y1="25694" x2="42182" y2="25694"/>
-                        </a14:backgroundRemoval>
-                      </a14:imgEffect>
-                      <a14:imgEffect>
-                        <a14:saturation sat="0"/>
-                      </a14:imgEffect>
-                    </a14:imgLayer>
-                  </a14:imgProps>
-                </a:ext>
-                <a:ext uri="{28A0092B-C50C-407E-A947-70E740481C1C}">
-                  <a14:useLocalDpi xmlns:a14="http://schemas.microsoft.com/office/drawing/2010/main"/>
-                </a:ext>
-              </a:extLst>
-            </a:blip>
-            <a:stretch>
-              <a:fillRect/>
-            </a:stretch>
-          </p:blipFill>
-          <p:spPr>
-            <a:xfrm>
-              <a:off x="7665836" y="6009713"/>
-              <a:ext cx="1129246" cy="545828"/>
-            </a:xfrm>
-            <a:prstGeom prst="rect">
-              <a:avLst/>
-            </a:prstGeom>
-          </p:spPr>
-        </p:pic>
-        <p:pic>
-          <p:nvPicPr>
-            <p:cNvPr id="1031" name="Picture 7"/>
-            <p:cNvPicPr>
-              <a:picLocks noChangeAspect="1" noChangeArrowheads="1"/>
-            </p:cNvPicPr>
-            <p:nvPr/>
-          </p:nvPicPr>
-          <p:blipFill rotWithShape="1">
-            <a:blip r:embed="rId8" cstate="print">
-              <a:extLst>
-                <a:ext uri="{28A0092B-C50C-407E-A947-70E740481C1C}">
-                  <a14:useLocalDpi xmlns:a14="http://schemas.microsoft.com/office/drawing/2010/main"/>
-                </a:ext>
-              </a:extLst>
-            </a:blip>
-            <a:srcRect/>
-            <a:stretch/>
-          </p:blipFill>
-          <p:spPr bwMode="auto">
-            <a:xfrm>
-              <a:off x="8269354" y="5421742"/>
-              <a:ext cx="1409632" cy="233943"/>
-            </a:xfrm>
-            <a:prstGeom prst="rect">
-              <a:avLst/>
-            </a:prstGeom>
-            <a:noFill/>
-            <a:ln>
-              <a:noFill/>
-            </a:ln>
-            <a:extLst>
-              <a:ext uri="{909E8E84-426E-40DD-AFC4-6F175D3DCCD1}">
-                <a14:hiddenFill xmlns:a14="http://schemas.microsoft.com/office/drawing/2010/main">
-                  <a:solidFill>
-                    <a:schemeClr val="accent1"/>
-                  </a:solidFill>
-                </a14:hiddenFill>
-              </a:ext>
-              <a:ext uri="{91240B29-F687-4F45-9708-019B960494DF}">
-                <a14:hiddenLine xmlns:a14="http://schemas.microsoft.com/office/drawing/2010/main" w="9525">
-                  <a:solidFill>
-                    <a:schemeClr val="tx1"/>
-                  </a:solidFill>
-                  <a:miter lim="800000"/>
-                  <a:headEnd/>
-                  <a:tailEnd/>
-                </a14:hiddenLine>
-              </a:ext>
-            </a:extLst>
-          </p:spPr>
-        </p:pic>
-        <p:sp>
-          <p:nvSpPr>
-            <p:cNvPr id="9" name="Pfeil nach rechts 8"/>
-            <p:cNvSpPr/>
-            <p:nvPr/>
-          </p:nvSpPr>
-          <p:spPr>
-            <a:xfrm>
-              <a:off x="7493990" y="5491082"/>
-              <a:ext cx="378388" cy="116972"/>
-            </a:xfrm>
-            <a:prstGeom prst="rightArrow">
-              <a:avLst/>
-            </a:prstGeom>
-            <a:solidFill>
-              <a:srgbClr val="B2B2B2">
-                <a:alpha val="70980"/>
-              </a:srgbClr>
-            </a:solidFill>
-            <a:ln>
-              <a:solidFill>
-                <a:srgbClr val="323654">
-                  <a:alpha val="63922"/>
-                </a:srgbClr>
-              </a:solidFill>
-            </a:ln>
-          </p:spPr>
-          <p:style>
-            <a:lnRef idx="1">
-              <a:schemeClr val="accent1"/>
-            </a:lnRef>
-            <a:fillRef idx="3">
-              <a:schemeClr val="accent1"/>
-            </a:fillRef>
-            <a:effectRef idx="2">
-              <a:schemeClr val="accent1"/>
-            </a:effectRef>
-            <a:fontRef idx="minor">
-              <a:schemeClr val="lt1"/>
-            </a:fontRef>
-          </p:style>
-          <p:txBody>
-            <a:bodyPr rtlCol="0" anchor="ctr"/>
-            <a:lstStyle/>
-            <a:p>
-              <a:pPr algn="ctr"/>
-              <a:endParaRPr lang="en-US"/>
-            </a:p>
-          </p:txBody>
-        </p:sp>
-        <p:sp>
-          <p:nvSpPr>
-            <p:cNvPr id="28" name="Pfeil nach rechts 27"/>
-            <p:cNvSpPr/>
-            <p:nvPr/>
-          </p:nvSpPr>
-          <p:spPr>
-            <a:xfrm>
-              <a:off x="7493990" y="6157016"/>
-              <a:ext cx="378388" cy="116972"/>
-            </a:xfrm>
-            <a:prstGeom prst="rightArrow">
-              <a:avLst/>
-            </a:prstGeom>
-            <a:solidFill>
-              <a:srgbClr val="B2B2B2">
-                <a:alpha val="70980"/>
-              </a:srgbClr>
-            </a:solidFill>
-            <a:ln>
-              <a:solidFill>
-                <a:srgbClr val="323654">
-                  <a:alpha val="63922"/>
-                </a:srgbClr>
-              </a:solidFill>
-            </a:ln>
-          </p:spPr>
-          <p:style>
-            <a:lnRef idx="1">
-              <a:schemeClr val="accent1"/>
-            </a:lnRef>
-            <a:fillRef idx="3">
-              <a:schemeClr val="accent1"/>
-            </a:fillRef>
-            <a:effectRef idx="2">
-              <a:schemeClr val="accent1"/>
-            </a:effectRef>
-            <a:fontRef idx="minor">
-              <a:schemeClr val="lt1"/>
-            </a:fontRef>
-          </p:style>
-          <p:txBody>
-            <a:bodyPr rtlCol="0" anchor="ctr"/>
-            <a:lstStyle/>
-            <a:p>
-              <a:pPr algn="ctr"/>
-              <a:endParaRPr lang="en-US"/>
-            </a:p>
-          </p:txBody>
-        </p:sp>
-        <p:sp>
-          <p:nvSpPr>
-            <p:cNvPr id="35" name="TextBox 10"/>
-            <p:cNvSpPr txBox="1"/>
-            <p:nvPr/>
-          </p:nvSpPr>
-          <p:spPr>
-            <a:xfrm rot="16200000">
-              <a:off x="6868955" y="5386057"/>
-              <a:ext cx="702152" cy="341899"/>
-            </a:xfrm>
-            <a:prstGeom prst="rect">
-              <a:avLst/>
-            </a:prstGeom>
-            <a:solidFill>
-              <a:schemeClr val="bg1"/>
-            </a:solidFill>
-          </p:spPr>
-          <p:txBody>
-            <a:bodyPr wrap="square" rtlCol="0" anchor="ctr">
-              <a:spAutoFit/>
-            </a:bodyPr>
-            <a:lstStyle/>
-            <a:p>
-              <a:pPr algn="ctr"/>
-              <a:r>
-                <a:rPr lang="de-DE" sz="900" i="1" dirty="0" smtClean="0">
-                  <a:solidFill>
-                    <a:srgbClr val="800000"/>
-                  </a:solidFill>
-                </a:rPr>
-                <a:t>Tesla Model S</a:t>
-              </a:r>
-            </a:p>
-            <a:p>
-              <a:pPr algn="ctr"/>
-              <a:r>
-                <a:rPr lang="de-DE" sz="600" i="1" dirty="0" smtClean="0">
-                  <a:solidFill>
-                    <a:srgbClr val="800000"/>
-                  </a:solidFill>
-                </a:rPr>
-                <a:t>Motor: 440 </a:t>
-              </a:r>
-              <a:r>
-                <a:rPr lang="de-DE" sz="600" i="1" dirty="0" err="1" smtClean="0">
-                  <a:solidFill>
-                    <a:srgbClr val="800000"/>
-                  </a:solidFill>
-                </a:rPr>
-                <a:t>Nm</a:t>
-              </a:r>
-              <a:endParaRPr lang="de-DE" sz="600" i="1" dirty="0" smtClean="0">
-                <a:solidFill>
-                  <a:srgbClr val="800000"/>
-                </a:solidFill>
-              </a:endParaRPr>
-            </a:p>
-            <a:p>
-              <a:pPr algn="ctr"/>
-              <a:r>
-                <a:rPr lang="de-DE" sz="600" i="1" dirty="0" smtClean="0">
-                  <a:solidFill>
-                    <a:srgbClr val="800000"/>
-                  </a:solidFill>
-                </a:rPr>
-                <a:t>Getriebe: 9.73 : 1</a:t>
-              </a:r>
-              <a:endParaRPr lang="de-DE" sz="600" i="1" dirty="0">
-                <a:solidFill>
-                  <a:srgbClr val="800000"/>
-                </a:solidFill>
-              </a:endParaRPr>
-            </a:p>
-          </p:txBody>
-        </p:sp>
-        <p:sp>
-          <p:nvSpPr>
-            <p:cNvPr id="36" name="TextBox 10"/>
-            <p:cNvSpPr txBox="1"/>
-            <p:nvPr/>
-          </p:nvSpPr>
-          <p:spPr>
-            <a:xfrm rot="16200000">
-              <a:off x="6810822" y="6065201"/>
-              <a:ext cx="828741" cy="341899"/>
-            </a:xfrm>
-            <a:prstGeom prst="rect">
-              <a:avLst/>
-            </a:prstGeom>
-            <a:solidFill>
-              <a:schemeClr val="bg1"/>
-            </a:solidFill>
-          </p:spPr>
-          <p:txBody>
-            <a:bodyPr wrap="square" rtlCol="0">
-              <a:spAutoFit/>
-            </a:bodyPr>
-            <a:lstStyle/>
-            <a:p>
-              <a:pPr algn="ctr"/>
-              <a:r>
-                <a:rPr lang="de-DE" sz="900" i="1" dirty="0" smtClean="0">
-                  <a:solidFill>
-                    <a:srgbClr val="800000"/>
-                  </a:solidFill>
-                </a:rPr>
-                <a:t>Verbrenner (V10)</a:t>
-              </a:r>
-              <a:endParaRPr lang="de-DE" sz="700" i="1" dirty="0" smtClean="0">
-                <a:solidFill>
-                  <a:srgbClr val="800000"/>
-                </a:solidFill>
-              </a:endParaRPr>
-            </a:p>
-            <a:p>
-              <a:pPr algn="ctr"/>
-              <a:r>
-                <a:rPr lang="de-DE" sz="600" i="1" dirty="0" smtClean="0">
-                  <a:solidFill>
-                    <a:srgbClr val="800000"/>
-                  </a:solidFill>
-                </a:rPr>
-                <a:t>Motor: 550 </a:t>
-              </a:r>
-              <a:r>
-                <a:rPr lang="de-DE" sz="600" i="1" dirty="0" err="1" smtClean="0">
-                  <a:solidFill>
-                    <a:srgbClr val="800000"/>
-                  </a:solidFill>
-                </a:rPr>
-                <a:t>Nm</a:t>
-              </a:r>
-              <a:endParaRPr lang="de-DE" sz="600" i="1" dirty="0" smtClean="0">
-                <a:solidFill>
-                  <a:srgbClr val="800000"/>
-                </a:solidFill>
-              </a:endParaRPr>
-            </a:p>
-            <a:p>
-              <a:pPr algn="ctr"/>
-              <a:r>
-                <a:rPr lang="de-DE" sz="600" i="1" dirty="0" smtClean="0">
-                  <a:solidFill>
-                    <a:srgbClr val="800000"/>
-                  </a:solidFill>
-                </a:rPr>
-                <a:t>Getriebe: 1. Gang = 4.171 : 1</a:t>
-              </a:r>
-              <a:endParaRPr lang="de-DE" sz="600" i="1" dirty="0">
-                <a:solidFill>
-                  <a:srgbClr val="800000"/>
-                </a:solidFill>
-              </a:endParaRPr>
-            </a:p>
-          </p:txBody>
-        </p:sp>
-        <p:sp>
-          <p:nvSpPr>
-            <p:cNvPr id="37" name="TextBox 10"/>
-            <p:cNvSpPr txBox="1"/>
-            <p:nvPr/>
-          </p:nvSpPr>
-          <p:spPr>
-            <a:xfrm>
-              <a:off x="7181859" y="5141116"/>
-              <a:ext cx="2682871" cy="140300"/>
-            </a:xfrm>
-            <a:prstGeom prst="rect">
-              <a:avLst/>
-            </a:prstGeom>
-            <a:solidFill>
-              <a:schemeClr val="bg1"/>
-            </a:solidFill>
-          </p:spPr>
-          <p:txBody>
-            <a:bodyPr wrap="square" rtlCol="0" anchor="ctr">
-              <a:spAutoFit/>
-            </a:bodyPr>
-            <a:lstStyle/>
-            <a:p>
-              <a:r>
-                <a:rPr lang="de-DE" sz="700" i="1" dirty="0" smtClean="0">
-                  <a:solidFill>
-                    <a:srgbClr val="800000"/>
-                  </a:solidFill>
-                </a:rPr>
-                <a:t>Maximales Drehmoment: 0 - 5900 </a:t>
-              </a:r>
-              <a:r>
-                <a:rPr lang="de-DE" sz="700" i="1" smtClean="0">
-                  <a:solidFill>
-                    <a:srgbClr val="800000"/>
-                  </a:solidFill>
-                </a:rPr>
-                <a:t>U/min (entspricht 0 </a:t>
-              </a:r>
-              <a:r>
-                <a:rPr lang="de-DE" sz="700" i="1" dirty="0" smtClean="0">
-                  <a:solidFill>
-                    <a:srgbClr val="800000"/>
-                  </a:solidFill>
-                </a:rPr>
-                <a:t>bis ca. 120 km/h)</a:t>
-              </a:r>
-              <a:endParaRPr lang="de-DE" sz="600" i="1" dirty="0">
-                <a:solidFill>
-                  <a:srgbClr val="800000"/>
-                </a:solidFill>
-              </a:endParaRPr>
-            </a:p>
-          </p:txBody>
-        </p:sp>
-        <p:sp>
-          <p:nvSpPr>
-            <p:cNvPr id="47" name="TextBox 10"/>
-            <p:cNvSpPr txBox="1"/>
-            <p:nvPr/>
-          </p:nvSpPr>
-          <p:spPr>
-            <a:xfrm>
-              <a:off x="7633815" y="5270517"/>
-              <a:ext cx="823859" cy="161884"/>
-            </a:xfrm>
-            <a:prstGeom prst="rect">
-              <a:avLst/>
-            </a:prstGeom>
-            <a:noFill/>
-          </p:spPr>
-          <p:txBody>
-            <a:bodyPr wrap="square" rtlCol="0" anchor="ctr">
-              <a:spAutoFit/>
-            </a:bodyPr>
-            <a:lstStyle/>
-            <a:p>
-              <a:pPr algn="ctr"/>
-              <a:r>
-                <a:rPr lang="de-DE" sz="900" i="1" dirty="0" smtClean="0">
-                  <a:solidFill>
-                    <a:srgbClr val="800000"/>
-                  </a:solidFill>
-                </a:rPr>
-                <a:t>9.73 : 1</a:t>
-              </a:r>
-              <a:endParaRPr lang="de-DE" sz="600" i="1" dirty="0">
-                <a:solidFill>
-                  <a:srgbClr val="800000"/>
-                </a:solidFill>
-              </a:endParaRPr>
-            </a:p>
-          </p:txBody>
-        </p:sp>
-        <p:sp>
-          <p:nvSpPr>
-            <p:cNvPr id="48" name="TextBox 10"/>
-            <p:cNvSpPr txBox="1"/>
-            <p:nvPr/>
-          </p:nvSpPr>
-          <p:spPr>
-            <a:xfrm>
-              <a:off x="7633815" y="5875156"/>
-              <a:ext cx="823859" cy="161884"/>
-            </a:xfrm>
-            <a:prstGeom prst="rect">
-              <a:avLst/>
-            </a:prstGeom>
-            <a:noFill/>
-          </p:spPr>
-          <p:txBody>
-            <a:bodyPr wrap="square" rtlCol="0" anchor="ctr">
-              <a:spAutoFit/>
-            </a:bodyPr>
-            <a:lstStyle/>
-            <a:p>
-              <a:pPr algn="ctr"/>
-              <a:r>
-                <a:rPr lang="de-DE" sz="900" i="1" dirty="0" smtClean="0">
-                  <a:solidFill>
-                    <a:srgbClr val="800000"/>
-                  </a:solidFill>
-                </a:rPr>
-                <a:t>4.17 : 1</a:t>
-              </a:r>
-              <a:endParaRPr lang="de-DE" sz="600" i="1" dirty="0">
-                <a:solidFill>
-                  <a:srgbClr val="800000"/>
-                </a:solidFill>
-              </a:endParaRPr>
-            </a:p>
-          </p:txBody>
-        </p:sp>
-      </p:grpSp>
+          </a:ln>
+          <a:extLst>
+            <a:ext uri="{909E8E84-426E-40DD-AFC4-6F175D3DCCD1}">
+              <a14:hiddenFill xmlns:a14="http://schemas.microsoft.com/office/drawing/2010/main">
+                <a:solidFill>
+                  <a:schemeClr val="accent1"/>
+                </a:solidFill>
+              </a14:hiddenFill>
+            </a:ext>
+            <a:ext uri="{91240B29-F687-4F45-9708-019B960494DF}">
+              <a14:hiddenLine xmlns:a14="http://schemas.microsoft.com/office/drawing/2010/main" w="9525">
+                <a:solidFill>
+                  <a:schemeClr val="tx1"/>
+                </a:solidFill>
+                <a:miter lim="800000"/>
+                <a:headEnd/>
+                <a:tailEnd/>
+              </a14:hiddenLine>
+            </a:ext>
+          </a:extLst>
+        </p:spPr>
+      </p:pic>
       <p:sp>
         <p:nvSpPr>
           <p:cNvPr id="3" name="Rechteck 2"/>
@@ -5541,7 +4971,7 @@
           <p:nvPr/>
         </p:nvPicPr>
         <p:blipFill>
-          <a:blip r:embed="rId9">
+          <a:blip r:embed="rId3">
             <a:extLst>
               <a:ext uri="{28A0092B-C50C-407E-A947-70E740481C1C}">
                 <a14:useLocalDpi xmlns:a14="http://schemas.microsoft.com/office/drawing/2010/main"/>
@@ -5595,7 +5025,7 @@
           <p:nvPr/>
         </p:nvPicPr>
         <p:blipFill rotWithShape="1">
-          <a:blip r:embed="rId10" cstate="print">
+          <a:blip r:embed="rId4" cstate="print">
             <a:extLst>
               <a:ext uri="{28A0092B-C50C-407E-A947-70E740481C1C}">
                 <a14:useLocalDpi xmlns:a14="http://schemas.microsoft.com/office/drawing/2010/main"/>
@@ -6212,7 +5642,7 @@
           <p:nvPr/>
         </p:nvPicPr>
         <p:blipFill>
-          <a:blip r:embed="rId11">
+          <a:blip r:embed="rId5">
             <a:extLst>
               <a:ext uri="{28A0092B-C50C-407E-A947-70E740481C1C}">
                 <a14:useLocalDpi xmlns:a14="http://schemas.microsoft.com/office/drawing/2010/main"/>
@@ -6343,7 +5773,7 @@
                     <a:lumMod val="50000"/>
                   </a:schemeClr>
                 </a:solidFill>
-                <a:hlinkClick r:id="rId12"/>
+                <a:hlinkClick r:id="rId6"/>
               </a:rPr>
               <a:t>http://</a:t>
             </a:r>
@@ -6354,7 +5784,7 @@
                     <a:lumMod val="50000"/>
                   </a:schemeClr>
                 </a:solidFill>
-                <a:hlinkClick r:id="rId12"/>
+                <a:hlinkClick r:id="rId6"/>
               </a:rPr>
               <a:t>goo.gl/Syg41N</a:t>
             </a:r>
@@ -6559,7 +5989,7 @@
                     <a:lumMod val="50000"/>
                   </a:schemeClr>
                 </a:solidFill>
-                <a:hlinkClick r:id="rId13"/>
+                <a:hlinkClick r:id="rId7"/>
               </a:rPr>
               <a:t>www.teslamotors.com</a:t>
             </a:r>
@@ -6580,7 +6010,7 @@
                     <a:lumMod val="50000"/>
                   </a:schemeClr>
                 </a:solidFill>
-                <a:hlinkClick r:id="rId14"/>
+                <a:hlinkClick r:id="rId8"/>
               </a:rPr>
               <a:t>www.tff-forum.de</a:t>
             </a:r>
@@ -6601,7 +6031,7 @@
                     <a:lumMod val="50000"/>
                   </a:schemeClr>
                 </a:solidFill>
-                <a:hlinkClick r:id="rId15"/>
+                <a:hlinkClick r:id="rId9"/>
               </a:rPr>
               <a:t>www.teslamotorsclub.com</a:t>
             </a:r>
@@ -6622,7 +6052,7 @@
                     <a:lumMod val="50000"/>
                   </a:schemeClr>
                 </a:solidFill>
-                <a:hlinkClick r:id="rId16"/>
+                <a:hlinkClick r:id="rId10"/>
               </a:rPr>
               <a:t>www.goingelectric.de</a:t>
             </a:r>
@@ -6643,7 +6073,7 @@
                     <a:lumMod val="50000"/>
                   </a:schemeClr>
                 </a:solidFill>
-                <a:hlinkClick r:id="rId17"/>
+                <a:hlinkClick r:id="rId11"/>
               </a:rPr>
               <a:t>www.e-driver-net</a:t>
             </a:r>
@@ -6676,7 +6106,7 @@
           <p:nvPr/>
         </p:nvPicPr>
         <p:blipFill>
-          <a:blip r:embed="rId18" cstate="print">
+          <a:blip r:embed="rId12" cstate="print">
             <a:extLst>
               <a:ext uri="{28A0092B-C50C-407E-A947-70E740481C1C}">
                 <a14:useLocalDpi xmlns:a14="http://schemas.microsoft.com/office/drawing/2010/main"/>
@@ -6707,7 +6137,7 @@
           <p:nvPr/>
         </p:nvPicPr>
         <p:blipFill>
-          <a:blip r:embed="rId19" cstate="print">
+          <a:blip r:embed="rId13" cstate="print">
             <a:extLst>
               <a:ext uri="{28A0092B-C50C-407E-A947-70E740481C1C}">
                 <a14:useLocalDpi xmlns:a14="http://schemas.microsoft.com/office/drawing/2010/main"/>
@@ -6738,7 +6168,7 @@
           <p:nvPr/>
         </p:nvPicPr>
         <p:blipFill>
-          <a:blip r:embed="rId20" cstate="print">
+          <a:blip r:embed="rId14" cstate="print">
             <a:extLst>
               <a:ext uri="{28A0092B-C50C-407E-A947-70E740481C1C}">
                 <a14:useLocalDpi xmlns:a14="http://schemas.microsoft.com/office/drawing/2010/main"/>
@@ -6769,7 +6199,7 @@
           <p:nvPr/>
         </p:nvPicPr>
         <p:blipFill>
-          <a:blip r:embed="rId21" cstate="print">
+          <a:blip r:embed="rId15" cstate="print">
             <a:extLst>
               <a:ext uri="{28A0092B-C50C-407E-A947-70E740481C1C}">
                 <a14:useLocalDpi xmlns:a14="http://schemas.microsoft.com/office/drawing/2010/main"/>
@@ -6800,7 +6230,7 @@
           <p:nvPr/>
         </p:nvPicPr>
         <p:blipFill rotWithShape="1">
-          <a:blip r:embed="rId22" cstate="print">
+          <a:blip r:embed="rId16" cstate="print">
             <a:extLst>
               <a:ext uri="{28A0092B-C50C-407E-A947-70E740481C1C}">
                 <a14:useLocalDpi xmlns:a14="http://schemas.microsoft.com/office/drawing/2010/main"/>
@@ -6830,6 +6260,53 @@
           </a:extLst>
         </p:spPr>
       </p:pic>
+      <p:sp>
+        <p:nvSpPr>
+          <p:cNvPr id="32" name="TextBox 10"/>
+          <p:cNvSpPr txBox="1"/>
+          <p:nvPr/>
+        </p:nvSpPr>
+        <p:spPr>
+          <a:xfrm>
+            <a:off x="7877175" y="4498072"/>
+            <a:ext cx="1736276" cy="215444"/>
+          </a:xfrm>
+          <a:prstGeom prst="rect">
+            <a:avLst/>
+          </a:prstGeom>
+          <a:solidFill>
+            <a:schemeClr val="bg1"/>
+          </a:solidFill>
+          <a:ln>
+            <a:solidFill>
+              <a:schemeClr val="bg1">
+                <a:lumMod val="85000"/>
+              </a:schemeClr>
+            </a:solidFill>
+          </a:ln>
+        </p:spPr>
+        <p:txBody>
+          <a:bodyPr wrap="square" rtlCol="0">
+            <a:spAutoFit/>
+          </a:bodyPr>
+          <a:lstStyle/>
+          <a:p>
+            <a:r>
+              <a:rPr lang="de-DE" sz="800" i="1" dirty="0" smtClean="0">
+                <a:solidFill>
+                  <a:srgbClr val="800000"/>
+                </a:solidFill>
+              </a:rPr>
+              <a:t>Kofferraumvolumen im Vergleich</a:t>
+            </a:r>
+            <a:endParaRPr lang="de-DE" sz="800" i="1" dirty="0" smtClean="0">
+              <a:solidFill>
+                <a:srgbClr val="800000"/>
+              </a:solidFill>
+            </a:endParaRPr>
+          </a:p>
+        </p:txBody>
+      </p:sp>
     </p:spTree>
   </p:cSld>
   <p:clrMapOvr>

</xml_diff>

<commit_message>
version 1.0, copyright note, more expensive power for EUR version
</commit_message>
<xml_diff>
--- a/tesla_model_s_handout_chf.pptx
+++ b/tesla_model_s_handout_chf.pptx
@@ -290,7 +290,7 @@
             <a:fld id="{63BB9708-3311-2149-A02D-BFA98F482279}" type="datetimeFigureOut">
               <a:rPr lang="de-DE" smtClean="0"/>
               <a:pPr/>
-              <a:t>04.08.2014</a:t>
+              <a:t>05.08.2014</a:t>
             </a:fld>
             <a:endParaRPr lang="de-DE"/>
           </a:p>
@@ -457,7 +457,7 @@
             <a:fld id="{63BB9708-3311-2149-A02D-BFA98F482279}" type="datetimeFigureOut">
               <a:rPr lang="de-DE" smtClean="0"/>
               <a:pPr/>
-              <a:t>04.08.2014</a:t>
+              <a:t>05.08.2014</a:t>
             </a:fld>
             <a:endParaRPr lang="de-DE"/>
           </a:p>
@@ -634,7 +634,7 @@
             <a:fld id="{63BB9708-3311-2149-A02D-BFA98F482279}" type="datetimeFigureOut">
               <a:rPr lang="de-DE" smtClean="0"/>
               <a:pPr/>
-              <a:t>04.08.2014</a:t>
+              <a:t>05.08.2014</a:t>
             </a:fld>
             <a:endParaRPr lang="de-DE"/>
           </a:p>
@@ -801,7 +801,7 @@
             <a:fld id="{63BB9708-3311-2149-A02D-BFA98F482279}" type="datetimeFigureOut">
               <a:rPr lang="de-DE" smtClean="0"/>
               <a:pPr/>
-              <a:t>04.08.2014</a:t>
+              <a:t>05.08.2014</a:t>
             </a:fld>
             <a:endParaRPr lang="de-DE"/>
           </a:p>
@@ -1044,7 +1044,7 @@
             <a:fld id="{63BB9708-3311-2149-A02D-BFA98F482279}" type="datetimeFigureOut">
               <a:rPr lang="de-DE" smtClean="0"/>
               <a:pPr/>
-              <a:t>04.08.2014</a:t>
+              <a:t>05.08.2014</a:t>
             </a:fld>
             <a:endParaRPr lang="de-DE"/>
           </a:p>
@@ -1329,7 +1329,7 @@
             <a:fld id="{63BB9708-3311-2149-A02D-BFA98F482279}" type="datetimeFigureOut">
               <a:rPr lang="de-DE" smtClean="0"/>
               <a:pPr/>
-              <a:t>04.08.2014</a:t>
+              <a:t>05.08.2014</a:t>
             </a:fld>
             <a:endParaRPr lang="de-DE"/>
           </a:p>
@@ -1748,7 +1748,7 @@
             <a:fld id="{63BB9708-3311-2149-A02D-BFA98F482279}" type="datetimeFigureOut">
               <a:rPr lang="de-DE" smtClean="0"/>
               <a:pPr/>
-              <a:t>04.08.2014</a:t>
+              <a:t>05.08.2014</a:t>
             </a:fld>
             <a:endParaRPr lang="de-DE"/>
           </a:p>
@@ -1863,7 +1863,7 @@
             <a:fld id="{63BB9708-3311-2149-A02D-BFA98F482279}" type="datetimeFigureOut">
               <a:rPr lang="de-DE" smtClean="0"/>
               <a:pPr/>
-              <a:t>04.08.2014</a:t>
+              <a:t>05.08.2014</a:t>
             </a:fld>
             <a:endParaRPr lang="de-DE"/>
           </a:p>
@@ -1955,7 +1955,7 @@
             <a:fld id="{63BB9708-3311-2149-A02D-BFA98F482279}" type="datetimeFigureOut">
               <a:rPr lang="de-DE" smtClean="0"/>
               <a:pPr/>
-              <a:t>04.08.2014</a:t>
+              <a:t>05.08.2014</a:t>
             </a:fld>
             <a:endParaRPr lang="de-DE"/>
           </a:p>
@@ -2229,7 +2229,7 @@
             <a:fld id="{63BB9708-3311-2149-A02D-BFA98F482279}" type="datetimeFigureOut">
               <a:rPr lang="de-DE" smtClean="0"/>
               <a:pPr/>
-              <a:t>04.08.2014</a:t>
+              <a:t>05.08.2014</a:t>
             </a:fld>
             <a:endParaRPr lang="de-DE"/>
           </a:p>
@@ -2479,7 +2479,7 @@
             <a:fld id="{63BB9708-3311-2149-A02D-BFA98F482279}" type="datetimeFigureOut">
               <a:rPr lang="de-DE" smtClean="0"/>
               <a:pPr/>
-              <a:t>04.08.2014</a:t>
+              <a:t>05.08.2014</a:t>
             </a:fld>
             <a:endParaRPr lang="de-DE"/>
           </a:p>
@@ -2689,7 +2689,7 @@
             <a:fld id="{63BB9708-3311-2149-A02D-BFA98F482279}" type="datetimeFigureOut">
               <a:rPr lang="de-DE" smtClean="0"/>
               <a:pPr/>
-              <a:t>04.08.2014</a:t>
+              <a:t>05.08.2014</a:t>
             </a:fld>
             <a:endParaRPr lang="de-DE"/>
           </a:p>
@@ -4238,11 +4238,8 @@
                   </a:outerShdw>
                 </a:effectLst>
               </a:rPr>
-              <a:t>Stand: Juli 2014</a:t>
-            </a:r>
-          </a:p>
-          <a:p>
-            <a:pPr algn="r"/>
+              <a:t>Stand: </a:t>
+            </a:r>
             <a:r>
               <a:rPr lang="de-CH" sz="1200" b="1" dirty="0" smtClean="0">
                 <a:ln w="18415" cmpd="sng">
@@ -4260,48 +4257,7 @@
                   </a:outerShdw>
                 </a:effectLst>
               </a:rPr>
-              <a:t>Version </a:t>
-            </a:r>
-            <a:r>
-              <a:rPr lang="de-CH" sz="1200" b="1" dirty="0" smtClean="0">
-                <a:ln w="18415" cmpd="sng">
-                  <a:noFill/>
-                  <a:prstDash val="solid"/>
-                </a:ln>
-                <a:solidFill>
-                  <a:srgbClr val="FFFFFF"/>
-                </a:solidFill>
-                <a:effectLst>
-                  <a:outerShdw blurRad="38100" dist="38100" dir="2700000" algn="tl">
-                    <a:srgbClr val="000000">
-                      <a:alpha val="43137"/>
-                    </a:srgbClr>
-                  </a:outerShdw>
-                </a:effectLst>
-              </a:rPr>
-              <a:t>0.4</a:t>
-            </a:r>
-          </a:p>
-          <a:p>
-            <a:pPr algn="r"/>
-            <a:r>
-              <a:rPr lang="de-CH" sz="1200" b="1" dirty="0" smtClean="0">
-                <a:ln w="18415" cmpd="sng">
-                  <a:noFill/>
-                  <a:prstDash val="solid"/>
-                </a:ln>
-                <a:solidFill>
-                  <a:srgbClr val="FFFFFF"/>
-                </a:solidFill>
-                <a:effectLst>
-                  <a:outerShdw blurRad="38100" dist="38100" dir="2700000" algn="tl">
-                    <a:srgbClr val="000000">
-                      <a:alpha val="43137"/>
-                    </a:srgbClr>
-                  </a:outerShdw>
-                </a:effectLst>
-              </a:rPr>
-              <a:t>CHF Edition</a:t>
+              <a:t>August 2014</a:t>
             </a:r>
             <a:endParaRPr lang="de-CH" sz="1200" b="1" dirty="0" smtClean="0">
               <a:ln w="18415" cmpd="sng">
@@ -4320,6 +4276,85 @@
               </a:effectLst>
             </a:endParaRPr>
           </a:p>
+          <a:p>
+            <a:pPr algn="r"/>
+            <a:r>
+              <a:rPr lang="de-CH" sz="1200" b="1" dirty="0" smtClean="0">
+                <a:ln w="18415" cmpd="sng">
+                  <a:noFill/>
+                  <a:prstDash val="solid"/>
+                </a:ln>
+                <a:solidFill>
+                  <a:srgbClr val="FFFFFF"/>
+                </a:solidFill>
+                <a:effectLst>
+                  <a:outerShdw blurRad="38100" dist="38100" dir="2700000" algn="tl">
+                    <a:srgbClr val="000000">
+                      <a:alpha val="43137"/>
+                    </a:srgbClr>
+                  </a:outerShdw>
+                </a:effectLst>
+              </a:rPr>
+              <a:t>Version </a:t>
+            </a:r>
+            <a:r>
+              <a:rPr lang="de-CH" sz="1200" b="1" dirty="0" smtClean="0">
+                <a:ln w="18415" cmpd="sng">
+                  <a:noFill/>
+                  <a:prstDash val="solid"/>
+                </a:ln>
+                <a:solidFill>
+                  <a:srgbClr val="FFFFFF"/>
+                </a:solidFill>
+                <a:effectLst>
+                  <a:outerShdw blurRad="38100" dist="38100" dir="2700000" algn="tl">
+                    <a:srgbClr val="000000">
+                      <a:alpha val="43137"/>
+                    </a:srgbClr>
+                  </a:outerShdw>
+                </a:effectLst>
+              </a:rPr>
+              <a:t>1.0</a:t>
+            </a:r>
+            <a:endParaRPr lang="de-CH" sz="1200" b="1" dirty="0" smtClean="0">
+              <a:ln w="18415" cmpd="sng">
+                <a:noFill/>
+                <a:prstDash val="solid"/>
+              </a:ln>
+              <a:solidFill>
+                <a:srgbClr val="FFFFFF"/>
+              </a:solidFill>
+              <a:effectLst>
+                <a:outerShdw blurRad="38100" dist="38100" dir="2700000" algn="tl">
+                  <a:srgbClr val="000000">
+                    <a:alpha val="43137"/>
+                  </a:srgbClr>
+                </a:outerShdw>
+              </a:effectLst>
+            </a:endParaRPr>
+          </a:p>
+          <a:p>
+            <a:pPr algn="r"/>
+            <a:r>
+              <a:rPr lang="de-CH" sz="1200" b="1" dirty="0" smtClean="0">
+                <a:ln w="18415" cmpd="sng">
+                  <a:noFill/>
+                  <a:prstDash val="solid"/>
+                </a:ln>
+                <a:solidFill>
+                  <a:srgbClr val="FFFFFF"/>
+                </a:solidFill>
+                <a:effectLst>
+                  <a:outerShdw blurRad="38100" dist="38100" dir="2700000" algn="tl">
+                    <a:srgbClr val="000000">
+                      <a:alpha val="43137"/>
+                    </a:srgbClr>
+                  </a:outerShdw>
+                </a:effectLst>
+              </a:rPr>
+              <a:t>CHF Edition</a:t>
+            </a:r>
+          </a:p>
         </p:txBody>
       </p:sp>
       <p:sp>
@@ -4330,7 +4365,7 @@
         </p:nvSpPr>
         <p:spPr>
           <a:xfrm>
-            <a:off x="66310" y="4930985"/>
+            <a:off x="47260" y="4220993"/>
             <a:ext cx="1164101" cy="323165"/>
           </a:xfrm>
           <a:prstGeom prst="rect">
@@ -4428,7 +4463,7 @@
         </p:nvSpPr>
         <p:spPr>
           <a:xfrm>
-            <a:off x="1523634" y="4930985"/>
+            <a:off x="1504584" y="4220993"/>
             <a:ext cx="1164101" cy="323165"/>
           </a:xfrm>
           <a:prstGeom prst="rect">
@@ -6299,11 +6334,150 @@
               </a:rPr>
               <a:t>Kofferraumvolumen im Vergleich</a:t>
             </a:r>
-            <a:endParaRPr lang="de-DE" sz="800" i="1" dirty="0" smtClean="0">
-              <a:solidFill>
-                <a:srgbClr val="800000"/>
-              </a:solidFill>
-            </a:endParaRPr>
+          </a:p>
+        </p:txBody>
+      </p:sp>
+      <p:sp>
+        <p:nvSpPr>
+          <p:cNvPr id="20" name="Rechteck 19"/>
+          <p:cNvSpPr/>
+          <p:nvPr/>
+        </p:nvSpPr>
+        <p:spPr>
+          <a:xfrm>
+            <a:off x="0" y="6201060"/>
+            <a:ext cx="2303836" cy="307777"/>
+          </a:xfrm>
+          <a:prstGeom prst="rect">
+            <a:avLst/>
+          </a:prstGeom>
+        </p:spPr>
+        <p:txBody>
+          <a:bodyPr wrap="none">
+            <a:spAutoFit/>
+          </a:bodyPr>
+          <a:lstStyle/>
+          <a:p>
+            <a:r>
+              <a:rPr lang="en-US" sz="700" i="1" dirty="0" err="1" smtClean="0">
+                <a:solidFill>
+                  <a:schemeClr val="bg1">
+                    <a:lumMod val="50000"/>
+                  </a:schemeClr>
+                </a:solidFill>
+              </a:rPr>
+              <a:t>Bilder</a:t>
+            </a:r>
+            <a:r>
+              <a:rPr lang="en-US" sz="700" i="1" dirty="0" smtClean="0">
+                <a:solidFill>
+                  <a:schemeClr val="bg1">
+                    <a:lumMod val="50000"/>
+                  </a:schemeClr>
+                </a:solidFill>
+              </a:rPr>
+              <a:t>: Copyright </a:t>
+            </a:r>
+            <a:r>
+              <a:rPr lang="en-US" sz="700" i="1" dirty="0" err="1" smtClean="0">
+                <a:solidFill>
+                  <a:schemeClr val="bg1">
+                    <a:lumMod val="50000"/>
+                  </a:schemeClr>
+                </a:solidFill>
+              </a:rPr>
+              <a:t>behaftet</a:t>
+            </a:r>
+            <a:r>
+              <a:rPr lang="en-US" sz="700" i="1" dirty="0" smtClean="0">
+                <a:solidFill>
+                  <a:schemeClr val="bg1">
+                    <a:lumMod val="50000"/>
+                  </a:schemeClr>
+                </a:solidFill>
+              </a:rPr>
+              <a:t>!  (</a:t>
+            </a:r>
+            <a:r>
+              <a:rPr lang="en-US" sz="700" i="1" dirty="0" err="1" smtClean="0">
+                <a:solidFill>
+                  <a:schemeClr val="bg1">
+                    <a:lumMod val="50000"/>
+                  </a:schemeClr>
+                </a:solidFill>
+              </a:rPr>
+              <a:t>siehe</a:t>
+            </a:r>
+            <a:r>
+              <a:rPr lang="en-US" sz="700" i="1" dirty="0" smtClean="0">
+                <a:solidFill>
+                  <a:schemeClr val="bg1">
+                    <a:lumMod val="50000"/>
+                  </a:schemeClr>
+                </a:solidFill>
+              </a:rPr>
+              <a:t> </a:t>
+            </a:r>
+            <a:r>
+              <a:rPr lang="en-US" sz="700" i="1" dirty="0" err="1" smtClean="0">
+                <a:solidFill>
+                  <a:schemeClr val="bg1">
+                    <a:lumMod val="50000"/>
+                  </a:schemeClr>
+                </a:solidFill>
+              </a:rPr>
+              <a:t>entsprechende</a:t>
+            </a:r>
+            <a:r>
+              <a:rPr lang="en-US" sz="700" i="1" dirty="0" smtClean="0">
+                <a:solidFill>
+                  <a:schemeClr val="bg1">
+                    <a:lumMod val="50000"/>
+                  </a:schemeClr>
+                </a:solidFill>
+              </a:rPr>
+              <a:t> </a:t>
+            </a:r>
+            <a:r>
+              <a:rPr lang="en-US" sz="700" i="1" dirty="0" err="1" smtClean="0">
+                <a:solidFill>
+                  <a:schemeClr val="bg1">
+                    <a:lumMod val="50000"/>
+                  </a:schemeClr>
+                </a:solidFill>
+              </a:rPr>
+              <a:t>Quellen</a:t>
+            </a:r>
+            <a:r>
+              <a:rPr lang="en-US" sz="700" i="1" dirty="0" smtClean="0">
+                <a:solidFill>
+                  <a:schemeClr val="bg1">
+                    <a:lumMod val="50000"/>
+                  </a:schemeClr>
+                </a:solidFill>
+              </a:rPr>
+              <a:t>)</a:t>
+            </a:r>
+            <a:br>
+              <a:rPr lang="en-US" sz="700" i="1" dirty="0" smtClean="0">
+                <a:solidFill>
+                  <a:schemeClr val="bg1">
+                    <a:lumMod val="50000"/>
+                  </a:schemeClr>
+                </a:solidFill>
+              </a:rPr>
+            </a:br>
+            <a:r>
+              <a:rPr lang="en-US" sz="700" i="1" dirty="0" smtClean="0">
+                <a:solidFill>
+                  <a:schemeClr val="bg1">
+                    <a:lumMod val="50000"/>
+                  </a:schemeClr>
+                </a:solidFill>
+              </a:rPr>
+              <a:t>Handout:</a:t>
+            </a:r>
+            <a:endParaRPr lang="en-US" sz="700" dirty="0"/>
           </a:p>
         </p:txBody>
       </p:sp>

</xml_diff>

<commit_message>
updated with latest D models
</commit_message>
<xml_diff>
--- a/tesla_model_s_handout_chf.pptx
+++ b/tesla_model_s_handout_chf.pptx
@@ -290,7 +290,7 @@
             <a:fld id="{63BB9708-3311-2149-A02D-BFA98F482279}" type="datetimeFigureOut">
               <a:rPr lang="de-DE" smtClean="0"/>
               <a:pPr/>
-              <a:t>24.08.2014</a:t>
+              <a:t>08.12.2014</a:t>
             </a:fld>
             <a:endParaRPr lang="de-DE"/>
           </a:p>
@@ -457,7 +457,7 @@
             <a:fld id="{63BB9708-3311-2149-A02D-BFA98F482279}" type="datetimeFigureOut">
               <a:rPr lang="de-DE" smtClean="0"/>
               <a:pPr/>
-              <a:t>24.08.2014</a:t>
+              <a:t>08.12.2014</a:t>
             </a:fld>
             <a:endParaRPr lang="de-DE"/>
           </a:p>
@@ -634,7 +634,7 @@
             <a:fld id="{63BB9708-3311-2149-A02D-BFA98F482279}" type="datetimeFigureOut">
               <a:rPr lang="de-DE" smtClean="0"/>
               <a:pPr/>
-              <a:t>24.08.2014</a:t>
+              <a:t>08.12.2014</a:t>
             </a:fld>
             <a:endParaRPr lang="de-DE"/>
           </a:p>
@@ -801,7 +801,7 @@
             <a:fld id="{63BB9708-3311-2149-A02D-BFA98F482279}" type="datetimeFigureOut">
               <a:rPr lang="de-DE" smtClean="0"/>
               <a:pPr/>
-              <a:t>24.08.2014</a:t>
+              <a:t>08.12.2014</a:t>
             </a:fld>
             <a:endParaRPr lang="de-DE"/>
           </a:p>
@@ -1044,7 +1044,7 @@
             <a:fld id="{63BB9708-3311-2149-A02D-BFA98F482279}" type="datetimeFigureOut">
               <a:rPr lang="de-DE" smtClean="0"/>
               <a:pPr/>
-              <a:t>24.08.2014</a:t>
+              <a:t>08.12.2014</a:t>
             </a:fld>
             <a:endParaRPr lang="de-DE"/>
           </a:p>
@@ -1329,7 +1329,7 @@
             <a:fld id="{63BB9708-3311-2149-A02D-BFA98F482279}" type="datetimeFigureOut">
               <a:rPr lang="de-DE" smtClean="0"/>
               <a:pPr/>
-              <a:t>24.08.2014</a:t>
+              <a:t>08.12.2014</a:t>
             </a:fld>
             <a:endParaRPr lang="de-DE"/>
           </a:p>
@@ -1748,7 +1748,7 @@
             <a:fld id="{63BB9708-3311-2149-A02D-BFA98F482279}" type="datetimeFigureOut">
               <a:rPr lang="de-DE" smtClean="0"/>
               <a:pPr/>
-              <a:t>24.08.2014</a:t>
+              <a:t>08.12.2014</a:t>
             </a:fld>
             <a:endParaRPr lang="de-DE"/>
           </a:p>
@@ -1863,7 +1863,7 @@
             <a:fld id="{63BB9708-3311-2149-A02D-BFA98F482279}" type="datetimeFigureOut">
               <a:rPr lang="de-DE" smtClean="0"/>
               <a:pPr/>
-              <a:t>24.08.2014</a:t>
+              <a:t>08.12.2014</a:t>
             </a:fld>
             <a:endParaRPr lang="de-DE"/>
           </a:p>
@@ -1955,7 +1955,7 @@
             <a:fld id="{63BB9708-3311-2149-A02D-BFA98F482279}" type="datetimeFigureOut">
               <a:rPr lang="de-DE" smtClean="0"/>
               <a:pPr/>
-              <a:t>24.08.2014</a:t>
+              <a:t>08.12.2014</a:t>
             </a:fld>
             <a:endParaRPr lang="de-DE"/>
           </a:p>
@@ -2229,7 +2229,7 @@
             <a:fld id="{63BB9708-3311-2149-A02D-BFA98F482279}" type="datetimeFigureOut">
               <a:rPr lang="de-DE" smtClean="0"/>
               <a:pPr/>
-              <a:t>24.08.2014</a:t>
+              <a:t>08.12.2014</a:t>
             </a:fld>
             <a:endParaRPr lang="de-DE"/>
           </a:p>
@@ -2479,7 +2479,7 @@
             <a:fld id="{63BB9708-3311-2149-A02D-BFA98F482279}" type="datetimeFigureOut">
               <a:rPr lang="de-DE" smtClean="0"/>
               <a:pPr/>
-              <a:t>24.08.2014</a:t>
+              <a:t>08.12.2014</a:t>
             </a:fld>
             <a:endParaRPr lang="de-DE"/>
           </a:p>
@@ -2689,7 +2689,7 @@
             <a:fld id="{63BB9708-3311-2149-A02D-BFA98F482279}" type="datetimeFigureOut">
               <a:rPr lang="de-DE" smtClean="0"/>
               <a:pPr/>
-              <a:t>24.08.2014</a:t>
+              <a:t>08.12.2014</a:t>
             </a:fld>
             <a:endParaRPr lang="de-DE"/>
           </a:p>
@@ -3062,6 +3062,82 @@
       </p:grpSpPr>
       <p:sp>
         <p:nvSpPr>
+          <p:cNvPr id="17" name="Rechteck 16"/>
+          <p:cNvSpPr/>
+          <p:nvPr/>
+        </p:nvSpPr>
+        <p:spPr>
+          <a:xfrm>
+            <a:off x="3744686" y="2028992"/>
+            <a:ext cx="6161315" cy="4839847"/>
+          </a:xfrm>
+          <a:prstGeom prst="rect">
+            <a:avLst/>
+          </a:prstGeom>
+          <a:solidFill>
+            <a:schemeClr val="bg1">
+              <a:lumMod val="75000"/>
+            </a:schemeClr>
+          </a:solidFill>
+          <a:ln>
+            <a:noFill/>
+          </a:ln>
+          <a:effectLst/>
+        </p:spPr>
+        <p:style>
+          <a:lnRef idx="1">
+            <a:schemeClr val="accent1"/>
+          </a:lnRef>
+          <a:fillRef idx="3">
+            <a:schemeClr val="accent1"/>
+          </a:fillRef>
+          <a:effectRef idx="2">
+            <a:schemeClr val="accent1"/>
+          </a:effectRef>
+          <a:fontRef idx="minor">
+            <a:schemeClr val="lt1"/>
+          </a:fontRef>
+        </p:style>
+        <p:txBody>
+          <a:bodyPr rtlCol="0" anchor="ctr"/>
+          <a:lstStyle/>
+          <a:p>
+            <a:pPr algn="ctr"/>
+            <a:endParaRPr lang="en-US"/>
+          </a:p>
+        </p:txBody>
+      </p:sp>
+      <p:pic>
+        <p:nvPicPr>
+          <p:cNvPr id="11" name="Grafik 10"/>
+          <p:cNvPicPr>
+            <a:picLocks noChangeAspect="1"/>
+          </p:cNvPicPr>
+          <p:nvPr/>
+        </p:nvPicPr>
+        <p:blipFill rotWithShape="1">
+          <a:blip r:embed="rId2">
+            <a:extLst>
+              <a:ext uri="{28A0092B-C50C-407E-A947-70E740481C1C}">
+                <a14:useLocalDpi xmlns:a14="http://schemas.microsoft.com/office/drawing/2010/main" val="0"/>
+              </a:ext>
+            </a:extLst>
+          </a:blip>
+          <a:srcRect l="2993"/>
+          <a:stretch/>
+        </p:blipFill>
+        <p:spPr>
+          <a:xfrm>
+            <a:off x="0" y="2167890"/>
+            <a:ext cx="4395166" cy="3356610"/>
+          </a:xfrm>
+          <a:prstGeom prst="rect">
+            <a:avLst/>
+          </a:prstGeom>
+        </p:spPr>
+      </p:pic>
+      <p:sp>
+        <p:nvSpPr>
           <p:cNvPr id="2" name="Rechteck 1"/>
           <p:cNvSpPr/>
           <p:nvPr/>
@@ -3107,53 +3183,6 @@
           </a:p>
         </p:txBody>
       </p:sp>
-      <p:sp>
-        <p:nvSpPr>
-          <p:cNvPr id="17" name="Rechteck 16"/>
-          <p:cNvSpPr/>
-          <p:nvPr/>
-        </p:nvSpPr>
-        <p:spPr>
-          <a:xfrm>
-            <a:off x="3744686" y="2028992"/>
-            <a:ext cx="6161315" cy="4839847"/>
-          </a:xfrm>
-          <a:prstGeom prst="rect">
-            <a:avLst/>
-          </a:prstGeom>
-          <a:solidFill>
-            <a:schemeClr val="bg1">
-              <a:lumMod val="75000"/>
-            </a:schemeClr>
-          </a:solidFill>
-          <a:ln>
-            <a:noFill/>
-          </a:ln>
-          <a:effectLst/>
-        </p:spPr>
-        <p:style>
-          <a:lnRef idx="1">
-            <a:schemeClr val="accent1"/>
-          </a:lnRef>
-          <a:fillRef idx="3">
-            <a:schemeClr val="accent1"/>
-          </a:fillRef>
-          <a:effectRef idx="2">
-            <a:schemeClr val="accent1"/>
-          </a:effectRef>
-          <a:fontRef idx="minor">
-            <a:schemeClr val="lt1"/>
-          </a:fontRef>
-        </p:style>
-        <p:txBody>
-          <a:bodyPr rtlCol="0" anchor="ctr"/>
-          <a:lstStyle/>
-          <a:p>
-            <a:pPr algn="ctr"/>
-            <a:endParaRPr lang="en-US"/>
-          </a:p>
-        </p:txBody>
-      </p:sp>
       <p:pic>
         <p:nvPicPr>
           <p:cNvPr id="3" name="Grafik 2"/>
@@ -3163,7 +3192,7 @@
           <p:nvPr/>
         </p:nvPicPr>
         <p:blipFill rotWithShape="1">
-          <a:blip r:embed="rId2" cstate="print">
+          <a:blip r:embed="rId3" cstate="print">
             <a:extLst>
               <a:ext uri="{28A0092B-C50C-407E-A947-70E740481C1C}">
                 <a14:useLocalDpi xmlns:a14="http://schemas.microsoft.com/office/drawing/2010/main"/>
@@ -3183,344 +3212,6 @@
           </a:prstGeom>
         </p:spPr>
       </p:pic>
-      <p:pic>
-        <p:nvPicPr>
-          <p:cNvPr id="35" name="Picture 3"/>
-          <p:cNvPicPr>
-            <a:picLocks noChangeAspect="1" noChangeArrowheads="1"/>
-          </p:cNvPicPr>
-          <p:nvPr/>
-        </p:nvPicPr>
-        <p:blipFill>
-          <a:blip r:embed="rId3">
-            <a:extLst>
-              <a:ext uri="{28A0092B-C50C-407E-A947-70E740481C1C}">
-                <a14:useLocalDpi xmlns:a14="http://schemas.microsoft.com/office/drawing/2010/main" val="0"/>
-              </a:ext>
-            </a:extLst>
-          </a:blip>
-          <a:srcRect/>
-          <a:stretch>
-            <a:fillRect/>
-          </a:stretch>
-        </p:blipFill>
-        <p:spPr bwMode="auto">
-          <a:xfrm>
-            <a:off x="11851" y="2224090"/>
-            <a:ext cx="4372315" cy="3481556"/>
-          </a:xfrm>
-          <a:prstGeom prst="rect">
-            <a:avLst/>
-          </a:prstGeom>
-          <a:noFill/>
-          <a:ln w="19050">
-            <a:solidFill>
-              <a:schemeClr val="bg1">
-                <a:lumMod val="65000"/>
-              </a:schemeClr>
-            </a:solidFill>
-            <a:miter lim="800000"/>
-            <a:headEnd/>
-            <a:tailEnd/>
-          </a:ln>
-          <a:extLst>
-            <a:ext uri="{909E8E84-426E-40DD-AFC4-6F175D3DCCD1}">
-              <a14:hiddenFill xmlns:a14="http://schemas.microsoft.com/office/drawing/2010/main">
-                <a:solidFill>
-                  <a:schemeClr val="accent1"/>
-                </a:solidFill>
-              </a14:hiddenFill>
-            </a:ext>
-          </a:extLst>
-        </p:spPr>
-      </p:pic>
-      <p:sp>
-        <p:nvSpPr>
-          <p:cNvPr id="36" name="Textfeld 35"/>
-          <p:cNvSpPr txBox="1"/>
-          <p:nvPr/>
-        </p:nvSpPr>
-        <p:spPr>
-          <a:xfrm>
-            <a:off x="53610" y="4138653"/>
-            <a:ext cx="1098378" cy="307777"/>
-          </a:xfrm>
-          <a:prstGeom prst="rect">
-            <a:avLst/>
-          </a:prstGeom>
-          <a:noFill/>
-        </p:spPr>
-        <p:txBody>
-          <a:bodyPr wrap="none" rtlCol="0">
-            <a:spAutoFit/>
-          </a:bodyPr>
-          <a:lstStyle/>
-          <a:p>
-            <a:r>
-              <a:rPr lang="de-CH" sz="700" b="1" dirty="0" smtClean="0">
-                <a:solidFill>
-                  <a:schemeClr val="tx1">
-                    <a:lumMod val="85000"/>
-                    <a:lumOff val="15000"/>
-                  </a:schemeClr>
-                </a:solidFill>
-              </a:rPr>
-              <a:t>440</a:t>
-            </a:r>
-            <a:r>
-              <a:rPr lang="de-CH" sz="700" dirty="0" smtClean="0">
-                <a:solidFill>
-                  <a:schemeClr val="tx1">
-                    <a:lumMod val="85000"/>
-                    <a:lumOff val="15000"/>
-                  </a:schemeClr>
-                </a:solidFill>
-              </a:rPr>
-              <a:t> </a:t>
-            </a:r>
-            <a:r>
-              <a:rPr lang="de-CH" sz="700" dirty="0" err="1" smtClean="0">
-                <a:solidFill>
-                  <a:schemeClr val="tx1">
-                    <a:lumMod val="50000"/>
-                    <a:lumOff val="50000"/>
-                  </a:schemeClr>
-                </a:solidFill>
-              </a:rPr>
-              <a:t>Nm</a:t>
-            </a:r>
-            <a:r>
-              <a:rPr lang="de-CH" sz="700" dirty="0" smtClean="0">
-                <a:solidFill>
-                  <a:schemeClr val="tx1">
-                    <a:lumMod val="50000"/>
-                    <a:lumOff val="50000"/>
-                  </a:schemeClr>
-                </a:solidFill>
-              </a:rPr>
-              <a:t> Drehmoment </a:t>
-            </a:r>
-            <a:br>
-              <a:rPr lang="de-CH" sz="700" dirty="0" smtClean="0">
-                <a:solidFill>
-                  <a:schemeClr val="tx1">
-                    <a:lumMod val="50000"/>
-                    <a:lumOff val="50000"/>
-                  </a:schemeClr>
-                </a:solidFill>
-              </a:rPr>
-            </a:br>
-            <a:r>
-              <a:rPr lang="de-CH" sz="700" dirty="0" smtClean="0">
-                <a:solidFill>
-                  <a:schemeClr val="tx1">
-                    <a:lumMod val="50000"/>
-                    <a:lumOff val="50000"/>
-                  </a:schemeClr>
-                </a:solidFill>
-              </a:rPr>
-              <a:t>                  (0-5900U/min)</a:t>
-            </a:r>
-            <a:endParaRPr lang="en-US" sz="700" dirty="0">
-              <a:solidFill>
-                <a:schemeClr val="tx1">
-                  <a:lumMod val="50000"/>
-                  <a:lumOff val="50000"/>
-                </a:schemeClr>
-              </a:solidFill>
-            </a:endParaRPr>
-          </a:p>
-        </p:txBody>
-      </p:sp>
-      <p:sp>
-        <p:nvSpPr>
-          <p:cNvPr id="37" name="Textfeld 36"/>
-          <p:cNvSpPr txBox="1"/>
-          <p:nvPr/>
-        </p:nvSpPr>
-        <p:spPr>
-          <a:xfrm>
-            <a:off x="1523644" y="4249777"/>
-            <a:ext cx="1098378" cy="307777"/>
-          </a:xfrm>
-          <a:prstGeom prst="rect">
-            <a:avLst/>
-          </a:prstGeom>
-          <a:noFill/>
-        </p:spPr>
-        <p:txBody>
-          <a:bodyPr wrap="none" rtlCol="0">
-            <a:spAutoFit/>
-          </a:bodyPr>
-          <a:lstStyle/>
-          <a:p>
-            <a:r>
-              <a:rPr lang="de-CH" sz="700" b="1" dirty="0" smtClean="0">
-                <a:solidFill>
-                  <a:schemeClr val="tx1">
-                    <a:lumMod val="85000"/>
-                    <a:lumOff val="15000"/>
-                  </a:schemeClr>
-                </a:solidFill>
-              </a:rPr>
-              <a:t>440</a:t>
-            </a:r>
-            <a:r>
-              <a:rPr lang="de-CH" sz="700" dirty="0" smtClean="0">
-                <a:solidFill>
-                  <a:schemeClr val="tx1">
-                    <a:lumMod val="85000"/>
-                    <a:lumOff val="15000"/>
-                  </a:schemeClr>
-                </a:solidFill>
-              </a:rPr>
-              <a:t> </a:t>
-            </a:r>
-            <a:r>
-              <a:rPr lang="de-CH" sz="700" dirty="0" err="1" smtClean="0">
-                <a:solidFill>
-                  <a:schemeClr val="tx1">
-                    <a:lumMod val="50000"/>
-                    <a:lumOff val="50000"/>
-                  </a:schemeClr>
-                </a:solidFill>
-              </a:rPr>
-              <a:t>Nm</a:t>
-            </a:r>
-            <a:r>
-              <a:rPr lang="de-CH" sz="700" dirty="0" smtClean="0">
-                <a:solidFill>
-                  <a:schemeClr val="tx1">
-                    <a:lumMod val="50000"/>
-                    <a:lumOff val="50000"/>
-                  </a:schemeClr>
-                </a:solidFill>
-              </a:rPr>
-              <a:t> Drehmoment </a:t>
-            </a:r>
-            <a:br>
-              <a:rPr lang="de-CH" sz="700" dirty="0" smtClean="0">
-                <a:solidFill>
-                  <a:schemeClr val="tx1">
-                    <a:lumMod val="50000"/>
-                    <a:lumOff val="50000"/>
-                  </a:schemeClr>
-                </a:solidFill>
-              </a:rPr>
-            </a:br>
-            <a:r>
-              <a:rPr lang="de-CH" sz="700" dirty="0" smtClean="0">
-                <a:solidFill>
-                  <a:schemeClr val="tx1">
-                    <a:lumMod val="50000"/>
-                    <a:lumOff val="50000"/>
-                  </a:schemeClr>
-                </a:solidFill>
-              </a:rPr>
-              <a:t>                  (0-5900U/min)</a:t>
-            </a:r>
-            <a:endParaRPr lang="en-US" sz="700" dirty="0">
-              <a:solidFill>
-                <a:schemeClr val="tx1">
-                  <a:lumMod val="50000"/>
-                  <a:lumOff val="50000"/>
-                </a:schemeClr>
-              </a:solidFill>
-            </a:endParaRPr>
-          </a:p>
-        </p:txBody>
-      </p:sp>
-      <p:sp>
-        <p:nvSpPr>
-          <p:cNvPr id="39" name="Textfeld 38"/>
-          <p:cNvSpPr txBox="1"/>
-          <p:nvPr/>
-        </p:nvSpPr>
-        <p:spPr>
-          <a:xfrm>
-            <a:off x="2977801" y="4943685"/>
-            <a:ext cx="1098378" cy="307777"/>
-          </a:xfrm>
-          <a:prstGeom prst="rect">
-            <a:avLst/>
-          </a:prstGeom>
-          <a:noFill/>
-        </p:spPr>
-        <p:txBody>
-          <a:bodyPr wrap="none" rtlCol="0">
-            <a:spAutoFit/>
-          </a:bodyPr>
-          <a:lstStyle/>
-          <a:p>
-            <a:r>
-              <a:rPr lang="de-CH" sz="700" b="1" dirty="0" smtClean="0">
-                <a:solidFill>
-                  <a:schemeClr val="tx1">
-                    <a:lumMod val="85000"/>
-                    <a:lumOff val="15000"/>
-                  </a:schemeClr>
-                </a:solidFill>
-              </a:rPr>
-              <a:t>600</a:t>
-            </a:r>
-            <a:r>
-              <a:rPr lang="de-CH" sz="700" b="1" dirty="0" smtClean="0"/>
-              <a:t> </a:t>
-            </a:r>
-            <a:r>
-              <a:rPr lang="de-CH" sz="700" dirty="0" err="1" smtClean="0">
-                <a:solidFill>
-                  <a:schemeClr val="tx1">
-                    <a:lumMod val="50000"/>
-                    <a:lumOff val="50000"/>
-                  </a:schemeClr>
-                </a:solidFill>
-              </a:rPr>
-              <a:t>Nm</a:t>
-            </a:r>
-            <a:r>
-              <a:rPr lang="de-CH" sz="700" dirty="0" smtClean="0">
-                <a:solidFill>
-                  <a:schemeClr val="tx1">
-                    <a:lumMod val="50000"/>
-                    <a:lumOff val="50000"/>
-                  </a:schemeClr>
-                </a:solidFill>
-              </a:rPr>
-              <a:t> Drehmoment </a:t>
-            </a:r>
-            <a:br>
-              <a:rPr lang="de-CH" sz="700" dirty="0" smtClean="0">
-                <a:solidFill>
-                  <a:schemeClr val="tx1">
-                    <a:lumMod val="50000"/>
-                    <a:lumOff val="50000"/>
-                  </a:schemeClr>
-                </a:solidFill>
-              </a:rPr>
-            </a:br>
-            <a:r>
-              <a:rPr lang="de-CH" sz="700" dirty="0" smtClean="0">
-                <a:solidFill>
-                  <a:schemeClr val="tx1">
-                    <a:lumMod val="50000"/>
-                    <a:lumOff val="50000"/>
-                  </a:schemeClr>
-                </a:solidFill>
-              </a:rPr>
-              <a:t>                  (0-5300U/min)</a:t>
-            </a:r>
-            <a:endParaRPr lang="en-US" sz="700" dirty="0">
-              <a:solidFill>
-                <a:schemeClr val="tx1">
-                  <a:lumMod val="50000"/>
-                  <a:lumOff val="50000"/>
-                </a:schemeClr>
-              </a:solidFill>
-            </a:endParaRPr>
-          </a:p>
-        </p:txBody>
-      </p:sp>
       <p:sp>
         <p:nvSpPr>
           <p:cNvPr id="22" name="Rechteck 21"/>
@@ -4552,11 +4243,8 @@
                   </a:outerShdw>
                 </a:effectLst>
               </a:rPr>
-              <a:t>Stand: August 2014</a:t>
-            </a:r>
-          </a:p>
-          <a:p>
-            <a:pPr algn="r"/>
+              <a:t>Stand: </a:t>
+            </a:r>
             <a:r>
               <a:rPr lang="de-CH" sz="1200" b="1" dirty="0" smtClean="0">
                 <a:ln w="18415" cmpd="sng">
@@ -4574,8 +4262,81 @@
                   </a:outerShdw>
                 </a:effectLst>
               </a:rPr>
-              <a:t>Version 1.2</a:t>
-            </a:r>
+              <a:t>Dezember 2014</a:t>
+            </a:r>
+            <a:endParaRPr lang="de-CH" sz="1200" b="1" dirty="0" smtClean="0">
+              <a:ln w="18415" cmpd="sng">
+                <a:noFill/>
+                <a:prstDash val="solid"/>
+              </a:ln>
+              <a:solidFill>
+                <a:srgbClr val="FFFFFF"/>
+              </a:solidFill>
+              <a:effectLst>
+                <a:outerShdw blurRad="38100" dist="38100" dir="2700000" algn="tl">
+                  <a:srgbClr val="000000">
+                    <a:alpha val="43137"/>
+                  </a:srgbClr>
+                </a:outerShdw>
+              </a:effectLst>
+            </a:endParaRPr>
+          </a:p>
+          <a:p>
+            <a:pPr algn="r"/>
+            <a:r>
+              <a:rPr lang="de-CH" sz="1200" b="1" dirty="0" smtClean="0">
+                <a:ln w="18415" cmpd="sng">
+                  <a:noFill/>
+                  <a:prstDash val="solid"/>
+                </a:ln>
+                <a:solidFill>
+                  <a:srgbClr val="FFFFFF"/>
+                </a:solidFill>
+                <a:effectLst>
+                  <a:outerShdw blurRad="38100" dist="38100" dir="2700000" algn="tl">
+                    <a:srgbClr val="000000">
+                      <a:alpha val="43137"/>
+                    </a:srgbClr>
+                  </a:outerShdw>
+                </a:effectLst>
+              </a:rPr>
+              <a:t>Version </a:t>
+            </a:r>
+            <a:r>
+              <a:rPr lang="de-CH" sz="1200" b="1" dirty="0" smtClean="0">
+                <a:ln w="18415" cmpd="sng">
+                  <a:noFill/>
+                  <a:prstDash val="solid"/>
+                </a:ln>
+                <a:solidFill>
+                  <a:srgbClr val="FFFFFF"/>
+                </a:solidFill>
+                <a:effectLst>
+                  <a:outerShdw blurRad="38100" dist="38100" dir="2700000" algn="tl">
+                    <a:srgbClr val="000000">
+                      <a:alpha val="43137"/>
+                    </a:srgbClr>
+                  </a:outerShdw>
+                </a:effectLst>
+              </a:rPr>
+              <a:t>1.3</a:t>
+            </a:r>
+            <a:endParaRPr lang="de-CH" sz="1200" b="1" dirty="0" smtClean="0">
+              <a:ln w="18415" cmpd="sng">
+                <a:noFill/>
+                <a:prstDash val="solid"/>
+              </a:ln>
+              <a:solidFill>
+                <a:srgbClr val="FFFFFF"/>
+              </a:solidFill>
+              <a:effectLst>
+                <a:outerShdw blurRad="38100" dist="38100" dir="2700000" algn="tl">
+                  <a:srgbClr val="000000">
+                    <a:alpha val="43137"/>
+                  </a:srgbClr>
+                </a:outerShdw>
+              </a:effectLst>
+            </a:endParaRPr>
           </a:p>
           <a:p>
             <a:pPr algn="r"/>
@@ -4819,6 +4580,204 @@
           </a:p>
         </p:txBody>
       </p:sp>
+      <p:sp>
+        <p:nvSpPr>
+          <p:cNvPr id="31" name="Textfeld 30"/>
+          <p:cNvSpPr txBox="1"/>
+          <p:nvPr/>
+        </p:nvSpPr>
+        <p:spPr>
+          <a:xfrm>
+            <a:off x="467135" y="2750820"/>
+            <a:ext cx="498855" cy="230832"/>
+          </a:xfrm>
+          <a:prstGeom prst="rect">
+            <a:avLst/>
+          </a:prstGeom>
+          <a:noFill/>
+        </p:spPr>
+        <p:txBody>
+          <a:bodyPr wrap="none" rtlCol="0">
+            <a:spAutoFit/>
+          </a:bodyPr>
+          <a:lstStyle/>
+          <a:p>
+            <a:r>
+              <a:rPr lang="de-CH" sz="900" b="1" dirty="0" smtClean="0">
+                <a:effectLst>
+                  <a:outerShdw blurRad="50800" dist="38100" dir="5400000" algn="t" rotWithShape="0">
+                    <a:prstClr val="black">
+                      <a:alpha val="40000"/>
+                    </a:prstClr>
+                  </a:outerShdw>
+                </a:effectLst>
+              </a:rPr>
+              <a:t>387 PS</a:t>
+            </a:r>
+            <a:endParaRPr lang="en-US" sz="900" b="1" dirty="0">
+              <a:effectLst>
+                <a:outerShdw blurRad="50800" dist="38100" dir="5400000" algn="t" rotWithShape="0">
+                  <a:prstClr val="black">
+                    <a:alpha val="40000"/>
+                  </a:prstClr>
+                </a:outerShdw>
+              </a:effectLst>
+            </a:endParaRPr>
+          </a:p>
+        </p:txBody>
+      </p:sp>
+      <p:sp>
+        <p:nvSpPr>
+          <p:cNvPr id="32" name="Textfeld 31"/>
+          <p:cNvSpPr txBox="1"/>
+          <p:nvPr/>
+        </p:nvSpPr>
+        <p:spPr>
+          <a:xfrm>
+            <a:off x="1839785" y="2750820"/>
+            <a:ext cx="723275" cy="230832"/>
+          </a:xfrm>
+          <a:prstGeom prst="rect">
+            <a:avLst/>
+          </a:prstGeom>
+          <a:noFill/>
+        </p:spPr>
+        <p:txBody>
+          <a:bodyPr wrap="none" rtlCol="0">
+            <a:spAutoFit/>
+          </a:bodyPr>
+          <a:lstStyle/>
+          <a:p>
+            <a:r>
+              <a:rPr lang="de-CH" sz="900" b="1" dirty="0" smtClean="0">
+                <a:effectLst>
+                  <a:outerShdw blurRad="50800" dist="38100" dir="5400000" algn="t" rotWithShape="0">
+                    <a:prstClr val="black">
+                      <a:alpha val="40000"/>
+                    </a:prstClr>
+                  </a:outerShdw>
+                </a:effectLst>
+              </a:rPr>
+              <a:t>380 PS, 4x4</a:t>
+            </a:r>
+            <a:endParaRPr lang="en-US" sz="900" b="1" dirty="0">
+              <a:effectLst>
+                <a:outerShdw blurRad="50800" dist="38100" dir="5400000" algn="t" rotWithShape="0">
+                  <a:prstClr val="black">
+                    <a:alpha val="40000"/>
+                  </a:prstClr>
+                </a:outerShdw>
+              </a:effectLst>
+            </a:endParaRPr>
+          </a:p>
+        </p:txBody>
+      </p:sp>
+      <p:sp>
+        <p:nvSpPr>
+          <p:cNvPr id="42" name="Textfeld 41"/>
+          <p:cNvSpPr txBox="1"/>
+          <p:nvPr/>
+        </p:nvSpPr>
+        <p:spPr>
+          <a:xfrm>
+            <a:off x="3294231" y="2750820"/>
+            <a:ext cx="723275" cy="230832"/>
+          </a:xfrm>
+          <a:prstGeom prst="rect">
+            <a:avLst/>
+          </a:prstGeom>
+          <a:noFill/>
+        </p:spPr>
+        <p:txBody>
+          <a:bodyPr wrap="none" rtlCol="0">
+            <a:spAutoFit/>
+          </a:bodyPr>
+          <a:lstStyle/>
+          <a:p>
+            <a:r>
+              <a:rPr lang="de-CH" sz="900" b="1" dirty="0" smtClean="0">
+                <a:solidFill>
+                  <a:srgbClr val="FF0000"/>
+                </a:solidFill>
+                <a:effectLst>
+                  <a:outerShdw blurRad="50800" dist="38100" dir="5400000" algn="t" rotWithShape="0">
+                    <a:prstClr val="black">
+                      <a:alpha val="40000"/>
+                    </a:prstClr>
+                  </a:outerShdw>
+                </a:effectLst>
+              </a:rPr>
+              <a:t>700 PS, 4x4</a:t>
+            </a:r>
+            <a:endParaRPr lang="en-US" sz="900" b="1" dirty="0">
+              <a:solidFill>
+                <a:srgbClr val="FF0000"/>
+              </a:solidFill>
+              <a:effectLst>
+                <a:outerShdw blurRad="50800" dist="38100" dir="5400000" algn="t" rotWithShape="0">
+                  <a:prstClr val="black">
+                    <a:alpha val="40000"/>
+                  </a:prstClr>
+                </a:outerShdw>
+              </a:effectLst>
+            </a:endParaRPr>
+          </a:p>
+        </p:txBody>
+      </p:sp>
+      <p:pic>
+        <p:nvPicPr>
+          <p:cNvPr id="1027" name="Picture 3"/>
+          <p:cNvPicPr>
+            <a:picLocks noChangeAspect="1" noChangeArrowheads="1"/>
+          </p:cNvPicPr>
+          <p:nvPr/>
+        </p:nvPicPr>
+        <p:blipFill>
+          <a:blip r:embed="rId13">
+            <a:extLst>
+              <a:ext uri="{28A0092B-C50C-407E-A947-70E740481C1C}">
+                <a14:useLocalDpi xmlns:a14="http://schemas.microsoft.com/office/drawing/2010/main" val="0"/>
+              </a:ext>
+            </a:extLst>
+          </a:blip>
+          <a:srcRect/>
+          <a:stretch>
+            <a:fillRect/>
+          </a:stretch>
+        </p:blipFill>
+        <p:spPr bwMode="auto">
+          <a:xfrm>
+            <a:off x="1231927" y="5316619"/>
+            <a:ext cx="3020033" cy="1473087"/>
+          </a:xfrm>
+          <a:prstGeom prst="rect">
+            <a:avLst/>
+          </a:prstGeom>
+          <a:noFill/>
+          <a:ln>
+            <a:noFill/>
+          </a:ln>
+          <a:extLst>
+            <a:ext uri="{909E8E84-426E-40DD-AFC4-6F175D3DCCD1}">
+              <a14:hiddenFill xmlns:a14="http://schemas.microsoft.com/office/drawing/2010/main">
+                <a:solidFill>
+                  <a:schemeClr val="accent1"/>
+                </a:solidFill>
+              </a14:hiddenFill>
+            </a:ext>
+            <a:ext uri="{91240B29-F687-4F45-9708-019B960494DF}">
+              <a14:hiddenLine xmlns:a14="http://schemas.microsoft.com/office/drawing/2010/main" w="9525">
+                <a:solidFill>
+                  <a:schemeClr val="tx1"/>
+                </a:solidFill>
+                <a:miter lim="800000"/>
+                <a:headEnd/>
+                <a:tailEnd/>
+              </a14:hiddenLine>
+            </a:ext>
+          </a:extLst>
+        </p:spPr>
+      </p:pic>
     </p:spTree>
   </p:cSld>
   <p:clrMapOvr>

</xml_diff>

<commit_message>
update S70D and make handout less technical. highlight supercharger network.
</commit_message>
<xml_diff>
--- a/tesla_model_s_handout_chf.pptx
+++ b/tesla_model_s_handout_chf.pptx
@@ -290,7 +290,7 @@
             <a:fld id="{63BB9708-3311-2149-A02D-BFA98F482279}" type="datetimeFigureOut">
               <a:rPr lang="de-DE" smtClean="0"/>
               <a:pPr/>
-              <a:t>08.12.2014</a:t>
+              <a:t>15.04.2015</a:t>
             </a:fld>
             <a:endParaRPr lang="de-DE"/>
           </a:p>
@@ -457,7 +457,7 @@
             <a:fld id="{63BB9708-3311-2149-A02D-BFA98F482279}" type="datetimeFigureOut">
               <a:rPr lang="de-DE" smtClean="0"/>
               <a:pPr/>
-              <a:t>08.12.2014</a:t>
+              <a:t>15.04.2015</a:t>
             </a:fld>
             <a:endParaRPr lang="de-DE"/>
           </a:p>
@@ -634,7 +634,7 @@
             <a:fld id="{63BB9708-3311-2149-A02D-BFA98F482279}" type="datetimeFigureOut">
               <a:rPr lang="de-DE" smtClean="0"/>
               <a:pPr/>
-              <a:t>08.12.2014</a:t>
+              <a:t>15.04.2015</a:t>
             </a:fld>
             <a:endParaRPr lang="de-DE"/>
           </a:p>
@@ -801,7 +801,7 @@
             <a:fld id="{63BB9708-3311-2149-A02D-BFA98F482279}" type="datetimeFigureOut">
               <a:rPr lang="de-DE" smtClean="0"/>
               <a:pPr/>
-              <a:t>08.12.2014</a:t>
+              <a:t>15.04.2015</a:t>
             </a:fld>
             <a:endParaRPr lang="de-DE"/>
           </a:p>
@@ -1044,7 +1044,7 @@
             <a:fld id="{63BB9708-3311-2149-A02D-BFA98F482279}" type="datetimeFigureOut">
               <a:rPr lang="de-DE" smtClean="0"/>
               <a:pPr/>
-              <a:t>08.12.2014</a:t>
+              <a:t>15.04.2015</a:t>
             </a:fld>
             <a:endParaRPr lang="de-DE"/>
           </a:p>
@@ -1329,7 +1329,7 @@
             <a:fld id="{63BB9708-3311-2149-A02D-BFA98F482279}" type="datetimeFigureOut">
               <a:rPr lang="de-DE" smtClean="0"/>
               <a:pPr/>
-              <a:t>08.12.2014</a:t>
+              <a:t>15.04.2015</a:t>
             </a:fld>
             <a:endParaRPr lang="de-DE"/>
           </a:p>
@@ -1748,7 +1748,7 @@
             <a:fld id="{63BB9708-3311-2149-A02D-BFA98F482279}" type="datetimeFigureOut">
               <a:rPr lang="de-DE" smtClean="0"/>
               <a:pPr/>
-              <a:t>08.12.2014</a:t>
+              <a:t>15.04.2015</a:t>
             </a:fld>
             <a:endParaRPr lang="de-DE"/>
           </a:p>
@@ -1863,7 +1863,7 @@
             <a:fld id="{63BB9708-3311-2149-A02D-BFA98F482279}" type="datetimeFigureOut">
               <a:rPr lang="de-DE" smtClean="0"/>
               <a:pPr/>
-              <a:t>08.12.2014</a:t>
+              <a:t>15.04.2015</a:t>
             </a:fld>
             <a:endParaRPr lang="de-DE"/>
           </a:p>
@@ -1955,7 +1955,7 @@
             <a:fld id="{63BB9708-3311-2149-A02D-BFA98F482279}" type="datetimeFigureOut">
               <a:rPr lang="de-DE" smtClean="0"/>
               <a:pPr/>
-              <a:t>08.12.2014</a:t>
+              <a:t>15.04.2015</a:t>
             </a:fld>
             <a:endParaRPr lang="de-DE"/>
           </a:p>
@@ -2229,7 +2229,7 @@
             <a:fld id="{63BB9708-3311-2149-A02D-BFA98F482279}" type="datetimeFigureOut">
               <a:rPr lang="de-DE" smtClean="0"/>
               <a:pPr/>
-              <a:t>08.12.2014</a:t>
+              <a:t>15.04.2015</a:t>
             </a:fld>
             <a:endParaRPr lang="de-DE"/>
           </a:p>
@@ -2479,7 +2479,7 @@
             <a:fld id="{63BB9708-3311-2149-A02D-BFA98F482279}" type="datetimeFigureOut">
               <a:rPr lang="de-DE" smtClean="0"/>
               <a:pPr/>
-              <a:t>08.12.2014</a:t>
+              <a:t>15.04.2015</a:t>
             </a:fld>
             <a:endParaRPr lang="de-DE"/>
           </a:p>
@@ -2689,7 +2689,7 @@
             <a:fld id="{63BB9708-3311-2149-A02D-BFA98F482279}" type="datetimeFigureOut">
               <a:rPr lang="de-DE" smtClean="0"/>
               <a:pPr/>
-              <a:t>08.12.2014</a:t>
+              <a:t>15.04.2015</a:t>
             </a:fld>
             <a:endParaRPr lang="de-DE"/>
           </a:p>
@@ -3062,6 +3062,53 @@
       </p:grpSpPr>
       <p:sp>
         <p:nvSpPr>
+          <p:cNvPr id="2" name="Rechteck 1"/>
+          <p:cNvSpPr/>
+          <p:nvPr/>
+        </p:nvSpPr>
+        <p:spPr>
+          <a:xfrm>
+            <a:off x="6843653" y="0"/>
+            <a:ext cx="3062347" cy="2296479"/>
+          </a:xfrm>
+          <a:prstGeom prst="rect">
+            <a:avLst/>
+          </a:prstGeom>
+          <a:solidFill>
+            <a:schemeClr val="bg1">
+              <a:lumMod val="75000"/>
+            </a:schemeClr>
+          </a:solidFill>
+          <a:ln>
+            <a:noFill/>
+          </a:ln>
+          <a:effectLst/>
+        </p:spPr>
+        <p:style>
+          <a:lnRef idx="1">
+            <a:schemeClr val="accent1"/>
+          </a:lnRef>
+          <a:fillRef idx="3">
+            <a:schemeClr val="accent1"/>
+          </a:fillRef>
+          <a:effectRef idx="2">
+            <a:schemeClr val="accent1"/>
+          </a:effectRef>
+          <a:fontRef idx="minor">
+            <a:schemeClr val="lt1"/>
+          </a:fontRef>
+        </p:style>
+        <p:txBody>
+          <a:bodyPr rtlCol="0" anchor="ctr"/>
+          <a:lstStyle/>
+          <a:p>
+            <a:pPr algn="ctr"/>
+            <a:endParaRPr lang="en-US"/>
+          </a:p>
+        </p:txBody>
+      </p:sp>
+      <p:sp>
+        <p:nvSpPr>
           <p:cNvPr id="17" name="Rechteck 16"/>
           <p:cNvSpPr/>
           <p:nvPr/>
@@ -3109,82 +3156,6 @@
       </p:sp>
       <p:pic>
         <p:nvPicPr>
-          <p:cNvPr id="11" name="Grafik 10"/>
-          <p:cNvPicPr>
-            <a:picLocks noChangeAspect="1"/>
-          </p:cNvPicPr>
-          <p:nvPr/>
-        </p:nvPicPr>
-        <p:blipFill rotWithShape="1">
-          <a:blip r:embed="rId2">
-            <a:extLst>
-              <a:ext uri="{28A0092B-C50C-407E-A947-70E740481C1C}">
-                <a14:useLocalDpi xmlns:a14="http://schemas.microsoft.com/office/drawing/2010/main" val="0"/>
-              </a:ext>
-            </a:extLst>
-          </a:blip>
-          <a:srcRect l="2993"/>
-          <a:stretch/>
-        </p:blipFill>
-        <p:spPr>
-          <a:xfrm>
-            <a:off x="0" y="2167890"/>
-            <a:ext cx="4395166" cy="3356610"/>
-          </a:xfrm>
-          <a:prstGeom prst="rect">
-            <a:avLst/>
-          </a:prstGeom>
-        </p:spPr>
-      </p:pic>
-      <p:sp>
-        <p:nvSpPr>
-          <p:cNvPr id="2" name="Rechteck 1"/>
-          <p:cNvSpPr/>
-          <p:nvPr/>
-        </p:nvSpPr>
-        <p:spPr>
-          <a:xfrm>
-            <a:off x="6843653" y="-61912"/>
-            <a:ext cx="3062347" cy="2358391"/>
-          </a:xfrm>
-          <a:prstGeom prst="rect">
-            <a:avLst/>
-          </a:prstGeom>
-          <a:solidFill>
-            <a:schemeClr val="bg1">
-              <a:lumMod val="75000"/>
-            </a:schemeClr>
-          </a:solidFill>
-          <a:ln>
-            <a:noFill/>
-          </a:ln>
-          <a:effectLst/>
-        </p:spPr>
-        <p:style>
-          <a:lnRef idx="1">
-            <a:schemeClr val="accent1"/>
-          </a:lnRef>
-          <a:fillRef idx="3">
-            <a:schemeClr val="accent1"/>
-          </a:fillRef>
-          <a:effectRef idx="2">
-            <a:schemeClr val="accent1"/>
-          </a:effectRef>
-          <a:fontRef idx="minor">
-            <a:schemeClr val="lt1"/>
-          </a:fontRef>
-        </p:style>
-        <p:txBody>
-          <a:bodyPr rtlCol="0" anchor="ctr"/>
-          <a:lstStyle/>
-          <a:p>
-            <a:pPr algn="ctr"/>
-            <a:endParaRPr lang="en-US"/>
-          </a:p>
-        </p:txBody>
-      </p:sp>
-      <p:pic>
-        <p:nvPicPr>
           <p:cNvPr id="3" name="Grafik 2"/>
           <p:cNvPicPr>
             <a:picLocks noChangeAspect="1"/>
@@ -3192,7 +3163,7 @@
           <p:nvPr/>
         </p:nvPicPr>
         <p:blipFill rotWithShape="1">
-          <a:blip r:embed="rId3" cstate="print">
+          <a:blip r:embed="rId2" cstate="print">
             <a:extLst>
               <a:ext uri="{28A0092B-C50C-407E-A947-70E740481C1C}">
                 <a14:useLocalDpi xmlns:a14="http://schemas.microsoft.com/office/drawing/2010/main"/>
@@ -3212,6 +3183,60 @@
           </a:prstGeom>
         </p:spPr>
       </p:pic>
+      <p:pic>
+        <p:nvPicPr>
+          <p:cNvPr id="8" name="Picture 2"/>
+          <p:cNvPicPr>
+            <a:picLocks noChangeAspect="1" noChangeArrowheads="1"/>
+          </p:cNvPicPr>
+          <p:nvPr/>
+        </p:nvPicPr>
+        <p:blipFill>
+          <a:blip r:embed="rId3">
+            <a:extLst>
+              <a:ext uri="{28A0092B-C50C-407E-A947-70E740481C1C}">
+                <a14:useLocalDpi xmlns:a14="http://schemas.microsoft.com/office/drawing/2010/main"/>
+              </a:ext>
+            </a:extLst>
+          </a:blip>
+          <a:srcRect/>
+          <a:stretch>
+            <a:fillRect/>
+          </a:stretch>
+        </p:blipFill>
+        <p:spPr bwMode="auto">
+          <a:xfrm>
+            <a:off x="-9889" y="2225317"/>
+            <a:ext cx="4528748" cy="2886177"/>
+          </a:xfrm>
+          <a:prstGeom prst="rect">
+            <a:avLst/>
+          </a:prstGeom>
+          <a:noFill/>
+          <a:ln>
+            <a:noFill/>
+          </a:ln>
+          <a:extLst>
+            <a:ext uri="{909E8E84-426E-40DD-AFC4-6F175D3DCCD1}">
+              <a14:hiddenFill xmlns:a14="http://schemas.microsoft.com/office/drawing/2010/main">
+                <a:solidFill>
+                  <a:schemeClr val="accent1"/>
+                </a:solidFill>
+              </a14:hiddenFill>
+            </a:ext>
+            <a:ext uri="{91240B29-F687-4F45-9708-019B960494DF}">
+              <a14:hiddenLine xmlns:a14="http://schemas.microsoft.com/office/drawing/2010/main" w="9525">
+                <a:solidFill>
+                  <a:schemeClr val="tx1"/>
+                </a:solidFill>
+                <a:miter lim="800000"/>
+                <a:headEnd/>
+                <a:tailEnd/>
+              </a14:hiddenLine>
+            </a:ext>
+          </a:extLst>
+        </p:spPr>
+      </p:pic>
       <p:sp>
         <p:nvSpPr>
           <p:cNvPr id="22" name="Rechteck 21"/>
@@ -3220,8 +3245,8 @@
         </p:nvSpPr>
         <p:spPr>
           <a:xfrm>
-            <a:off x="8467725" y="1392208"/>
-            <a:ext cx="1427957" cy="5476631"/>
+            <a:off x="8512258" y="1392208"/>
+            <a:ext cx="1401712" cy="5476631"/>
           </a:xfrm>
           <a:prstGeom prst="rect">
             <a:avLst/>
@@ -3265,8 +3290,8 @@
         </p:nvSpPr>
         <p:spPr>
           <a:xfrm>
-            <a:off x="7038975" y="-61913"/>
-            <a:ext cx="2867025" cy="2229803"/>
+            <a:off x="7124148" y="0"/>
+            <a:ext cx="2781852" cy="2167890"/>
           </a:xfrm>
           <a:prstGeom prst="rect">
             <a:avLst/>
@@ -3323,8 +3348,8 @@
         </p:blipFill>
         <p:spPr bwMode="auto">
           <a:xfrm>
-            <a:off x="0" y="5263738"/>
-            <a:ext cx="4384167" cy="1586664"/>
+            <a:off x="0" y="5111494"/>
+            <a:ext cx="4518859" cy="1738907"/>
           </a:xfrm>
           <a:prstGeom prst="rect">
             <a:avLst/>
@@ -3352,7 +3377,7 @@
         </p:nvSpPr>
         <p:spPr>
           <a:xfrm>
-            <a:off x="4555680" y="2209800"/>
+            <a:off x="4612830" y="2209800"/>
             <a:ext cx="3675984" cy="4649666"/>
           </a:xfrm>
           <a:prstGeom prst="rect">
@@ -3393,9 +3418,56 @@
           </a:p>
         </p:txBody>
       </p:sp>
+      <p:sp>
+        <p:nvSpPr>
+          <p:cNvPr id="14" name="TextBox 10"/>
+          <p:cNvSpPr txBox="1"/>
+          <p:nvPr/>
+        </p:nvSpPr>
+        <p:spPr>
+          <a:xfrm>
+            <a:off x="0" y="5289187"/>
+            <a:ext cx="1231927" cy="846386"/>
+          </a:xfrm>
+          <a:prstGeom prst="rect">
+            <a:avLst/>
+          </a:prstGeom>
+          <a:noFill/>
+        </p:spPr>
+        <p:txBody>
+          <a:bodyPr wrap="square" rtlCol="0">
+            <a:spAutoFit/>
+          </a:bodyPr>
+          <a:lstStyle/>
+          <a:p>
+            <a:r>
+              <a:rPr lang="de-DE" sz="700" i="1" dirty="0" smtClean="0">
+                <a:solidFill>
+                  <a:srgbClr val="800000"/>
+                </a:solidFill>
+              </a:rPr>
+              <a:t>Die Gesamtkosten bei einem Abschreibungszeitraum von 8 Jahren sind vergleichbar mit Benzinern aus der oberen Mittelklasse</a:t>
+            </a:r>
+          </a:p>
+          <a:p>
+            <a:endParaRPr lang="de-DE" sz="700" i="1" dirty="0" smtClean="0">
+              <a:solidFill>
+                <a:srgbClr val="800000"/>
+              </a:solidFill>
+            </a:endParaRPr>
+          </a:p>
+          <a:p>
+            <a:endParaRPr lang="de-DE" sz="700" i="1" dirty="0">
+              <a:solidFill>
+                <a:srgbClr val="800000"/>
+              </a:solidFill>
+            </a:endParaRPr>
+          </a:p>
+        </p:txBody>
+      </p:sp>
       <p:pic>
         <p:nvPicPr>
-          <p:cNvPr id="6" name="Picture 5"/>
+          <p:cNvPr id="15" name="Picture 19" descr="model-s-app.jpg"/>
           <p:cNvPicPr>
             <a:picLocks noChangeAspect="1"/>
           </p:cNvPicPr>
@@ -3414,218 +3486,12 @@
         </p:blipFill>
         <p:spPr>
           <a:xfrm>
-            <a:off x="4940300" y="3844437"/>
-            <a:ext cx="3234870" cy="2838603"/>
+            <a:off x="8545672" y="2167890"/>
+            <a:ext cx="1337309" cy="2173313"/>
           </a:xfrm>
           <a:prstGeom prst="rect">
             <a:avLst/>
           </a:prstGeom>
-        </p:spPr>
-      </p:pic>
-      <p:pic>
-        <p:nvPicPr>
-          <p:cNvPr id="4" name="Grafik 3"/>
-          <p:cNvPicPr>
-            <a:picLocks noChangeAspect="1"/>
-          </p:cNvPicPr>
-          <p:nvPr/>
-        </p:nvPicPr>
-        <p:blipFill rotWithShape="1">
-          <a:blip r:embed="rId6" cstate="print">
-            <a:extLst>
-              <a:ext uri="{28A0092B-C50C-407E-A947-70E740481C1C}">
-                <a14:useLocalDpi xmlns:a14="http://schemas.microsoft.com/office/drawing/2010/main"/>
-              </a:ext>
-            </a:extLst>
-          </a:blip>
-          <a:srcRect l="-485"/>
-          <a:stretch/>
-        </p:blipFill>
-        <p:spPr>
-          <a:xfrm>
-            <a:off x="4616450" y="2291715"/>
-            <a:ext cx="3509841" cy="1904220"/>
-          </a:xfrm>
-          <a:prstGeom prst="rect">
-            <a:avLst/>
-          </a:prstGeom>
-        </p:spPr>
-      </p:pic>
-      <p:pic>
-        <p:nvPicPr>
-          <p:cNvPr id="20" name="Picture 19" descr="model-s-app.jpg"/>
-          <p:cNvPicPr>
-            <a:picLocks noChangeAspect="1"/>
-          </p:cNvPicPr>
-          <p:nvPr/>
-        </p:nvPicPr>
-        <p:blipFill rotWithShape="1">
-          <a:blip r:embed="rId7" cstate="print">
-            <a:extLst>
-              <a:ext uri="{28A0092B-C50C-407E-A947-70E740481C1C}">
-                <a14:useLocalDpi xmlns:a14="http://schemas.microsoft.com/office/drawing/2010/main"/>
-              </a:ext>
-            </a:extLst>
-          </a:blip>
-          <a:srcRect/>
-          <a:stretch/>
-        </p:blipFill>
-        <p:spPr>
-          <a:xfrm>
-            <a:off x="7115175" y="-20379"/>
-            <a:ext cx="2790825" cy="2139663"/>
-          </a:xfrm>
-          <a:prstGeom prst="rect">
-            <a:avLst/>
-          </a:prstGeom>
-        </p:spPr>
-      </p:pic>
-      <p:sp>
-        <p:nvSpPr>
-          <p:cNvPr id="14" name="TextBox 10"/>
-          <p:cNvSpPr txBox="1"/>
-          <p:nvPr/>
-        </p:nvSpPr>
-        <p:spPr>
-          <a:xfrm>
-            <a:off x="0" y="5289187"/>
-            <a:ext cx="1318196" cy="846386"/>
-          </a:xfrm>
-          <a:prstGeom prst="rect">
-            <a:avLst/>
-          </a:prstGeom>
-          <a:noFill/>
-        </p:spPr>
-        <p:txBody>
-          <a:bodyPr wrap="square" rtlCol="0">
-            <a:spAutoFit/>
-          </a:bodyPr>
-          <a:lstStyle/>
-          <a:p>
-            <a:r>
-              <a:rPr lang="de-DE" sz="700" i="1" dirty="0" smtClean="0">
-                <a:solidFill>
-                  <a:srgbClr val="800000"/>
-                </a:solidFill>
-              </a:rPr>
-              <a:t>Die Gesamtkosten bei einem Abschreibungszeitraum von 8 Jahren sind vergleichbar mit Benzinern aus der oberen Mittelklasse</a:t>
-            </a:r>
-          </a:p>
-          <a:p>
-            <a:endParaRPr lang="de-DE" sz="700" i="1" dirty="0" smtClean="0">
-              <a:solidFill>
-                <a:srgbClr val="800000"/>
-              </a:solidFill>
-            </a:endParaRPr>
-          </a:p>
-          <a:p>
-            <a:endParaRPr lang="de-DE" sz="700" i="1" dirty="0">
-              <a:solidFill>
-                <a:srgbClr val="800000"/>
-              </a:solidFill>
-            </a:endParaRPr>
-          </a:p>
-        </p:txBody>
-      </p:sp>
-      <p:pic>
-        <p:nvPicPr>
-          <p:cNvPr id="19" name="Picture 18" descr="model-s-app.jpg"/>
-          <p:cNvPicPr>
-            <a:picLocks noChangeAspect="1"/>
-          </p:cNvPicPr>
-          <p:nvPr/>
-        </p:nvPicPr>
-        <p:blipFill>
-          <a:blip r:embed="rId8" cstate="print">
-            <a:extLst>
-              <a:ext uri="{28A0092B-C50C-407E-A947-70E740481C1C}">
-                <a14:useLocalDpi xmlns:a14="http://schemas.microsoft.com/office/drawing/2010/main"/>
-              </a:ext>
-            </a:extLst>
-          </a:blip>
-          <a:srcRect/>
-          <a:stretch>
-            <a:fillRect/>
-          </a:stretch>
-        </p:blipFill>
-        <p:spPr>
-          <a:xfrm>
-            <a:off x="8521758" y="4509965"/>
-            <a:ext cx="1330569" cy="2283287"/>
-          </a:xfrm>
-          <a:prstGeom prst="rect">
-            <a:avLst/>
-          </a:prstGeom>
-        </p:spPr>
-      </p:pic>
-      <p:pic>
-        <p:nvPicPr>
-          <p:cNvPr id="15" name="Picture 19" descr="model-s-app.jpg"/>
-          <p:cNvPicPr>
-            <a:picLocks noChangeAspect="1"/>
-          </p:cNvPicPr>
-          <p:nvPr/>
-        </p:nvPicPr>
-        <p:blipFill rotWithShape="1">
-          <a:blip r:embed="rId9" cstate="print">
-            <a:extLst>
-              <a:ext uri="{28A0092B-C50C-407E-A947-70E740481C1C}">
-                <a14:useLocalDpi xmlns:a14="http://schemas.microsoft.com/office/drawing/2010/main"/>
-              </a:ext>
-            </a:extLst>
-          </a:blip>
-          <a:srcRect/>
-          <a:stretch/>
-        </p:blipFill>
-        <p:spPr>
-          <a:xfrm>
-            <a:off x="8512258" y="2167890"/>
-            <a:ext cx="1338889" cy="2178419"/>
-          </a:xfrm>
-          <a:prstGeom prst="rect">
-            <a:avLst/>
-          </a:prstGeom>
-        </p:spPr>
-      </p:pic>
-      <p:pic>
-        <p:nvPicPr>
-          <p:cNvPr id="9" name="Grafik 8"/>
-          <p:cNvPicPr>
-            <a:picLocks noChangeAspect="1"/>
-          </p:cNvPicPr>
-          <p:nvPr/>
-        </p:nvPicPr>
-        <p:blipFill rotWithShape="1">
-          <a:blip r:embed="rId10" cstate="print">
-            <a:extLst>
-              <a:ext uri="{28A0092B-C50C-407E-A947-70E740481C1C}">
-                <a14:useLocalDpi xmlns:a14="http://schemas.microsoft.com/office/drawing/2010/main"/>
-              </a:ext>
-            </a:extLst>
-          </a:blip>
-          <a:srcRect/>
-          <a:stretch/>
-        </p:blipFill>
-        <p:spPr>
-          <a:xfrm>
-            <a:off x="8375717" y="3694105"/>
-            <a:ext cx="1189253" cy="970537"/>
-          </a:xfrm>
-          <a:prstGeom prst="rect">
-            <a:avLst/>
-          </a:prstGeom>
-          <a:ln>
-            <a:solidFill>
-              <a:schemeClr val="bg1"/>
-            </a:solidFill>
-          </a:ln>
-          <a:effectLst>
-            <a:outerShdw blurRad="292100" dist="139700" dir="2700000" algn="tl" rotWithShape="0">
-              <a:srgbClr val="333333">
-                <a:alpha val="65000"/>
-              </a:srgbClr>
-            </a:outerShdw>
-          </a:effectLst>
         </p:spPr>
       </p:pic>
       <p:graphicFrame>
@@ -3637,7 +3503,7 @@
           <p:nvPr>
             <p:extLst>
               <p:ext uri="{D42A27DB-BD31-4B8C-83A1-F6EECF244321}">
-                <p14:modId xmlns:p14="http://schemas.microsoft.com/office/powerpoint/2010/main" val="2830518534"/>
+                <p14:modId xmlns:p14="http://schemas.microsoft.com/office/powerpoint/2010/main" val="3670314876"/>
               </p:ext>
             </p:extLst>
           </p:nvPr>
@@ -3666,9 +3532,7 @@
                       <a:r>
                         <a:rPr lang="en-US" sz="600" i="1" u="none" strike="noStrike" dirty="0">
                           <a:solidFill>
-                            <a:schemeClr val="bg1">
-                              <a:lumMod val="65000"/>
-                            </a:schemeClr>
+                            <a:schemeClr val="tx1"/>
                           </a:solidFill>
                           <a:effectLst/>
                         </a:rPr>
@@ -3676,9 +3540,7 @@
                       </a:r>
                       <a:endParaRPr lang="en-US" sz="600" b="0" i="1" u="none" strike="noStrike" dirty="0">
                         <a:solidFill>
-                          <a:schemeClr val="bg1">
-                            <a:lumMod val="65000"/>
-                          </a:schemeClr>
+                          <a:schemeClr val="tx1"/>
                         </a:solidFill>
                         <a:effectLst/>
                         <a:latin typeface="Verdana"/>
@@ -3698,9 +3560,7 @@
                       <a:r>
                         <a:rPr lang="en-US" sz="600" i="1" u="none" strike="noStrike">
                           <a:solidFill>
-                            <a:schemeClr val="bg1">
-                              <a:lumMod val="65000"/>
-                            </a:schemeClr>
+                            <a:schemeClr val="tx1"/>
                           </a:solidFill>
                           <a:effectLst/>
                         </a:rPr>
@@ -3708,9 +3568,7 @@
                       </a:r>
                       <a:endParaRPr lang="en-US" sz="600" b="0" i="1" u="none" strike="noStrike">
                         <a:solidFill>
-                          <a:schemeClr val="bg1">
-                            <a:lumMod val="65000"/>
-                          </a:schemeClr>
+                          <a:schemeClr val="tx1"/>
                         </a:solidFill>
                         <a:effectLst/>
                         <a:latin typeface="Verdana"/>
@@ -3732,9 +3590,7 @@
                       <a:r>
                         <a:rPr lang="en-US" sz="600" i="1" u="none" strike="noStrike" dirty="0">
                           <a:solidFill>
-                            <a:schemeClr val="bg1">
-                              <a:lumMod val="65000"/>
-                            </a:schemeClr>
+                            <a:schemeClr val="tx1"/>
                           </a:solidFill>
                           <a:effectLst/>
                         </a:rPr>
@@ -3742,9 +3598,7 @@
                       </a:r>
                       <a:endParaRPr lang="en-US" sz="600" b="0" i="1" u="none" strike="noStrike" dirty="0">
                         <a:solidFill>
-                          <a:schemeClr val="bg1">
-                            <a:lumMod val="65000"/>
-                          </a:schemeClr>
+                          <a:schemeClr val="tx1"/>
                         </a:solidFill>
                         <a:effectLst/>
                         <a:latin typeface="Verdana"/>
@@ -3764,9 +3618,7 @@
                       <a:r>
                         <a:rPr lang="en-US" sz="600" i="1" u="none" strike="noStrike">
                           <a:solidFill>
-                            <a:schemeClr val="bg1">
-                              <a:lumMod val="65000"/>
-                            </a:schemeClr>
+                            <a:schemeClr val="tx1"/>
                           </a:solidFill>
                           <a:effectLst/>
                         </a:rPr>
@@ -3774,9 +3626,7 @@
                       </a:r>
                       <a:endParaRPr lang="en-US" sz="600" b="0" i="1" u="none" strike="noStrike">
                         <a:solidFill>
-                          <a:schemeClr val="bg1">
-                            <a:lumMod val="65000"/>
-                          </a:schemeClr>
+                          <a:schemeClr val="tx1"/>
                         </a:solidFill>
                         <a:effectLst/>
                         <a:latin typeface="Verdana"/>
@@ -3798,9 +3648,7 @@
                       <a:r>
                         <a:rPr lang="en-US" sz="600" i="1" u="none" strike="noStrike">
                           <a:solidFill>
-                            <a:schemeClr val="bg1">
-                              <a:lumMod val="65000"/>
-                            </a:schemeClr>
+                            <a:schemeClr val="tx1"/>
                           </a:solidFill>
                           <a:effectLst/>
                         </a:rPr>
@@ -3808,9 +3656,7 @@
                       </a:r>
                       <a:endParaRPr lang="en-US" sz="600" b="0" i="1" u="none" strike="noStrike">
                         <a:solidFill>
-                          <a:schemeClr val="bg1">
-                            <a:lumMod val="65000"/>
-                          </a:schemeClr>
+                          <a:schemeClr val="tx1"/>
                         </a:solidFill>
                         <a:effectLst/>
                         <a:latin typeface="Verdana"/>
@@ -3828,21 +3674,17 @@
                     <a:p>
                       <a:pPr algn="l" fontAlgn="b"/>
                       <a:r>
-                        <a:rPr lang="en-US" sz="600" i="1" u="none" strike="noStrike">
+                        <a:rPr lang="en-US" sz="600" i="1" u="none" strike="noStrike" dirty="0">
                           <a:solidFill>
-                            <a:schemeClr val="bg1">
-                              <a:lumMod val="65000"/>
-                            </a:schemeClr>
+                            <a:schemeClr val="tx1"/>
                           </a:solidFill>
                           <a:effectLst/>
                         </a:rPr>
                         <a:t>Fr. pro liter</a:t>
                       </a:r>
-                      <a:endParaRPr lang="en-US" sz="600" b="0" i="1" u="none" strike="noStrike">
+                      <a:endParaRPr lang="en-US" sz="600" b="0" i="1" u="none" strike="noStrike" dirty="0">
                         <a:solidFill>
-                          <a:schemeClr val="bg1">
-                            <a:lumMod val="65000"/>
-                          </a:schemeClr>
+                          <a:schemeClr val="tx1"/>
                         </a:solidFill>
                         <a:effectLst/>
                         <a:latin typeface="Verdana"/>
@@ -3864,9 +3706,7 @@
                       <a:r>
                         <a:rPr lang="en-US" sz="600" i="1" u="none" strike="noStrike">
                           <a:solidFill>
-                            <a:schemeClr val="bg1">
-                              <a:lumMod val="65000"/>
-                            </a:schemeClr>
+                            <a:schemeClr val="tx1"/>
                           </a:solidFill>
                           <a:effectLst/>
                         </a:rPr>
@@ -3874,9 +3714,7 @@
                       </a:r>
                       <a:endParaRPr lang="en-US" sz="600" b="0" i="1" u="none" strike="noStrike">
                         <a:solidFill>
-                          <a:schemeClr val="bg1">
-                            <a:lumMod val="65000"/>
-                          </a:schemeClr>
+                          <a:schemeClr val="tx1"/>
                         </a:solidFill>
                         <a:effectLst/>
                         <a:latin typeface="Verdana"/>
@@ -3896,9 +3734,7 @@
                       <a:r>
                         <a:rPr lang="en-US" sz="600" i="1" u="none" strike="noStrike" dirty="0">
                           <a:solidFill>
-                            <a:schemeClr val="bg1">
-                              <a:lumMod val="65000"/>
-                            </a:schemeClr>
+                            <a:schemeClr val="tx1"/>
                           </a:solidFill>
                           <a:effectLst/>
                         </a:rPr>
@@ -3906,9 +3742,7 @@
                       </a:r>
                       <a:endParaRPr lang="en-US" sz="600" b="0" i="1" u="none" strike="noStrike" dirty="0">
                         <a:solidFill>
-                          <a:schemeClr val="bg1">
-                            <a:lumMod val="65000"/>
-                          </a:schemeClr>
+                          <a:schemeClr val="tx1"/>
                         </a:solidFill>
                         <a:effectLst/>
                         <a:latin typeface="Verdana"/>
@@ -3929,9 +3763,7 @@
                       <a:pPr algn="l" fontAlgn="b"/>
                       <a:endParaRPr lang="en-US" sz="600" b="0" i="1" u="none" strike="noStrike">
                         <a:solidFill>
-                          <a:schemeClr val="bg1">
-                            <a:lumMod val="65000"/>
-                          </a:schemeClr>
+                          <a:schemeClr val="tx1"/>
                         </a:solidFill>
                         <a:effectLst/>
                         <a:latin typeface="Verdana"/>
@@ -3950,9 +3782,7 @@
                       <a:pPr algn="l" fontAlgn="b"/>
                       <a:endParaRPr lang="en-US" sz="600" b="0" i="1" u="none" strike="noStrike" dirty="0">
                         <a:solidFill>
-                          <a:schemeClr val="bg1">
-                            <a:lumMod val="65000"/>
-                          </a:schemeClr>
+                          <a:schemeClr val="tx1"/>
                         </a:solidFill>
                         <a:effectLst/>
                         <a:latin typeface="Verdana"/>
@@ -3974,9 +3804,7 @@
                       <a:r>
                         <a:rPr lang="en-US" sz="600" i="1" u="none" strike="noStrike">
                           <a:solidFill>
-                            <a:schemeClr val="bg1">
-                              <a:lumMod val="65000"/>
-                            </a:schemeClr>
+                            <a:schemeClr val="tx1"/>
                           </a:solidFill>
                           <a:effectLst/>
                         </a:rPr>
@@ -3984,9 +3812,7 @@
                       </a:r>
                       <a:endParaRPr lang="en-US" sz="600" b="0" i="1" u="none" strike="noStrike">
                         <a:solidFill>
-                          <a:schemeClr val="bg1">
-                            <a:lumMod val="65000"/>
-                          </a:schemeClr>
+                          <a:schemeClr val="tx1"/>
                         </a:solidFill>
                         <a:effectLst/>
                         <a:latin typeface="Verdana"/>
@@ -4006,9 +3832,7 @@
                       <a:r>
                         <a:rPr lang="en-US" sz="600" i="1" u="none" strike="noStrike">
                           <a:solidFill>
-                            <a:schemeClr val="bg1">
-                              <a:lumMod val="65000"/>
-                            </a:schemeClr>
+                            <a:schemeClr val="tx1"/>
                           </a:solidFill>
                           <a:effectLst/>
                         </a:rPr>
@@ -4016,9 +3840,7 @@
                       </a:r>
                       <a:endParaRPr lang="en-US" sz="600" b="0" i="1" u="none" strike="noStrike">
                         <a:solidFill>
-                          <a:schemeClr val="bg1">
-                            <a:lumMod val="65000"/>
-                          </a:schemeClr>
+                          <a:schemeClr val="tx1"/>
                         </a:solidFill>
                         <a:effectLst/>
                         <a:latin typeface="Verdana"/>
@@ -4040,9 +3862,7 @@
                       <a:r>
                         <a:rPr lang="en-US" sz="600" i="1" u="none" strike="noStrike">
                           <a:solidFill>
-                            <a:schemeClr val="bg1">
-                              <a:lumMod val="65000"/>
-                            </a:schemeClr>
+                            <a:schemeClr val="tx1"/>
                           </a:solidFill>
                           <a:effectLst/>
                         </a:rPr>
@@ -4050,9 +3870,7 @@
                       </a:r>
                       <a:endParaRPr lang="en-US" sz="600" b="0" i="1" u="none" strike="noStrike">
                         <a:solidFill>
-                          <a:schemeClr val="bg1">
-                            <a:lumMod val="65000"/>
-                          </a:schemeClr>
+                          <a:schemeClr val="tx1"/>
                         </a:solidFill>
                         <a:effectLst/>
                         <a:latin typeface="Verdana"/>
@@ -4072,9 +3890,7 @@
                       <a:r>
                         <a:rPr lang="en-US" sz="600" i="1" u="none" strike="noStrike" dirty="0">
                           <a:solidFill>
-                            <a:schemeClr val="bg1">
-                              <a:lumMod val="65000"/>
-                            </a:schemeClr>
+                            <a:schemeClr val="tx1"/>
                           </a:solidFill>
                           <a:effectLst/>
                         </a:rPr>
@@ -4082,9 +3898,7 @@
                       </a:r>
                       <a:endParaRPr lang="en-US" sz="600" b="0" i="1" u="none" strike="noStrike" dirty="0">
                         <a:solidFill>
-                          <a:schemeClr val="bg1">
-                            <a:lumMod val="65000"/>
-                          </a:schemeClr>
+                          <a:schemeClr val="tx1"/>
                         </a:solidFill>
                         <a:effectLst/>
                         <a:latin typeface="Verdana"/>
@@ -4262,7 +4076,7 @@
                   </a:outerShdw>
                 </a:effectLst>
               </a:rPr>
-              <a:t>Dezember 2014</a:t>
+              <a:t>April 2015</a:t>
             </a:r>
             <a:endParaRPr lang="de-CH" sz="1200" b="1" dirty="0" smtClean="0">
               <a:ln w="18415" cmpd="sng">
@@ -4319,7 +4133,7 @@
                   </a:outerShdw>
                 </a:effectLst>
               </a:rPr>
-              <a:t>1.3</a:t>
+              <a:t>1.4</a:t>
             </a:r>
             <a:endParaRPr lang="de-CH" sz="1200" b="1" dirty="0" smtClean="0">
               <a:ln w="18415" cmpd="sng">
@@ -4362,55 +4176,141 @@
           </a:p>
         </p:txBody>
       </p:sp>
-      <p:pic>
-        <p:nvPicPr>
-          <p:cNvPr id="38" name="Grafik 37"/>
-          <p:cNvPicPr>
-            <a:picLocks noChangeAspect="1"/>
-          </p:cNvPicPr>
+      <p:sp>
+        <p:nvSpPr>
+          <p:cNvPr id="41" name="Textfeld 40"/>
+          <p:cNvSpPr txBox="1"/>
           <p:nvPr/>
-        </p:nvPicPr>
-        <p:blipFill rotWithShape="1">
-          <a:blip r:embed="rId11" cstate="print">
-            <a:extLst>
-              <a:ext uri="{28A0092B-C50C-407E-A947-70E740481C1C}">
-                <a14:useLocalDpi xmlns:a14="http://schemas.microsoft.com/office/drawing/2010/main"/>
-              </a:ext>
-            </a:extLst>
-          </a:blip>
-          <a:srcRect r="-1473"/>
-          <a:stretch/>
-        </p:blipFill>
+        </p:nvSpPr>
         <p:spPr>
           <a:xfrm>
-            <a:off x="4808984" y="6534150"/>
-            <a:ext cx="3366186" cy="286284"/>
+            <a:off x="-9890" y="323957"/>
+            <a:ext cx="2010230" cy="276999"/>
           </a:xfrm>
           <a:prstGeom prst="rect">
             <a:avLst/>
           </a:prstGeom>
-          <a:solidFill>
-            <a:schemeClr val="bg1"/>
-          </a:solidFill>
+          <a:noFill/>
         </p:spPr>
-      </p:pic>
+        <p:txBody>
+          <a:bodyPr wrap="none" rtlCol="0">
+            <a:spAutoFit/>
+          </a:bodyPr>
+          <a:lstStyle/>
+          <a:p>
+            <a:pPr algn="r"/>
+            <a:r>
+              <a:rPr lang="de-CH" sz="1200" b="1" dirty="0" smtClean="0">
+                <a:ln w="18415" cmpd="sng">
+                  <a:noFill/>
+                  <a:prstDash val="solid"/>
+                </a:ln>
+                <a:solidFill>
+                  <a:srgbClr val="FFFFFF"/>
+                </a:solidFill>
+                <a:effectLst>
+                  <a:outerShdw blurRad="38100" dist="38100" dir="2700000" algn="tl">
+                    <a:srgbClr val="000000">
+                      <a:alpha val="43137"/>
+                    </a:srgbClr>
+                  </a:outerShdw>
+                </a:effectLst>
+              </a:rPr>
+              <a:t>(alle Angaben ohne Gewähr)</a:t>
+            </a:r>
+          </a:p>
+        </p:txBody>
+      </p:sp>
+      <p:sp>
+        <p:nvSpPr>
+          <p:cNvPr id="27" name="TextBox 10"/>
+          <p:cNvSpPr txBox="1"/>
+          <p:nvPr/>
+        </p:nvSpPr>
+        <p:spPr>
+          <a:xfrm>
+            <a:off x="3583115" y="5724226"/>
+            <a:ext cx="268251" cy="200055"/>
+          </a:xfrm>
+          <a:prstGeom prst="rect">
+            <a:avLst/>
+          </a:prstGeom>
+          <a:noFill/>
+        </p:spPr>
+        <p:txBody>
+          <a:bodyPr wrap="square" rtlCol="0">
+            <a:spAutoFit/>
+          </a:bodyPr>
+          <a:lstStyle/>
+          <a:p>
+            <a:r>
+              <a:rPr lang="de-DE" sz="700" dirty="0" smtClean="0">
+                <a:solidFill>
+                  <a:srgbClr val="BC3E3E"/>
+                </a:solidFill>
+              </a:rPr>
+              <a:t>*</a:t>
+            </a:r>
+            <a:endParaRPr lang="de-DE" sz="700" dirty="0">
+              <a:solidFill>
+                <a:srgbClr val="BC3E3E"/>
+              </a:solidFill>
+            </a:endParaRPr>
+          </a:p>
+        </p:txBody>
+      </p:sp>
+      <p:sp>
+        <p:nvSpPr>
+          <p:cNvPr id="28" name="TextBox 10"/>
+          <p:cNvSpPr txBox="1"/>
+          <p:nvPr/>
+        </p:nvSpPr>
+        <p:spPr>
+          <a:xfrm>
+            <a:off x="66310" y="5920202"/>
+            <a:ext cx="268251" cy="200055"/>
+          </a:xfrm>
+          <a:prstGeom prst="rect">
+            <a:avLst/>
+          </a:prstGeom>
+          <a:noFill/>
+        </p:spPr>
+        <p:txBody>
+          <a:bodyPr wrap="square" rtlCol="0">
+            <a:spAutoFit/>
+          </a:bodyPr>
+          <a:lstStyle/>
+          <a:p>
+            <a:r>
+              <a:rPr lang="de-DE" sz="700" dirty="0" smtClean="0">
+                <a:solidFill>
+                  <a:schemeClr val="bg1">
+                    <a:lumMod val="65000"/>
+                  </a:schemeClr>
+                </a:solidFill>
+              </a:rPr>
+              <a:t>*</a:t>
+            </a:r>
+            <a:endParaRPr lang="de-DE" sz="700" dirty="0">
+              <a:solidFill>
+                <a:schemeClr val="bg1">
+                  <a:lumMod val="65000"/>
+                </a:schemeClr>
+              </a:solidFill>
+            </a:endParaRPr>
+          </a:p>
+        </p:txBody>
+      </p:sp>
       <p:pic>
         <p:nvPicPr>
-          <p:cNvPr id="40" name="Picture 3"/>
+          <p:cNvPr id="1030" name="Picture 6"/>
           <p:cNvPicPr>
             <a:picLocks noChangeAspect="1" noChangeArrowheads="1"/>
           </p:cNvPicPr>
           <p:nvPr/>
         </p:nvPicPr>
         <p:blipFill>
-          <a:blip r:embed="rId12" cstate="print">
-            <a:duotone>
-              <a:schemeClr val="bg2">
-                <a:shade val="45000"/>
-                <a:satMod val="135000"/>
-              </a:schemeClr>
-              <a:prstClr val="white"/>
-            </a:duotone>
+          <a:blip r:embed="rId6">
             <a:extLst>
               <a:ext uri="{28A0092B-C50C-407E-A947-70E740481C1C}">
                 <a14:useLocalDpi xmlns:a14="http://schemas.microsoft.com/office/drawing/2010/main"/>
@@ -4424,8 +4324,8 @@
         </p:blipFill>
         <p:spPr bwMode="auto">
           <a:xfrm>
-            <a:off x="4605512" y="4179373"/>
-            <a:ext cx="551607" cy="2411927"/>
+            <a:off x="1211740" y="5162550"/>
+            <a:ext cx="3235372" cy="1668800"/>
           </a:xfrm>
           <a:prstGeom prst="rect">
             <a:avLst/>
@@ -4455,288 +4355,19 @@
           </a:extLst>
         </p:spPr>
       </p:pic>
-      <p:sp>
-        <p:nvSpPr>
-          <p:cNvPr id="41" name="Textfeld 40"/>
-          <p:cNvSpPr txBox="1"/>
-          <p:nvPr/>
-        </p:nvSpPr>
-        <p:spPr>
-          <a:xfrm>
-            <a:off x="-9890" y="323957"/>
-            <a:ext cx="2010230" cy="276999"/>
-          </a:xfrm>
-          <a:prstGeom prst="rect">
-            <a:avLst/>
-          </a:prstGeom>
-          <a:noFill/>
-        </p:spPr>
-        <p:txBody>
-          <a:bodyPr wrap="none" rtlCol="0">
-            <a:spAutoFit/>
-          </a:bodyPr>
-          <a:lstStyle/>
-          <a:p>
-            <a:pPr algn="r"/>
-            <a:r>
-              <a:rPr lang="de-CH" sz="1200" b="1" dirty="0" smtClean="0">
-                <a:ln w="18415" cmpd="sng">
-                  <a:noFill/>
-                  <a:prstDash val="solid"/>
-                </a:ln>
-                <a:solidFill>
-                  <a:srgbClr val="FFFFFF"/>
-                </a:solidFill>
-                <a:effectLst>
-                  <a:outerShdw blurRad="38100" dist="38100" dir="2700000" algn="tl">
-                    <a:srgbClr val="000000">
-                      <a:alpha val="43137"/>
-                    </a:srgbClr>
-                  </a:outerShdw>
-                </a:effectLst>
-              </a:rPr>
-              <a:t>(alle Angaben ohne Gewähr)</a:t>
-            </a:r>
-          </a:p>
-        </p:txBody>
-      </p:sp>
-      <p:sp>
-        <p:nvSpPr>
-          <p:cNvPr id="27" name="TextBox 10"/>
-          <p:cNvSpPr txBox="1"/>
-          <p:nvPr/>
-        </p:nvSpPr>
-        <p:spPr>
-          <a:xfrm>
-            <a:off x="3583115" y="5724226"/>
-            <a:ext cx="268251" cy="200055"/>
-          </a:xfrm>
-          <a:prstGeom prst="rect">
-            <a:avLst/>
-          </a:prstGeom>
-          <a:noFill/>
-        </p:spPr>
-        <p:txBody>
-          <a:bodyPr wrap="square" rtlCol="0">
-            <a:spAutoFit/>
-          </a:bodyPr>
-          <a:lstStyle/>
-          <a:p>
-            <a:r>
-              <a:rPr lang="de-DE" sz="700" dirty="0" smtClean="0">
-                <a:solidFill>
-                  <a:srgbClr val="BC3E3E"/>
-                </a:solidFill>
-              </a:rPr>
-              <a:t>*</a:t>
-            </a:r>
-            <a:endParaRPr lang="de-DE" sz="700" dirty="0">
-              <a:solidFill>
-                <a:srgbClr val="BC3E3E"/>
-              </a:solidFill>
-            </a:endParaRPr>
-          </a:p>
-        </p:txBody>
-      </p:sp>
-      <p:sp>
-        <p:nvSpPr>
-          <p:cNvPr id="28" name="TextBox 10"/>
-          <p:cNvSpPr txBox="1"/>
-          <p:nvPr/>
-        </p:nvSpPr>
-        <p:spPr>
-          <a:xfrm>
-            <a:off x="66310" y="5920202"/>
-            <a:ext cx="268251" cy="200055"/>
-          </a:xfrm>
-          <a:prstGeom prst="rect">
-            <a:avLst/>
-          </a:prstGeom>
-          <a:noFill/>
-        </p:spPr>
-        <p:txBody>
-          <a:bodyPr wrap="square" rtlCol="0">
-            <a:spAutoFit/>
-          </a:bodyPr>
-          <a:lstStyle/>
-          <a:p>
-            <a:r>
-              <a:rPr lang="de-DE" sz="700" dirty="0" smtClean="0">
-                <a:solidFill>
-                  <a:schemeClr val="bg1">
-                    <a:lumMod val="65000"/>
-                  </a:schemeClr>
-                </a:solidFill>
-              </a:rPr>
-              <a:t>*</a:t>
-            </a:r>
-            <a:endParaRPr lang="de-DE" sz="700" dirty="0">
-              <a:solidFill>
-                <a:schemeClr val="bg1">
-                  <a:lumMod val="65000"/>
-                </a:schemeClr>
-              </a:solidFill>
-            </a:endParaRPr>
-          </a:p>
-        </p:txBody>
-      </p:sp>
-      <p:sp>
-        <p:nvSpPr>
-          <p:cNvPr id="31" name="Textfeld 30"/>
-          <p:cNvSpPr txBox="1"/>
-          <p:nvPr/>
-        </p:nvSpPr>
-        <p:spPr>
-          <a:xfrm>
-            <a:off x="467135" y="2750820"/>
-            <a:ext cx="498855" cy="230832"/>
-          </a:xfrm>
-          <a:prstGeom prst="rect">
-            <a:avLst/>
-          </a:prstGeom>
-          <a:noFill/>
-        </p:spPr>
-        <p:txBody>
-          <a:bodyPr wrap="none" rtlCol="0">
-            <a:spAutoFit/>
-          </a:bodyPr>
-          <a:lstStyle/>
-          <a:p>
-            <a:r>
-              <a:rPr lang="de-CH" sz="900" b="1" dirty="0" smtClean="0">
-                <a:effectLst>
-                  <a:outerShdw blurRad="50800" dist="38100" dir="5400000" algn="t" rotWithShape="0">
-                    <a:prstClr val="black">
-                      <a:alpha val="40000"/>
-                    </a:prstClr>
-                  </a:outerShdw>
-                </a:effectLst>
-              </a:rPr>
-              <a:t>387 PS</a:t>
-            </a:r>
-            <a:endParaRPr lang="en-US" sz="900" b="1" dirty="0">
-              <a:effectLst>
-                <a:outerShdw blurRad="50800" dist="38100" dir="5400000" algn="t" rotWithShape="0">
-                  <a:prstClr val="black">
-                    <a:alpha val="40000"/>
-                  </a:prstClr>
-                </a:outerShdw>
-              </a:effectLst>
-            </a:endParaRPr>
-          </a:p>
-        </p:txBody>
-      </p:sp>
-      <p:sp>
-        <p:nvSpPr>
-          <p:cNvPr id="32" name="Textfeld 31"/>
-          <p:cNvSpPr txBox="1"/>
-          <p:nvPr/>
-        </p:nvSpPr>
-        <p:spPr>
-          <a:xfrm>
-            <a:off x="1839785" y="2750820"/>
-            <a:ext cx="723275" cy="230832"/>
-          </a:xfrm>
-          <a:prstGeom prst="rect">
-            <a:avLst/>
-          </a:prstGeom>
-          <a:noFill/>
-        </p:spPr>
-        <p:txBody>
-          <a:bodyPr wrap="none" rtlCol="0">
-            <a:spAutoFit/>
-          </a:bodyPr>
-          <a:lstStyle/>
-          <a:p>
-            <a:r>
-              <a:rPr lang="de-CH" sz="900" b="1" dirty="0" smtClean="0">
-                <a:effectLst>
-                  <a:outerShdw blurRad="50800" dist="38100" dir="5400000" algn="t" rotWithShape="0">
-                    <a:prstClr val="black">
-                      <a:alpha val="40000"/>
-                    </a:prstClr>
-                  </a:outerShdw>
-                </a:effectLst>
-              </a:rPr>
-              <a:t>380 PS, 4x4</a:t>
-            </a:r>
-            <a:endParaRPr lang="en-US" sz="900" b="1" dirty="0">
-              <a:effectLst>
-                <a:outerShdw blurRad="50800" dist="38100" dir="5400000" algn="t" rotWithShape="0">
-                  <a:prstClr val="black">
-                    <a:alpha val="40000"/>
-                  </a:prstClr>
-                </a:outerShdw>
-              </a:effectLst>
-            </a:endParaRPr>
-          </a:p>
-        </p:txBody>
-      </p:sp>
-      <p:sp>
-        <p:nvSpPr>
-          <p:cNvPr id="42" name="Textfeld 41"/>
-          <p:cNvSpPr txBox="1"/>
-          <p:nvPr/>
-        </p:nvSpPr>
-        <p:spPr>
-          <a:xfrm>
-            <a:off x="3294231" y="2750820"/>
-            <a:ext cx="723275" cy="230832"/>
-          </a:xfrm>
-          <a:prstGeom prst="rect">
-            <a:avLst/>
-          </a:prstGeom>
-          <a:noFill/>
-        </p:spPr>
-        <p:txBody>
-          <a:bodyPr wrap="none" rtlCol="0">
-            <a:spAutoFit/>
-          </a:bodyPr>
-          <a:lstStyle/>
-          <a:p>
-            <a:r>
-              <a:rPr lang="de-CH" sz="900" b="1" dirty="0" smtClean="0">
-                <a:solidFill>
-                  <a:srgbClr val="FF0000"/>
-                </a:solidFill>
-                <a:effectLst>
-                  <a:outerShdw blurRad="50800" dist="38100" dir="5400000" algn="t" rotWithShape="0">
-                    <a:prstClr val="black">
-                      <a:alpha val="40000"/>
-                    </a:prstClr>
-                  </a:outerShdw>
-                </a:effectLst>
-              </a:rPr>
-              <a:t>700 PS, 4x4</a:t>
-            </a:r>
-            <a:endParaRPr lang="en-US" sz="900" b="1" dirty="0">
-              <a:solidFill>
-                <a:srgbClr val="FF0000"/>
-              </a:solidFill>
-              <a:effectLst>
-                <a:outerShdw blurRad="50800" dist="38100" dir="5400000" algn="t" rotWithShape="0">
-                  <a:prstClr val="black">
-                    <a:alpha val="40000"/>
-                  </a:prstClr>
-                </a:outerShdw>
-              </a:effectLst>
-            </a:endParaRPr>
-          </a:p>
-        </p:txBody>
-      </p:sp>
       <p:pic>
         <p:nvPicPr>
-          <p:cNvPr id="1027" name="Picture 3"/>
+          <p:cNvPr id="1031" name="Picture 7"/>
           <p:cNvPicPr>
             <a:picLocks noChangeAspect="1" noChangeArrowheads="1"/>
           </p:cNvPicPr>
           <p:nvPr/>
         </p:nvPicPr>
         <p:blipFill>
-          <a:blip r:embed="rId13">
+          <a:blip r:embed="rId7" cstate="print">
             <a:extLst>
               <a:ext uri="{28A0092B-C50C-407E-A947-70E740481C1C}">
-                <a14:useLocalDpi xmlns:a14="http://schemas.microsoft.com/office/drawing/2010/main" val="0"/>
+                <a14:useLocalDpi xmlns:a14="http://schemas.microsoft.com/office/drawing/2010/main"/>
               </a:ext>
             </a:extLst>
           </a:blip>
@@ -4747,8 +4378,399 @@
         </p:blipFill>
         <p:spPr bwMode="auto">
           <a:xfrm>
-            <a:off x="1231927" y="5316619"/>
-            <a:ext cx="3020033" cy="1473087"/>
+            <a:off x="8545672" y="4377585"/>
+            <a:ext cx="1340104" cy="2099497"/>
+          </a:xfrm>
+          <a:prstGeom prst="rect">
+            <a:avLst/>
+          </a:prstGeom>
+          <a:noFill/>
+          <a:ln>
+            <a:noFill/>
+          </a:ln>
+          <a:extLst>
+            <a:ext uri="{909E8E84-426E-40DD-AFC4-6F175D3DCCD1}">
+              <a14:hiddenFill xmlns:a14="http://schemas.microsoft.com/office/drawing/2010/main">
+                <a:solidFill>
+                  <a:schemeClr val="accent1"/>
+                </a:solidFill>
+              </a14:hiddenFill>
+            </a:ext>
+            <a:ext uri="{91240B29-F687-4F45-9708-019B960494DF}">
+              <a14:hiddenLine xmlns:a14="http://schemas.microsoft.com/office/drawing/2010/main" w="9525">
+                <a:solidFill>
+                  <a:schemeClr val="tx1"/>
+                </a:solidFill>
+                <a:miter lim="800000"/>
+                <a:headEnd/>
+                <a:tailEnd/>
+              </a14:hiddenLine>
+            </a:ext>
+          </a:extLst>
+        </p:spPr>
+      </p:pic>
+      <p:pic>
+        <p:nvPicPr>
+          <p:cNvPr id="9" name="Grafik 8"/>
+          <p:cNvPicPr>
+            <a:picLocks noChangeAspect="1"/>
+          </p:cNvPicPr>
+          <p:nvPr/>
+        </p:nvPicPr>
+        <p:blipFill rotWithShape="1">
+          <a:blip r:embed="rId8" cstate="print">
+            <a:extLst>
+              <a:ext uri="{28A0092B-C50C-407E-A947-70E740481C1C}">
+                <a14:useLocalDpi xmlns:a14="http://schemas.microsoft.com/office/drawing/2010/main"/>
+              </a:ext>
+            </a:extLst>
+          </a:blip>
+          <a:srcRect/>
+          <a:stretch/>
+        </p:blipFill>
+        <p:spPr>
+          <a:xfrm>
+            <a:off x="8374826" y="3478378"/>
+            <a:ext cx="1189253" cy="970537"/>
+          </a:xfrm>
+          <a:prstGeom prst="rect">
+            <a:avLst/>
+          </a:prstGeom>
+          <a:ln>
+            <a:solidFill>
+              <a:schemeClr val="bg1"/>
+            </a:solidFill>
+          </a:ln>
+          <a:effectLst>
+            <a:outerShdw blurRad="292100" dist="139700" dir="2700000" algn="tl" rotWithShape="0">
+              <a:srgbClr val="333333">
+                <a:alpha val="65000"/>
+              </a:srgbClr>
+            </a:outerShdw>
+          </a:effectLst>
+        </p:spPr>
+      </p:pic>
+      <p:pic>
+        <p:nvPicPr>
+          <p:cNvPr id="1032" name="Picture 8"/>
+          <p:cNvPicPr>
+            <a:picLocks noChangeAspect="1" noChangeArrowheads="1"/>
+          </p:cNvPicPr>
+          <p:nvPr/>
+        </p:nvPicPr>
+        <p:blipFill>
+          <a:blip r:embed="rId9" cstate="print">
+            <a:extLst>
+              <a:ext uri="{28A0092B-C50C-407E-A947-70E740481C1C}">
+                <a14:useLocalDpi xmlns:a14="http://schemas.microsoft.com/office/drawing/2010/main"/>
+              </a:ext>
+            </a:extLst>
+          </a:blip>
+          <a:srcRect/>
+          <a:stretch>
+            <a:fillRect/>
+          </a:stretch>
+        </p:blipFill>
+        <p:spPr bwMode="auto">
+          <a:xfrm>
+            <a:off x="8545672" y="28783"/>
+            <a:ext cx="1337310" cy="2096357"/>
+          </a:xfrm>
+          <a:prstGeom prst="rect">
+            <a:avLst/>
+          </a:prstGeom>
+          <a:noFill/>
+          <a:ln>
+            <a:noFill/>
+          </a:ln>
+          <a:extLst>
+            <a:ext uri="{909E8E84-426E-40DD-AFC4-6F175D3DCCD1}">
+              <a14:hiddenFill xmlns:a14="http://schemas.microsoft.com/office/drawing/2010/main">
+                <a:solidFill>
+                  <a:schemeClr val="accent1"/>
+                </a:solidFill>
+              </a14:hiddenFill>
+            </a:ext>
+            <a:ext uri="{91240B29-F687-4F45-9708-019B960494DF}">
+              <a14:hiddenLine xmlns:a14="http://schemas.microsoft.com/office/drawing/2010/main" w="9525">
+                <a:solidFill>
+                  <a:schemeClr val="tx1"/>
+                </a:solidFill>
+                <a:miter lim="800000"/>
+                <a:headEnd/>
+                <a:tailEnd/>
+              </a14:hiddenLine>
+            </a:ext>
+          </a:extLst>
+        </p:spPr>
+      </p:pic>
+      <p:pic>
+        <p:nvPicPr>
+          <p:cNvPr id="1033" name="Picture 9"/>
+          <p:cNvPicPr>
+            <a:picLocks noChangeAspect="1" noChangeArrowheads="1"/>
+          </p:cNvPicPr>
+          <p:nvPr/>
+        </p:nvPicPr>
+        <p:blipFill>
+          <a:blip r:embed="rId10" cstate="print">
+            <a:extLst>
+              <a:ext uri="{28A0092B-C50C-407E-A947-70E740481C1C}">
+                <a14:useLocalDpi xmlns:a14="http://schemas.microsoft.com/office/drawing/2010/main"/>
+              </a:ext>
+            </a:extLst>
+          </a:blip>
+          <a:srcRect/>
+          <a:stretch>
+            <a:fillRect/>
+          </a:stretch>
+        </p:blipFill>
+        <p:spPr bwMode="auto">
+          <a:xfrm>
+            <a:off x="7174948" y="27908"/>
+            <a:ext cx="1337310" cy="2102549"/>
+          </a:xfrm>
+          <a:prstGeom prst="rect">
+            <a:avLst/>
+          </a:prstGeom>
+          <a:noFill/>
+          <a:ln>
+            <a:noFill/>
+          </a:ln>
+          <a:extLst>
+            <a:ext uri="{909E8E84-426E-40DD-AFC4-6F175D3DCCD1}">
+              <a14:hiddenFill xmlns:a14="http://schemas.microsoft.com/office/drawing/2010/main">
+                <a:solidFill>
+                  <a:schemeClr val="accent1"/>
+                </a:solidFill>
+              </a14:hiddenFill>
+            </a:ext>
+            <a:ext uri="{91240B29-F687-4F45-9708-019B960494DF}">
+              <a14:hiddenLine xmlns:a14="http://schemas.microsoft.com/office/drawing/2010/main" w="9525">
+                <a:solidFill>
+                  <a:schemeClr val="tx1"/>
+                </a:solidFill>
+                <a:miter lim="800000"/>
+                <a:headEnd/>
+                <a:tailEnd/>
+              </a14:hiddenLine>
+            </a:ext>
+          </a:extLst>
+        </p:spPr>
+      </p:pic>
+      <p:sp>
+        <p:nvSpPr>
+          <p:cNvPr id="12" name="Textfeld 11"/>
+          <p:cNvSpPr txBox="1"/>
+          <p:nvPr/>
+        </p:nvSpPr>
+        <p:spPr>
+          <a:xfrm>
+            <a:off x="-9889" y="2225317"/>
+            <a:ext cx="697408" cy="169277"/>
+          </a:xfrm>
+          <a:prstGeom prst="rect">
+            <a:avLst/>
+          </a:prstGeom>
+          <a:solidFill>
+            <a:srgbClr val="000099">
+              <a:alpha val="45098"/>
+            </a:srgbClr>
+          </a:solidFill>
+        </p:spPr>
+        <p:txBody>
+          <a:bodyPr wrap="none" lIns="108000" tIns="0" rIns="108000" bIns="0" rtlCol="0">
+            <a:spAutoFit/>
+          </a:bodyPr>
+          <a:lstStyle/>
+          <a:p>
+            <a:r>
+              <a:rPr lang="de-CH" sz="1100" b="1" i="1" dirty="0" smtClean="0"/>
+              <a:t>Modelle</a:t>
+            </a:r>
+            <a:endParaRPr lang="en-US" sz="1100" b="1" i="1" dirty="0"/>
+          </a:p>
+        </p:txBody>
+      </p:sp>
+      <p:sp>
+        <p:nvSpPr>
+          <p:cNvPr id="43" name="Textfeld 42"/>
+          <p:cNvSpPr txBox="1"/>
+          <p:nvPr/>
+        </p:nvSpPr>
+        <p:spPr>
+          <a:xfrm>
+            <a:off x="4145" y="5112749"/>
+            <a:ext cx="617258" cy="169277"/>
+          </a:xfrm>
+          <a:prstGeom prst="rect">
+            <a:avLst/>
+          </a:prstGeom>
+          <a:solidFill>
+            <a:srgbClr val="000099">
+              <a:alpha val="45098"/>
+            </a:srgbClr>
+          </a:solidFill>
+        </p:spPr>
+        <p:txBody>
+          <a:bodyPr wrap="none" lIns="108000" tIns="0" rIns="108000" bIns="0" rtlCol="0">
+            <a:spAutoFit/>
+          </a:bodyPr>
+          <a:lstStyle/>
+          <a:p>
+            <a:r>
+              <a:rPr lang="de-CH" sz="1100" b="1" i="1" dirty="0" smtClean="0"/>
+              <a:t>Kosten</a:t>
+            </a:r>
+            <a:endParaRPr lang="en-US" sz="1100" b="1" i="1" dirty="0"/>
+          </a:p>
+        </p:txBody>
+      </p:sp>
+      <p:sp>
+        <p:nvSpPr>
+          <p:cNvPr id="46" name="Textfeld 45"/>
+          <p:cNvSpPr txBox="1"/>
+          <p:nvPr/>
+        </p:nvSpPr>
+        <p:spPr>
+          <a:xfrm>
+            <a:off x="8512258" y="6607893"/>
+            <a:ext cx="892974" cy="169277"/>
+          </a:xfrm>
+          <a:prstGeom prst="rect">
+            <a:avLst/>
+          </a:prstGeom>
+          <a:solidFill>
+            <a:srgbClr val="000099">
+              <a:alpha val="45098"/>
+            </a:srgbClr>
+          </a:solidFill>
+        </p:spPr>
+        <p:txBody>
+          <a:bodyPr wrap="none" lIns="108000" tIns="0" rIns="108000" bIns="0" rtlCol="0">
+            <a:spAutoFit/>
+          </a:bodyPr>
+          <a:lstStyle/>
+          <a:p>
+            <a:r>
+              <a:rPr lang="de-CH" sz="1100" b="1" i="1" dirty="0" smtClean="0"/>
+              <a:t>Mobile App</a:t>
+            </a:r>
+            <a:endParaRPr lang="en-US" sz="1100" b="1" i="1" dirty="0"/>
+          </a:p>
+        </p:txBody>
+      </p:sp>
+      <p:pic>
+        <p:nvPicPr>
+          <p:cNvPr id="1035" name="Picture 11"/>
+          <p:cNvPicPr>
+            <a:picLocks noChangeAspect="1" noChangeArrowheads="1"/>
+          </p:cNvPicPr>
+          <p:nvPr/>
+        </p:nvPicPr>
+        <p:blipFill rotWithShape="1">
+          <a:blip r:embed="rId11" cstate="print">
+            <a:extLst>
+              <a:ext uri="{28A0092B-C50C-407E-A947-70E740481C1C}">
+                <a14:useLocalDpi xmlns:a14="http://schemas.microsoft.com/office/drawing/2010/main"/>
+              </a:ext>
+            </a:extLst>
+          </a:blip>
+          <a:srcRect t="6850"/>
+          <a:stretch/>
+        </p:blipFill>
+        <p:spPr bwMode="auto">
+          <a:xfrm>
+            <a:off x="4621974" y="2219325"/>
+            <a:ext cx="3653270" cy="3563328"/>
+          </a:xfrm>
+          <a:prstGeom prst="rect">
+            <a:avLst/>
+          </a:prstGeom>
+          <a:noFill/>
+          <a:ln>
+            <a:noFill/>
+          </a:ln>
+          <a:extLst>
+            <a:ext uri="{909E8E84-426E-40DD-AFC4-6F175D3DCCD1}">
+              <a14:hiddenFill xmlns:a14="http://schemas.microsoft.com/office/drawing/2010/main">
+                <a:solidFill>
+                  <a:schemeClr val="accent1"/>
+                </a:solidFill>
+              </a14:hiddenFill>
+            </a:ext>
+            <a:ext uri="{91240B29-F687-4F45-9708-019B960494DF}">
+              <a14:hiddenLine xmlns:a14="http://schemas.microsoft.com/office/drawing/2010/main" w="9525">
+                <a:solidFill>
+                  <a:schemeClr val="tx1"/>
+                </a:solidFill>
+                <a:miter lim="800000"/>
+                <a:headEnd/>
+                <a:tailEnd/>
+              </a14:hiddenLine>
+            </a:ext>
+          </a:extLst>
+        </p:spPr>
+      </p:pic>
+      <p:sp>
+        <p:nvSpPr>
+          <p:cNvPr id="44" name="Textfeld 43"/>
+          <p:cNvSpPr txBox="1"/>
+          <p:nvPr/>
+        </p:nvSpPr>
+        <p:spPr>
+          <a:xfrm>
+            <a:off x="4621974" y="2225316"/>
+            <a:ext cx="1053274" cy="169277"/>
+          </a:xfrm>
+          <a:prstGeom prst="rect">
+            <a:avLst/>
+          </a:prstGeom>
+          <a:solidFill>
+            <a:srgbClr val="000099">
+              <a:alpha val="45098"/>
+            </a:srgbClr>
+          </a:solidFill>
+        </p:spPr>
+        <p:txBody>
+          <a:bodyPr wrap="none" lIns="108000" tIns="0" rIns="108000" bIns="0" rtlCol="0">
+            <a:spAutoFit/>
+          </a:bodyPr>
+          <a:lstStyle/>
+          <a:p>
+            <a:r>
+              <a:rPr lang="de-CH" sz="1100" b="1" i="1" dirty="0" err="1" smtClean="0"/>
+              <a:t>Superchargers</a:t>
+            </a:r>
+            <a:endParaRPr lang="en-US" sz="1100" b="1" i="1" dirty="0"/>
+          </a:p>
+        </p:txBody>
+      </p:sp>
+      <p:pic>
+        <p:nvPicPr>
+          <p:cNvPr id="1036" name="Picture 12"/>
+          <p:cNvPicPr>
+            <a:picLocks noChangeAspect="1" noChangeArrowheads="1"/>
+          </p:cNvPicPr>
+          <p:nvPr/>
+        </p:nvPicPr>
+        <p:blipFill>
+          <a:blip r:embed="rId12" cstate="print">
+            <a:extLst>
+              <a:ext uri="{28A0092B-C50C-407E-A947-70E740481C1C}">
+                <a14:useLocalDpi xmlns:a14="http://schemas.microsoft.com/office/drawing/2010/main"/>
+              </a:ext>
+            </a:extLst>
+          </a:blip>
+          <a:srcRect/>
+          <a:stretch>
+            <a:fillRect/>
+          </a:stretch>
+        </p:blipFill>
+        <p:spPr bwMode="auto">
+          <a:xfrm>
+            <a:off x="4621974" y="5644223"/>
+            <a:ext cx="3653270" cy="1203521"/>
           </a:xfrm>
           <a:prstGeom prst="rect">
             <a:avLst/>
@@ -4810,60 +4832,6 @@
           <a:chExt cx="0" cy="0"/>
         </a:xfrm>
       </p:grpSpPr>
-      <p:pic>
-        <p:nvPicPr>
-          <p:cNvPr id="1027" name="Picture 3"/>
-          <p:cNvPicPr>
-            <a:picLocks noChangeAspect="1" noChangeArrowheads="1"/>
-          </p:cNvPicPr>
-          <p:nvPr/>
-        </p:nvPicPr>
-        <p:blipFill>
-          <a:blip r:embed="rId2">
-            <a:extLst>
-              <a:ext uri="{28A0092B-C50C-407E-A947-70E740481C1C}">
-                <a14:useLocalDpi xmlns:a14="http://schemas.microsoft.com/office/drawing/2010/main" val="0"/>
-              </a:ext>
-            </a:extLst>
-          </a:blip>
-          <a:srcRect/>
-          <a:stretch>
-            <a:fillRect/>
-          </a:stretch>
-        </p:blipFill>
-        <p:spPr bwMode="auto">
-          <a:xfrm>
-            <a:off x="6412775" y="4467591"/>
-            <a:ext cx="3495389" cy="2363313"/>
-          </a:xfrm>
-          <a:prstGeom prst="rect">
-            <a:avLst/>
-          </a:prstGeom>
-          <a:noFill/>
-          <a:ln>
-            <a:noFill/>
-          </a:ln>
-          <a:extLst>
-            <a:ext uri="{909E8E84-426E-40DD-AFC4-6F175D3DCCD1}">
-              <a14:hiddenFill xmlns:a14="http://schemas.microsoft.com/office/drawing/2010/main">
-                <a:solidFill>
-                  <a:schemeClr val="accent1"/>
-                </a:solidFill>
-              </a14:hiddenFill>
-            </a:ext>
-            <a:ext uri="{91240B29-F687-4F45-9708-019B960494DF}">
-              <a14:hiddenLine xmlns:a14="http://schemas.microsoft.com/office/drawing/2010/main" w="9525">
-                <a:solidFill>
-                  <a:schemeClr val="tx1"/>
-                </a:solidFill>
-                <a:miter lim="800000"/>
-                <a:headEnd/>
-                <a:tailEnd/>
-              </a14:hiddenLine>
-            </a:ext>
-          </a:extLst>
-        </p:spPr>
-      </p:pic>
       <p:sp>
         <p:nvSpPr>
           <p:cNvPr id="3" name="Rechteck 2"/>
@@ -4913,16 +4881,1145 @@
           </a:p>
         </p:txBody>
       </p:sp>
+      <p:graphicFrame>
+        <p:nvGraphicFramePr>
+          <p:cNvPr id="5" name="Tabelle 4"/>
+          <p:cNvGraphicFramePr>
+            <a:graphicFrameLocks noGrp="1"/>
+          </p:cNvGraphicFramePr>
+          <p:nvPr>
+            <p:extLst>
+              <p:ext uri="{D42A27DB-BD31-4B8C-83A1-F6EECF244321}">
+                <p14:modId xmlns:p14="http://schemas.microsoft.com/office/powerpoint/2010/main" val="4097945167"/>
+              </p:ext>
+            </p:extLst>
+          </p:nvPr>
+        </p:nvGraphicFramePr>
+        <p:xfrm>
+          <a:off x="6465764" y="3327242"/>
+          <a:ext cx="3374290" cy="856080"/>
+        </p:xfrm>
+        <a:graphic>
+          <a:graphicData uri="http://schemas.openxmlformats.org/drawingml/2006/table">
+            <a:tbl>
+              <a:tblPr firstRow="1" bandRow="1">
+                <a:tableStyleId>{5C22544A-7EE6-4342-B048-85BDC9FD1C3A}</a:tableStyleId>
+              </a:tblPr>
+              <a:tblGrid>
+                <a:gridCol w="428785"/>
+                <a:gridCol w="573051"/>
+                <a:gridCol w="581025"/>
+                <a:gridCol w="571500"/>
+                <a:gridCol w="581025"/>
+                <a:gridCol w="638904"/>
+              </a:tblGrid>
+              <a:tr h="0">
+                <a:tc>
+                  <a:txBody>
+                    <a:bodyPr/>
+                    <a:lstStyle/>
+                    <a:p>
+                      <a:endParaRPr lang="en-US" sz="700" dirty="0">
+                        <a:solidFill>
+                          <a:schemeClr val="tx1"/>
+                        </a:solidFill>
+                      </a:endParaRPr>
+                    </a:p>
+                  </a:txBody>
+                  <a:tcPr marL="36000" marR="0" marT="0" marB="72000">
+                    <a:lnL w="12700" cmpd="sng">
+                      <a:noFill/>
+                    </a:lnL>
+                    <a:lnR w="12700" cmpd="sng">
+                      <a:noFill/>
+                    </a:lnR>
+                    <a:lnT w="12700" cmpd="sng">
+                      <a:noFill/>
+                    </a:lnT>
+                    <a:lnB w="12700" cap="flat" cmpd="sng" algn="ctr">
+                      <a:solidFill>
+                        <a:schemeClr val="bg1">
+                          <a:lumMod val="50000"/>
+                        </a:schemeClr>
+                      </a:solidFill>
+                      <a:prstDash val="solid"/>
+                      <a:round/>
+                      <a:headEnd type="none" w="med" len="med"/>
+                      <a:tailEnd type="none" w="med" len="med"/>
+                    </a:lnB>
+                    <a:lnTlToBr w="12700" cmpd="sng">
+                      <a:noFill/>
+                      <a:prstDash val="solid"/>
+                    </a:lnTlToBr>
+                    <a:lnBlToTr w="12700" cmpd="sng">
+                      <a:noFill/>
+                      <a:prstDash val="solid"/>
+                    </a:lnBlToTr>
+                    <a:noFill/>
+                  </a:tcPr>
+                </a:tc>
+                <a:tc>
+                  <a:txBody>
+                    <a:bodyPr/>
+                    <a:lstStyle/>
+                    <a:p>
+                      <a:r>
+                        <a:rPr lang="de-CH" sz="700" dirty="0" smtClean="0">
+                          <a:solidFill>
+                            <a:schemeClr val="tx1"/>
+                          </a:solidFill>
+                        </a:rPr>
+                        <a:t>T13</a:t>
+                      </a:r>
+                      <a:endParaRPr lang="en-US" sz="700" dirty="0">
+                        <a:solidFill>
+                          <a:schemeClr val="tx1"/>
+                        </a:solidFill>
+                      </a:endParaRPr>
+                    </a:p>
+                  </a:txBody>
+                  <a:tcPr marL="36000" marR="0" marT="0" marB="72000">
+                    <a:lnL w="12700" cmpd="sng">
+                      <a:noFill/>
+                    </a:lnL>
+                    <a:lnR w="12700" cmpd="sng">
+                      <a:noFill/>
+                    </a:lnR>
+                    <a:lnT w="12700" cmpd="sng">
+                      <a:noFill/>
+                    </a:lnT>
+                    <a:lnB w="12700" cap="flat" cmpd="sng" algn="ctr">
+                      <a:solidFill>
+                        <a:schemeClr val="bg1">
+                          <a:lumMod val="50000"/>
+                        </a:schemeClr>
+                      </a:solidFill>
+                      <a:prstDash val="solid"/>
+                      <a:round/>
+                      <a:headEnd type="none" w="med" len="med"/>
+                      <a:tailEnd type="none" w="med" len="med"/>
+                    </a:lnB>
+                    <a:lnTlToBr w="12700" cmpd="sng">
+                      <a:noFill/>
+                      <a:prstDash val="solid"/>
+                    </a:lnTlToBr>
+                    <a:lnBlToTr w="12700" cmpd="sng">
+                      <a:noFill/>
+                      <a:prstDash val="solid"/>
+                    </a:lnBlToTr>
+                    <a:noFill/>
+                  </a:tcPr>
+                </a:tc>
+                <a:tc>
+                  <a:txBody>
+                    <a:bodyPr/>
+                    <a:lstStyle/>
+                    <a:p>
+                      <a:r>
+                        <a:rPr lang="de-CH" sz="700" dirty="0" smtClean="0">
+                          <a:solidFill>
+                            <a:schemeClr val="tx1"/>
+                          </a:solidFill>
+                        </a:rPr>
+                        <a:t>Schuko</a:t>
+                      </a:r>
+                      <a:endParaRPr lang="en-US" sz="700" dirty="0">
+                        <a:solidFill>
+                          <a:schemeClr val="tx1"/>
+                        </a:solidFill>
+                      </a:endParaRPr>
+                    </a:p>
+                  </a:txBody>
+                  <a:tcPr marL="36000" marR="0" marT="0" marB="72000">
+                    <a:lnL w="12700" cmpd="sng">
+                      <a:noFill/>
+                    </a:lnL>
+                    <a:lnR w="12700" cmpd="sng">
+                      <a:noFill/>
+                    </a:lnR>
+                    <a:lnT w="12700" cmpd="sng">
+                      <a:noFill/>
+                    </a:lnT>
+                    <a:lnB w="12700" cap="flat" cmpd="sng" algn="ctr">
+                      <a:solidFill>
+                        <a:schemeClr val="bg1">
+                          <a:lumMod val="50000"/>
+                        </a:schemeClr>
+                      </a:solidFill>
+                      <a:prstDash val="solid"/>
+                      <a:round/>
+                      <a:headEnd type="none" w="med" len="med"/>
+                      <a:tailEnd type="none" w="med" len="med"/>
+                    </a:lnB>
+                    <a:lnTlToBr w="12700" cmpd="sng">
+                      <a:noFill/>
+                      <a:prstDash val="solid"/>
+                    </a:lnTlToBr>
+                    <a:lnBlToTr w="12700" cmpd="sng">
+                      <a:noFill/>
+                      <a:prstDash val="solid"/>
+                    </a:lnBlToTr>
+                    <a:noFill/>
+                  </a:tcPr>
+                </a:tc>
+                <a:tc>
+                  <a:txBody>
+                    <a:bodyPr/>
+                    <a:lstStyle/>
+                    <a:p>
+                      <a:r>
+                        <a:rPr lang="de-CH" sz="700" dirty="0" smtClean="0">
+                          <a:solidFill>
+                            <a:schemeClr val="tx1"/>
+                          </a:solidFill>
+                        </a:rPr>
+                        <a:t>CEE16</a:t>
+                      </a:r>
+                      <a:endParaRPr lang="en-US" sz="700" dirty="0">
+                        <a:solidFill>
+                          <a:schemeClr val="tx1"/>
+                        </a:solidFill>
+                      </a:endParaRPr>
+                    </a:p>
+                  </a:txBody>
+                  <a:tcPr marL="36000" marR="0" marT="0" marB="72000">
+                    <a:lnL w="12700" cmpd="sng">
+                      <a:noFill/>
+                    </a:lnL>
+                    <a:lnR w="12700" cmpd="sng">
+                      <a:noFill/>
+                    </a:lnR>
+                    <a:lnT w="12700" cmpd="sng">
+                      <a:noFill/>
+                    </a:lnT>
+                    <a:lnB w="12700" cap="flat" cmpd="sng" algn="ctr">
+                      <a:solidFill>
+                        <a:schemeClr val="bg1">
+                          <a:lumMod val="50000"/>
+                        </a:schemeClr>
+                      </a:solidFill>
+                      <a:prstDash val="solid"/>
+                      <a:round/>
+                      <a:headEnd type="none" w="med" len="med"/>
+                      <a:tailEnd type="none" w="med" len="med"/>
+                    </a:lnB>
+                    <a:lnTlToBr w="12700" cmpd="sng">
+                      <a:noFill/>
+                      <a:prstDash val="solid"/>
+                    </a:lnTlToBr>
+                    <a:lnBlToTr w="12700" cmpd="sng">
+                      <a:noFill/>
+                      <a:prstDash val="solid"/>
+                    </a:lnBlToTr>
+                    <a:noFill/>
+                  </a:tcPr>
+                </a:tc>
+                <a:tc>
+                  <a:txBody>
+                    <a:bodyPr/>
+                    <a:lstStyle/>
+                    <a:p>
+                      <a:r>
+                        <a:rPr lang="de-CH" sz="700" dirty="0" smtClean="0">
+                          <a:solidFill>
+                            <a:schemeClr val="tx1"/>
+                          </a:solidFill>
+                        </a:rPr>
+                        <a:t>Typ</a:t>
+                      </a:r>
+                      <a:r>
+                        <a:rPr lang="de-CH" sz="700" baseline="0" dirty="0" smtClean="0">
+                          <a:solidFill>
+                            <a:schemeClr val="tx1"/>
+                          </a:solidFill>
+                        </a:rPr>
+                        <a:t> 2</a:t>
+                      </a:r>
+                      <a:endParaRPr lang="en-US" sz="700" dirty="0">
+                        <a:solidFill>
+                          <a:schemeClr val="tx1"/>
+                        </a:solidFill>
+                      </a:endParaRPr>
+                    </a:p>
+                  </a:txBody>
+                  <a:tcPr marL="36000" marR="0" marT="0" marB="72000">
+                    <a:lnL w="12700" cmpd="sng">
+                      <a:noFill/>
+                    </a:lnL>
+                    <a:lnR w="12700" cmpd="sng">
+                      <a:noFill/>
+                    </a:lnR>
+                    <a:lnT w="12700" cmpd="sng">
+                      <a:noFill/>
+                    </a:lnT>
+                    <a:lnB w="12700" cap="flat" cmpd="sng" algn="ctr">
+                      <a:solidFill>
+                        <a:schemeClr val="bg1">
+                          <a:lumMod val="50000"/>
+                        </a:schemeClr>
+                      </a:solidFill>
+                      <a:prstDash val="solid"/>
+                      <a:round/>
+                      <a:headEnd type="none" w="med" len="med"/>
+                      <a:tailEnd type="none" w="med" len="med"/>
+                    </a:lnB>
+                    <a:lnTlToBr w="12700" cmpd="sng">
+                      <a:noFill/>
+                      <a:prstDash val="solid"/>
+                    </a:lnTlToBr>
+                    <a:lnBlToTr w="12700" cmpd="sng">
+                      <a:noFill/>
+                      <a:prstDash val="solid"/>
+                    </a:lnBlToTr>
+                    <a:noFill/>
+                  </a:tcPr>
+                </a:tc>
+                <a:tc>
+                  <a:txBody>
+                    <a:bodyPr/>
+                    <a:lstStyle/>
+                    <a:p>
+                      <a:r>
+                        <a:rPr lang="de-CH" sz="700" dirty="0" err="1" smtClean="0">
+                          <a:solidFill>
+                            <a:schemeClr val="tx1"/>
+                          </a:solidFill>
+                        </a:rPr>
+                        <a:t>Supercharger</a:t>
+                      </a:r>
+                      <a:endParaRPr lang="en-US" sz="700" dirty="0">
+                        <a:solidFill>
+                          <a:schemeClr val="tx1"/>
+                        </a:solidFill>
+                      </a:endParaRPr>
+                    </a:p>
+                  </a:txBody>
+                  <a:tcPr marL="36000" marR="0" marT="0" marB="72000">
+                    <a:lnL w="12700" cmpd="sng">
+                      <a:noFill/>
+                    </a:lnL>
+                    <a:lnR w="12700" cmpd="sng">
+                      <a:noFill/>
+                    </a:lnR>
+                    <a:lnT w="12700" cmpd="sng">
+                      <a:noFill/>
+                    </a:lnT>
+                    <a:lnB w="12700" cap="flat" cmpd="sng" algn="ctr">
+                      <a:solidFill>
+                        <a:schemeClr val="bg1">
+                          <a:lumMod val="50000"/>
+                        </a:schemeClr>
+                      </a:solidFill>
+                      <a:prstDash val="solid"/>
+                      <a:round/>
+                      <a:headEnd type="none" w="med" len="med"/>
+                      <a:tailEnd type="none" w="med" len="med"/>
+                    </a:lnB>
+                    <a:lnTlToBr w="12700" cmpd="sng">
+                      <a:noFill/>
+                      <a:prstDash val="solid"/>
+                    </a:lnTlToBr>
+                    <a:lnBlToTr w="12700" cmpd="sng">
+                      <a:noFill/>
+                      <a:prstDash val="solid"/>
+                    </a:lnBlToTr>
+                    <a:noFill/>
+                  </a:tcPr>
+                </a:tc>
+              </a:tr>
+              <a:tr h="0">
+                <a:tc>
+                  <a:txBody>
+                    <a:bodyPr/>
+                    <a:lstStyle/>
+                    <a:p>
+                      <a:r>
+                        <a:rPr lang="de-CH" sz="700" dirty="0" err="1" smtClean="0">
+                          <a:solidFill>
+                            <a:schemeClr val="tx1"/>
+                          </a:solidFill>
+                        </a:rPr>
+                        <a:t>Instal-lation</a:t>
+                      </a:r>
+                      <a:endParaRPr lang="en-US" sz="700" dirty="0">
+                        <a:solidFill>
+                          <a:schemeClr val="tx1"/>
+                        </a:solidFill>
+                      </a:endParaRPr>
+                    </a:p>
+                  </a:txBody>
+                  <a:tcPr marL="36000" marR="0" marT="0" marB="72000">
+                    <a:lnL w="12700" cmpd="sng">
+                      <a:noFill/>
+                    </a:lnL>
+                    <a:lnR w="12700" cmpd="sng">
+                      <a:noFill/>
+                    </a:lnR>
+                    <a:lnT w="12700" cap="flat" cmpd="sng" algn="ctr">
+                      <a:solidFill>
+                        <a:schemeClr val="bg1">
+                          <a:lumMod val="50000"/>
+                        </a:schemeClr>
+                      </a:solidFill>
+                      <a:prstDash val="solid"/>
+                      <a:round/>
+                      <a:headEnd type="none" w="med" len="med"/>
+                      <a:tailEnd type="none" w="med" len="med"/>
+                    </a:lnT>
+                    <a:lnB w="12700" cap="flat" cmpd="sng" algn="ctr">
+                      <a:solidFill>
+                        <a:schemeClr val="bg1">
+                          <a:lumMod val="50000"/>
+                        </a:schemeClr>
+                      </a:solidFill>
+                      <a:prstDash val="solid"/>
+                      <a:round/>
+                      <a:headEnd type="none" w="med" len="med"/>
+                      <a:tailEnd type="none" w="med" len="med"/>
+                    </a:lnB>
+                    <a:lnTlToBr w="12700" cmpd="sng">
+                      <a:noFill/>
+                      <a:prstDash val="solid"/>
+                    </a:lnTlToBr>
+                    <a:lnBlToTr w="12700" cmpd="sng">
+                      <a:noFill/>
+                      <a:prstDash val="solid"/>
+                    </a:lnBlToTr>
+                    <a:noFill/>
+                  </a:tcPr>
+                </a:tc>
+                <a:tc>
+                  <a:txBody>
+                    <a:bodyPr/>
+                    <a:lstStyle/>
+                    <a:p>
+                      <a:r>
+                        <a:rPr lang="de-CH" sz="700" dirty="0" smtClean="0">
+                          <a:solidFill>
+                            <a:schemeClr val="tx1"/>
+                          </a:solidFill>
+                        </a:rPr>
+                        <a:t>CH:</a:t>
+                      </a:r>
+                      <a:r>
+                        <a:rPr lang="de-CH" sz="700" baseline="0" dirty="0" smtClean="0">
+                          <a:solidFill>
+                            <a:schemeClr val="tx1"/>
+                          </a:solidFill>
+                        </a:rPr>
+                        <a:t> </a:t>
+                      </a:r>
+                      <a:r>
+                        <a:rPr lang="de-CH" sz="700" dirty="0" smtClean="0">
+                          <a:solidFill>
+                            <a:schemeClr val="tx1"/>
+                          </a:solidFill>
+                        </a:rPr>
+                        <a:t>Vorhanden</a:t>
+                      </a:r>
+                      <a:endParaRPr lang="en-US" sz="700" dirty="0">
+                        <a:solidFill>
+                          <a:schemeClr val="tx1"/>
+                        </a:solidFill>
+                      </a:endParaRPr>
+                    </a:p>
+                  </a:txBody>
+                  <a:tcPr marL="36000" marR="0" marT="0" marB="72000">
+                    <a:lnL w="12700" cmpd="sng">
+                      <a:noFill/>
+                    </a:lnL>
+                    <a:lnR w="12700" cmpd="sng">
+                      <a:noFill/>
+                    </a:lnR>
+                    <a:lnT w="12700" cap="flat" cmpd="sng" algn="ctr">
+                      <a:solidFill>
+                        <a:schemeClr val="bg1">
+                          <a:lumMod val="50000"/>
+                        </a:schemeClr>
+                      </a:solidFill>
+                      <a:prstDash val="solid"/>
+                      <a:round/>
+                      <a:headEnd type="none" w="med" len="med"/>
+                      <a:tailEnd type="none" w="med" len="med"/>
+                    </a:lnT>
+                    <a:lnB w="12700" cap="flat" cmpd="sng" algn="ctr">
+                      <a:solidFill>
+                        <a:schemeClr val="bg1">
+                          <a:lumMod val="50000"/>
+                        </a:schemeClr>
+                      </a:solidFill>
+                      <a:prstDash val="solid"/>
+                      <a:round/>
+                      <a:headEnd type="none" w="med" len="med"/>
+                      <a:tailEnd type="none" w="med" len="med"/>
+                    </a:lnB>
+                    <a:lnTlToBr w="12700" cmpd="sng">
+                      <a:noFill/>
+                      <a:prstDash val="solid"/>
+                    </a:lnTlToBr>
+                    <a:lnBlToTr w="12700" cmpd="sng">
+                      <a:noFill/>
+                      <a:prstDash val="solid"/>
+                    </a:lnBlToTr>
+                    <a:noFill/>
+                  </a:tcPr>
+                </a:tc>
+                <a:tc>
+                  <a:txBody>
+                    <a:bodyPr/>
+                    <a:lstStyle/>
+                    <a:p>
+                      <a:r>
+                        <a:rPr lang="de-CH" sz="700" dirty="0" smtClean="0">
+                          <a:solidFill>
+                            <a:schemeClr val="tx1"/>
+                          </a:solidFill>
+                        </a:rPr>
+                        <a:t>D: Vorhanden</a:t>
+                      </a:r>
+                      <a:endParaRPr lang="en-US" sz="700" dirty="0">
+                        <a:solidFill>
+                          <a:schemeClr val="tx1"/>
+                        </a:solidFill>
+                      </a:endParaRPr>
+                    </a:p>
+                  </a:txBody>
+                  <a:tcPr marL="36000" marR="0" marT="0" marB="72000">
+                    <a:lnL w="12700" cmpd="sng">
+                      <a:noFill/>
+                    </a:lnL>
+                    <a:lnR w="12700" cmpd="sng">
+                      <a:noFill/>
+                    </a:lnR>
+                    <a:lnT w="12700" cap="flat" cmpd="sng" algn="ctr">
+                      <a:solidFill>
+                        <a:schemeClr val="bg1">
+                          <a:lumMod val="50000"/>
+                        </a:schemeClr>
+                      </a:solidFill>
+                      <a:prstDash val="solid"/>
+                      <a:round/>
+                      <a:headEnd type="none" w="med" len="med"/>
+                      <a:tailEnd type="none" w="med" len="med"/>
+                    </a:lnT>
+                    <a:lnB w="12700" cap="flat" cmpd="sng" algn="ctr">
+                      <a:solidFill>
+                        <a:schemeClr val="bg1">
+                          <a:lumMod val="50000"/>
+                        </a:schemeClr>
+                      </a:solidFill>
+                      <a:prstDash val="solid"/>
+                      <a:round/>
+                      <a:headEnd type="none" w="med" len="med"/>
+                      <a:tailEnd type="none" w="med" len="med"/>
+                    </a:lnB>
+                    <a:lnTlToBr w="12700" cmpd="sng">
+                      <a:noFill/>
+                      <a:prstDash val="solid"/>
+                    </a:lnTlToBr>
+                    <a:lnBlToTr w="12700" cmpd="sng">
+                      <a:noFill/>
+                      <a:prstDash val="solid"/>
+                    </a:lnBlToTr>
+                    <a:noFill/>
+                  </a:tcPr>
+                </a:tc>
+                <a:tc>
+                  <a:txBody>
+                    <a:bodyPr/>
+                    <a:lstStyle/>
+                    <a:p>
+                      <a:r>
+                        <a:rPr lang="de-CH" sz="700" dirty="0" smtClean="0">
+                          <a:solidFill>
+                            <a:schemeClr val="tx1"/>
+                          </a:solidFill>
+                        </a:rPr>
+                        <a:t>500 - 1500 CHF</a:t>
+                      </a:r>
+                      <a:endParaRPr lang="en-US" sz="700" dirty="0">
+                        <a:solidFill>
+                          <a:schemeClr val="tx1"/>
+                        </a:solidFill>
+                      </a:endParaRPr>
+                    </a:p>
+                  </a:txBody>
+                  <a:tcPr marL="36000" marR="0" marT="0" marB="72000">
+                    <a:lnL w="12700" cmpd="sng">
+                      <a:noFill/>
+                    </a:lnL>
+                    <a:lnR w="12700" cmpd="sng">
+                      <a:noFill/>
+                    </a:lnR>
+                    <a:lnT w="12700" cap="flat" cmpd="sng" algn="ctr">
+                      <a:solidFill>
+                        <a:schemeClr val="bg1">
+                          <a:lumMod val="50000"/>
+                        </a:schemeClr>
+                      </a:solidFill>
+                      <a:prstDash val="solid"/>
+                      <a:round/>
+                      <a:headEnd type="none" w="med" len="med"/>
+                      <a:tailEnd type="none" w="med" len="med"/>
+                    </a:lnT>
+                    <a:lnB w="12700" cap="flat" cmpd="sng" algn="ctr">
+                      <a:solidFill>
+                        <a:schemeClr val="bg1">
+                          <a:lumMod val="50000"/>
+                        </a:schemeClr>
+                      </a:solidFill>
+                      <a:prstDash val="solid"/>
+                      <a:round/>
+                      <a:headEnd type="none" w="med" len="med"/>
+                      <a:tailEnd type="none" w="med" len="med"/>
+                    </a:lnB>
+                    <a:lnTlToBr w="12700" cmpd="sng">
+                      <a:noFill/>
+                      <a:prstDash val="solid"/>
+                    </a:lnTlToBr>
+                    <a:lnBlToTr w="12700" cmpd="sng">
+                      <a:noFill/>
+                      <a:prstDash val="solid"/>
+                    </a:lnBlToTr>
+                    <a:noFill/>
+                  </a:tcPr>
+                </a:tc>
+                <a:tc>
+                  <a:txBody>
+                    <a:bodyPr/>
+                    <a:lstStyle/>
+                    <a:p>
+                      <a:r>
+                        <a:rPr lang="de-CH" sz="700" dirty="0" smtClean="0">
+                          <a:solidFill>
+                            <a:schemeClr val="tx1"/>
+                          </a:solidFill>
+                        </a:rPr>
+                        <a:t>1500 - 6000 CHF</a:t>
+                      </a:r>
+                      <a:endParaRPr lang="en-US" sz="700" dirty="0">
+                        <a:solidFill>
+                          <a:schemeClr val="tx1"/>
+                        </a:solidFill>
+                      </a:endParaRPr>
+                    </a:p>
+                  </a:txBody>
+                  <a:tcPr marL="36000" marR="0" marT="0" marB="72000">
+                    <a:lnL w="12700" cmpd="sng">
+                      <a:noFill/>
+                    </a:lnL>
+                    <a:lnR w="12700" cmpd="sng">
+                      <a:noFill/>
+                    </a:lnR>
+                    <a:lnT w="12700" cap="flat" cmpd="sng" algn="ctr">
+                      <a:solidFill>
+                        <a:schemeClr val="bg1">
+                          <a:lumMod val="50000"/>
+                        </a:schemeClr>
+                      </a:solidFill>
+                      <a:prstDash val="solid"/>
+                      <a:round/>
+                      <a:headEnd type="none" w="med" len="med"/>
+                      <a:tailEnd type="none" w="med" len="med"/>
+                    </a:lnT>
+                    <a:lnB w="12700" cap="flat" cmpd="sng" algn="ctr">
+                      <a:solidFill>
+                        <a:schemeClr val="bg1">
+                          <a:lumMod val="50000"/>
+                        </a:schemeClr>
+                      </a:solidFill>
+                      <a:prstDash val="solid"/>
+                      <a:round/>
+                      <a:headEnd type="none" w="med" len="med"/>
+                      <a:tailEnd type="none" w="med" len="med"/>
+                    </a:lnB>
+                    <a:lnTlToBr w="12700" cmpd="sng">
+                      <a:noFill/>
+                      <a:prstDash val="solid"/>
+                    </a:lnTlToBr>
+                    <a:lnBlToTr w="12700" cmpd="sng">
+                      <a:noFill/>
+                      <a:prstDash val="solid"/>
+                    </a:lnBlToTr>
+                    <a:noFill/>
+                  </a:tcPr>
+                </a:tc>
+                <a:tc>
+                  <a:txBody>
+                    <a:bodyPr/>
+                    <a:lstStyle/>
+                    <a:p>
+                      <a:endParaRPr lang="en-US" sz="700" dirty="0">
+                        <a:solidFill>
+                          <a:schemeClr val="tx1"/>
+                        </a:solidFill>
+                      </a:endParaRPr>
+                    </a:p>
+                  </a:txBody>
+                  <a:tcPr marL="36000" marR="0" marT="0" marB="72000">
+                    <a:lnL w="12700" cmpd="sng">
+                      <a:noFill/>
+                    </a:lnL>
+                    <a:lnR w="12700" cmpd="sng">
+                      <a:noFill/>
+                    </a:lnR>
+                    <a:lnT w="12700" cap="flat" cmpd="sng" algn="ctr">
+                      <a:solidFill>
+                        <a:schemeClr val="bg1">
+                          <a:lumMod val="50000"/>
+                        </a:schemeClr>
+                      </a:solidFill>
+                      <a:prstDash val="solid"/>
+                      <a:round/>
+                      <a:headEnd type="none" w="med" len="med"/>
+                      <a:tailEnd type="none" w="med" len="med"/>
+                    </a:lnT>
+                    <a:lnB w="12700" cap="flat" cmpd="sng" algn="ctr">
+                      <a:solidFill>
+                        <a:schemeClr val="bg1">
+                          <a:lumMod val="50000"/>
+                        </a:schemeClr>
+                      </a:solidFill>
+                      <a:prstDash val="solid"/>
+                      <a:round/>
+                      <a:headEnd type="none" w="med" len="med"/>
+                      <a:tailEnd type="none" w="med" len="med"/>
+                    </a:lnB>
+                    <a:lnTlToBr w="12700" cmpd="sng">
+                      <a:noFill/>
+                      <a:prstDash val="solid"/>
+                    </a:lnTlToBr>
+                    <a:lnBlToTr w="12700" cmpd="sng">
+                      <a:noFill/>
+                      <a:prstDash val="solid"/>
+                    </a:lnBlToTr>
+                    <a:noFill/>
+                  </a:tcPr>
+                </a:tc>
+              </a:tr>
+              <a:tr h="111957">
+                <a:tc>
+                  <a:txBody>
+                    <a:bodyPr/>
+                    <a:lstStyle/>
+                    <a:p>
+                      <a:r>
+                        <a:rPr lang="de-CH" sz="700" dirty="0" smtClean="0">
+                          <a:solidFill>
+                            <a:schemeClr val="tx1"/>
+                          </a:solidFill>
+                        </a:rPr>
+                        <a:t>Strom-bezug</a:t>
+                      </a:r>
+                      <a:endParaRPr lang="en-US" sz="700" dirty="0">
+                        <a:solidFill>
+                          <a:schemeClr val="tx1"/>
+                        </a:solidFill>
+                      </a:endParaRPr>
+                    </a:p>
+                  </a:txBody>
+                  <a:tcPr marL="36000" marR="0" marT="0" marB="72000">
+                    <a:lnL w="12700" cmpd="sng">
+                      <a:noFill/>
+                    </a:lnL>
+                    <a:lnR w="12700" cmpd="sng">
+                      <a:noFill/>
+                    </a:lnR>
+                    <a:lnT w="12700" cap="flat" cmpd="sng" algn="ctr">
+                      <a:solidFill>
+                        <a:schemeClr val="bg1">
+                          <a:lumMod val="50000"/>
+                        </a:schemeClr>
+                      </a:solidFill>
+                      <a:prstDash val="solid"/>
+                      <a:round/>
+                      <a:headEnd type="none" w="med" len="med"/>
+                      <a:tailEnd type="none" w="med" len="med"/>
+                    </a:lnT>
+                    <a:lnB w="12700" cap="flat" cmpd="sng" algn="ctr">
+                      <a:solidFill>
+                        <a:schemeClr val="bg1">
+                          <a:lumMod val="50000"/>
+                        </a:schemeClr>
+                      </a:solidFill>
+                      <a:prstDash val="solid"/>
+                      <a:round/>
+                      <a:headEnd type="none" w="med" len="med"/>
+                      <a:tailEnd type="none" w="med" len="med"/>
+                    </a:lnB>
+                    <a:lnTlToBr w="12700" cmpd="sng">
+                      <a:noFill/>
+                      <a:prstDash val="solid"/>
+                    </a:lnTlToBr>
+                    <a:lnBlToTr w="12700" cmpd="sng">
+                      <a:noFill/>
+                      <a:prstDash val="solid"/>
+                    </a:lnBlToTr>
+                    <a:noFill/>
+                  </a:tcPr>
+                </a:tc>
+                <a:tc>
+                  <a:txBody>
+                    <a:bodyPr/>
+                    <a:lstStyle/>
+                    <a:p>
+                      <a:r>
+                        <a:rPr lang="de-CH" sz="700" dirty="0" smtClean="0">
+                          <a:solidFill>
+                            <a:schemeClr val="tx1"/>
+                          </a:solidFill>
+                        </a:rPr>
+                        <a:t>pro kWh</a:t>
+                      </a:r>
+                      <a:endParaRPr lang="en-US" sz="700" dirty="0">
+                        <a:solidFill>
+                          <a:schemeClr val="tx1"/>
+                        </a:solidFill>
+                      </a:endParaRPr>
+                    </a:p>
+                  </a:txBody>
+                  <a:tcPr marL="36000" marR="0" marT="0" marB="72000">
+                    <a:lnL w="12700" cmpd="sng">
+                      <a:noFill/>
+                    </a:lnL>
+                    <a:lnR w="12700" cmpd="sng">
+                      <a:noFill/>
+                    </a:lnR>
+                    <a:lnT w="12700" cap="flat" cmpd="sng" algn="ctr">
+                      <a:solidFill>
+                        <a:schemeClr val="bg1">
+                          <a:lumMod val="50000"/>
+                        </a:schemeClr>
+                      </a:solidFill>
+                      <a:prstDash val="solid"/>
+                      <a:round/>
+                      <a:headEnd type="none" w="med" len="med"/>
+                      <a:tailEnd type="none" w="med" len="med"/>
+                    </a:lnT>
+                    <a:lnB w="12700" cap="flat" cmpd="sng" algn="ctr">
+                      <a:solidFill>
+                        <a:schemeClr val="bg1">
+                          <a:lumMod val="50000"/>
+                        </a:schemeClr>
+                      </a:solidFill>
+                      <a:prstDash val="solid"/>
+                      <a:round/>
+                      <a:headEnd type="none" w="med" len="med"/>
+                      <a:tailEnd type="none" w="med" len="med"/>
+                    </a:lnB>
+                    <a:lnTlToBr w="12700" cmpd="sng">
+                      <a:noFill/>
+                      <a:prstDash val="solid"/>
+                    </a:lnTlToBr>
+                    <a:lnBlToTr w="12700" cmpd="sng">
+                      <a:noFill/>
+                      <a:prstDash val="solid"/>
+                    </a:lnBlToTr>
+                    <a:noFill/>
+                  </a:tcPr>
+                </a:tc>
+                <a:tc>
+                  <a:txBody>
+                    <a:bodyPr/>
+                    <a:lstStyle/>
+                    <a:p>
+                      <a:r>
+                        <a:rPr lang="de-CH" sz="700" dirty="0" smtClean="0">
+                          <a:solidFill>
+                            <a:schemeClr val="tx1"/>
+                          </a:solidFill>
+                        </a:rPr>
+                        <a:t>pro kWh</a:t>
+                      </a:r>
+                      <a:endParaRPr lang="en-US" sz="700" dirty="0">
+                        <a:solidFill>
+                          <a:schemeClr val="tx1"/>
+                        </a:solidFill>
+                      </a:endParaRPr>
+                    </a:p>
+                  </a:txBody>
+                  <a:tcPr marL="36000" marR="0" marT="0" marB="72000">
+                    <a:lnL w="12700" cmpd="sng">
+                      <a:noFill/>
+                    </a:lnL>
+                    <a:lnR w="12700" cmpd="sng">
+                      <a:noFill/>
+                    </a:lnR>
+                    <a:lnT w="12700" cap="flat" cmpd="sng" algn="ctr">
+                      <a:solidFill>
+                        <a:schemeClr val="bg1">
+                          <a:lumMod val="50000"/>
+                        </a:schemeClr>
+                      </a:solidFill>
+                      <a:prstDash val="solid"/>
+                      <a:round/>
+                      <a:headEnd type="none" w="med" len="med"/>
+                      <a:tailEnd type="none" w="med" len="med"/>
+                    </a:lnT>
+                    <a:lnB w="12700" cap="flat" cmpd="sng" algn="ctr">
+                      <a:solidFill>
+                        <a:schemeClr val="bg1">
+                          <a:lumMod val="50000"/>
+                        </a:schemeClr>
+                      </a:solidFill>
+                      <a:prstDash val="solid"/>
+                      <a:round/>
+                      <a:headEnd type="none" w="med" len="med"/>
+                      <a:tailEnd type="none" w="med" len="med"/>
+                    </a:lnB>
+                    <a:lnTlToBr w="12700" cmpd="sng">
+                      <a:noFill/>
+                      <a:prstDash val="solid"/>
+                    </a:lnTlToBr>
+                    <a:lnBlToTr w="12700" cmpd="sng">
+                      <a:noFill/>
+                      <a:prstDash val="solid"/>
+                    </a:lnBlToTr>
+                    <a:noFill/>
+                  </a:tcPr>
+                </a:tc>
+                <a:tc>
+                  <a:txBody>
+                    <a:bodyPr/>
+                    <a:lstStyle/>
+                    <a:p>
+                      <a:r>
+                        <a:rPr lang="de-CH" sz="700" dirty="0" smtClean="0">
+                          <a:solidFill>
+                            <a:schemeClr val="tx1"/>
+                          </a:solidFill>
+                        </a:rPr>
+                        <a:t>pro kWh</a:t>
+                      </a:r>
+                      <a:endParaRPr lang="en-US" sz="700" dirty="0">
+                        <a:solidFill>
+                          <a:schemeClr val="tx1"/>
+                        </a:solidFill>
+                      </a:endParaRPr>
+                    </a:p>
+                  </a:txBody>
+                  <a:tcPr marL="36000" marR="0" marT="0" marB="72000">
+                    <a:lnL w="12700" cmpd="sng">
+                      <a:noFill/>
+                    </a:lnL>
+                    <a:lnR w="12700" cmpd="sng">
+                      <a:noFill/>
+                    </a:lnR>
+                    <a:lnT w="12700" cap="flat" cmpd="sng" algn="ctr">
+                      <a:solidFill>
+                        <a:schemeClr val="bg1">
+                          <a:lumMod val="50000"/>
+                        </a:schemeClr>
+                      </a:solidFill>
+                      <a:prstDash val="solid"/>
+                      <a:round/>
+                      <a:headEnd type="none" w="med" len="med"/>
+                      <a:tailEnd type="none" w="med" len="med"/>
+                    </a:lnT>
+                    <a:lnB w="12700" cap="flat" cmpd="sng" algn="ctr">
+                      <a:solidFill>
+                        <a:schemeClr val="bg1">
+                          <a:lumMod val="50000"/>
+                        </a:schemeClr>
+                      </a:solidFill>
+                      <a:prstDash val="solid"/>
+                      <a:round/>
+                      <a:headEnd type="none" w="med" len="med"/>
+                      <a:tailEnd type="none" w="med" len="med"/>
+                    </a:lnB>
+                    <a:lnTlToBr w="12700" cmpd="sng">
+                      <a:noFill/>
+                      <a:prstDash val="solid"/>
+                    </a:lnTlToBr>
+                    <a:lnBlToTr w="12700" cmpd="sng">
+                      <a:noFill/>
+                      <a:prstDash val="solid"/>
+                    </a:lnBlToTr>
+                    <a:noFill/>
+                  </a:tcPr>
+                </a:tc>
+                <a:tc>
+                  <a:txBody>
+                    <a:bodyPr/>
+                    <a:lstStyle/>
+                    <a:p>
+                      <a:r>
+                        <a:rPr lang="de-CH" sz="700" dirty="0" smtClean="0">
+                          <a:solidFill>
+                            <a:schemeClr val="tx1"/>
+                          </a:solidFill>
+                        </a:rPr>
+                        <a:t>oft gratis oder Parkgebühr</a:t>
+                      </a:r>
+                      <a:endParaRPr lang="en-US" sz="700" dirty="0">
+                        <a:solidFill>
+                          <a:schemeClr val="tx1"/>
+                        </a:solidFill>
+                      </a:endParaRPr>
+                    </a:p>
+                  </a:txBody>
+                  <a:tcPr marL="36000" marR="0" marT="0" marB="72000">
+                    <a:lnL w="12700" cmpd="sng">
+                      <a:noFill/>
+                    </a:lnL>
+                    <a:lnR w="12700" cmpd="sng">
+                      <a:noFill/>
+                    </a:lnR>
+                    <a:lnT w="12700" cap="flat" cmpd="sng" algn="ctr">
+                      <a:solidFill>
+                        <a:schemeClr val="bg1">
+                          <a:lumMod val="50000"/>
+                        </a:schemeClr>
+                      </a:solidFill>
+                      <a:prstDash val="solid"/>
+                      <a:round/>
+                      <a:headEnd type="none" w="med" len="med"/>
+                      <a:tailEnd type="none" w="med" len="med"/>
+                    </a:lnT>
+                    <a:lnB w="12700" cap="flat" cmpd="sng" algn="ctr">
+                      <a:solidFill>
+                        <a:schemeClr val="bg1">
+                          <a:lumMod val="50000"/>
+                        </a:schemeClr>
+                      </a:solidFill>
+                      <a:prstDash val="solid"/>
+                      <a:round/>
+                      <a:headEnd type="none" w="med" len="med"/>
+                      <a:tailEnd type="none" w="med" len="med"/>
+                    </a:lnB>
+                    <a:lnTlToBr w="12700" cmpd="sng">
+                      <a:noFill/>
+                      <a:prstDash val="solid"/>
+                    </a:lnTlToBr>
+                    <a:lnBlToTr w="12700" cmpd="sng">
+                      <a:noFill/>
+                      <a:prstDash val="solid"/>
+                    </a:lnBlToTr>
+                    <a:noFill/>
+                  </a:tcPr>
+                </a:tc>
+                <a:tc>
+                  <a:txBody>
+                    <a:bodyPr/>
+                    <a:lstStyle/>
+                    <a:p>
+                      <a:r>
+                        <a:rPr lang="de-CH" sz="700" dirty="0" smtClean="0">
+                          <a:solidFill>
+                            <a:schemeClr val="tx1"/>
+                          </a:solidFill>
+                        </a:rPr>
+                        <a:t>Flatrate</a:t>
+                      </a:r>
+                      <a:r>
+                        <a:rPr lang="de-CH" sz="700" baseline="0" dirty="0" smtClean="0">
+                          <a:solidFill>
+                            <a:schemeClr val="tx1"/>
+                          </a:solidFill>
+                        </a:rPr>
+                        <a:t> (im Auto-Kaufpreis inklusive)</a:t>
+                      </a:r>
+                      <a:endParaRPr lang="en-US" sz="700" dirty="0">
+                        <a:solidFill>
+                          <a:schemeClr val="tx1"/>
+                        </a:solidFill>
+                      </a:endParaRPr>
+                    </a:p>
+                  </a:txBody>
+                  <a:tcPr marL="36000" marR="0" marT="0" marB="72000">
+                    <a:lnL w="12700" cmpd="sng">
+                      <a:noFill/>
+                    </a:lnL>
+                    <a:lnR w="12700" cmpd="sng">
+                      <a:noFill/>
+                    </a:lnR>
+                    <a:lnT w="12700" cap="flat" cmpd="sng" algn="ctr">
+                      <a:solidFill>
+                        <a:schemeClr val="bg1">
+                          <a:lumMod val="50000"/>
+                        </a:schemeClr>
+                      </a:solidFill>
+                      <a:prstDash val="solid"/>
+                      <a:round/>
+                      <a:headEnd type="none" w="med" len="med"/>
+                      <a:tailEnd type="none" w="med" len="med"/>
+                    </a:lnT>
+                    <a:lnB w="12700" cap="flat" cmpd="sng" algn="ctr">
+                      <a:solidFill>
+                        <a:schemeClr val="bg1">
+                          <a:lumMod val="50000"/>
+                        </a:schemeClr>
+                      </a:solidFill>
+                      <a:prstDash val="solid"/>
+                      <a:round/>
+                      <a:headEnd type="none" w="med" len="med"/>
+                      <a:tailEnd type="none" w="med" len="med"/>
+                    </a:lnB>
+                    <a:lnTlToBr w="12700" cmpd="sng">
+                      <a:noFill/>
+                      <a:prstDash val="solid"/>
+                    </a:lnTlToBr>
+                    <a:lnBlToTr w="12700" cmpd="sng">
+                      <a:noFill/>
+                      <a:prstDash val="solid"/>
+                    </a:lnBlToTr>
+                    <a:noFill/>
+                  </a:tcPr>
+                </a:tc>
+              </a:tr>
+            </a:tbl>
+          </a:graphicData>
+        </a:graphic>
+      </p:graphicFrame>
       <p:pic>
         <p:nvPicPr>
-          <p:cNvPr id="1032" name="Picture 8"/>
+          <p:cNvPr id="2055" name="Picture 7" descr="http://insideevs.com/wp-content/uploads/2015/02/tesla-supercharger-europe.jpg"/>
+          <p:cNvPicPr>
+            <a:picLocks noChangeAspect="1" noChangeArrowheads="1"/>
+          </p:cNvPicPr>
+          <p:nvPr/>
+        </p:nvPicPr>
+        <p:blipFill rotWithShape="1">
+          <a:blip r:embed="rId2" cstate="print">
+            <a:extLst>
+              <a:ext uri="{28A0092B-C50C-407E-A947-70E740481C1C}">
+                <a14:useLocalDpi xmlns:a14="http://schemas.microsoft.com/office/drawing/2010/main"/>
+              </a:ext>
+            </a:extLst>
+          </a:blip>
+          <a:srcRect t="-1465"/>
+          <a:stretch/>
+        </p:blipFill>
+        <p:spPr bwMode="auto">
+          <a:xfrm>
+            <a:off x="-10549" y="-47625"/>
+            <a:ext cx="6308483" cy="4266197"/>
+          </a:xfrm>
+          <a:prstGeom prst="rect">
+            <a:avLst/>
+          </a:prstGeom>
+          <a:noFill/>
+          <a:extLst>
+            <a:ext uri="{909E8E84-426E-40DD-AFC4-6F175D3DCCD1}">
+              <a14:hiddenFill xmlns:a14="http://schemas.microsoft.com/office/drawing/2010/main">
+                <a:solidFill>
+                  <a:srgbClr val="FFFFFF"/>
+                </a:solidFill>
+              </a14:hiddenFill>
+            </a:ext>
+          </a:extLst>
+        </p:spPr>
+      </p:pic>
+      <p:pic>
+        <p:nvPicPr>
+          <p:cNvPr id="1027" name="Picture 3"/>
           <p:cNvPicPr>
             <a:picLocks noChangeAspect="1" noChangeArrowheads="1"/>
           </p:cNvPicPr>
           <p:nvPr/>
         </p:nvPicPr>
         <p:blipFill>
-          <a:blip r:embed="rId3">
+          <a:blip r:embed="rId3" cstate="print">
             <a:extLst>
               <a:ext uri="{28A0092B-C50C-407E-A947-70E740481C1C}">
                 <a14:useLocalDpi xmlns:a14="http://schemas.microsoft.com/office/drawing/2010/main"/>
@@ -4936,7 +6033,61 @@
         </p:blipFill>
         <p:spPr bwMode="auto">
           <a:xfrm>
-            <a:off x="6470553" y="45719"/>
+            <a:off x="6412775" y="4467591"/>
+            <a:ext cx="3495389" cy="2363313"/>
+          </a:xfrm>
+          <a:prstGeom prst="rect">
+            <a:avLst/>
+          </a:prstGeom>
+          <a:noFill/>
+          <a:ln>
+            <a:noFill/>
+          </a:ln>
+          <a:extLst>
+            <a:ext uri="{909E8E84-426E-40DD-AFC4-6F175D3DCCD1}">
+              <a14:hiddenFill xmlns:a14="http://schemas.microsoft.com/office/drawing/2010/main">
+                <a:solidFill>
+                  <a:schemeClr val="accent1"/>
+                </a:solidFill>
+              </a14:hiddenFill>
+            </a:ext>
+            <a:ext uri="{91240B29-F687-4F45-9708-019B960494DF}">
+              <a14:hiddenLine xmlns:a14="http://schemas.microsoft.com/office/drawing/2010/main" w="9525">
+                <a:solidFill>
+                  <a:schemeClr val="tx1"/>
+                </a:solidFill>
+                <a:miter lim="800000"/>
+                <a:headEnd/>
+                <a:tailEnd/>
+              </a14:hiddenLine>
+            </a:ext>
+          </a:extLst>
+        </p:spPr>
+      </p:pic>
+      <p:pic>
+        <p:nvPicPr>
+          <p:cNvPr id="1032" name="Picture 8"/>
+          <p:cNvPicPr>
+            <a:picLocks noChangeAspect="1" noChangeArrowheads="1"/>
+          </p:cNvPicPr>
+          <p:nvPr/>
+        </p:nvPicPr>
+        <p:blipFill>
+          <a:blip r:embed="rId4">
+            <a:extLst>
+              <a:ext uri="{28A0092B-C50C-407E-A947-70E740481C1C}">
+                <a14:useLocalDpi xmlns:a14="http://schemas.microsoft.com/office/drawing/2010/main"/>
+              </a:ext>
+            </a:extLst>
+          </a:blip>
+          <a:srcRect/>
+          <a:stretch>
+            <a:fillRect/>
+          </a:stretch>
+        </p:blipFill>
+        <p:spPr bwMode="auto">
+          <a:xfrm>
+            <a:off x="6470553" y="137159"/>
             <a:ext cx="3350450" cy="2866403"/>
           </a:xfrm>
           <a:prstGeom prst="rect">
@@ -4967,35 +6118,6 @@
           </a:extLst>
         </p:spPr>
       </p:pic>
-      <p:pic>
-        <p:nvPicPr>
-          <p:cNvPr id="4" name="Picture 3"/>
-          <p:cNvPicPr>
-            <a:picLocks noChangeAspect="1"/>
-          </p:cNvPicPr>
-          <p:nvPr/>
-        </p:nvPicPr>
-        <p:blipFill rotWithShape="1">
-          <a:blip r:embed="rId4" cstate="print">
-            <a:extLst>
-              <a:ext uri="{28A0092B-C50C-407E-A947-70E740481C1C}">
-                <a14:useLocalDpi xmlns:a14="http://schemas.microsoft.com/office/drawing/2010/main"/>
-              </a:ext>
-            </a:extLst>
-          </a:blip>
-          <a:srcRect/>
-          <a:stretch/>
-        </p:blipFill>
-        <p:spPr>
-          <a:xfrm>
-            <a:off x="-10548" y="0"/>
-            <a:ext cx="6308483" cy="6185709"/>
-          </a:xfrm>
-          <a:prstGeom prst="rect">
-            <a:avLst/>
-          </a:prstGeom>
-        </p:spPr>
-      </p:pic>
       <p:sp>
         <p:nvSpPr>
           <p:cNvPr id="11" name="TextBox 10"/>
@@ -5004,7 +6126,7 @@
         </p:nvSpPr>
         <p:spPr>
           <a:xfrm>
-            <a:off x="7790789" y="362894"/>
+            <a:off x="7790789" y="454334"/>
             <a:ext cx="1712172" cy="338554"/>
           </a:xfrm>
           <a:prstGeom prst="rect">
@@ -5046,537 +6168,6 @@
               <a:t>100km Reichweite zu laden?</a:t>
             </a:r>
             <a:endParaRPr lang="de-DE" sz="800" i="1" dirty="0">
-              <a:solidFill>
-                <a:srgbClr val="800000"/>
-              </a:solidFill>
-            </a:endParaRPr>
-          </a:p>
-        </p:txBody>
-      </p:sp>
-      <p:sp>
-        <p:nvSpPr>
-          <p:cNvPr id="21" name="Rounded Rectangle 20"/>
-          <p:cNvSpPr/>
-          <p:nvPr/>
-        </p:nvSpPr>
-        <p:spPr>
-          <a:xfrm>
-            <a:off x="6750251" y="3426142"/>
-            <a:ext cx="3102541" cy="582307"/>
-          </a:xfrm>
-          <a:prstGeom prst="roundRect">
-            <a:avLst/>
-          </a:prstGeom>
-          <a:gradFill>
-            <a:gsLst>
-              <a:gs pos="0">
-                <a:schemeClr val="bg1">
-                  <a:lumMod val="65000"/>
-                </a:schemeClr>
-              </a:gs>
-              <a:gs pos="100000">
-                <a:schemeClr val="bg1">
-                  <a:lumMod val="95000"/>
-                </a:schemeClr>
-              </a:gs>
-            </a:gsLst>
-          </a:gradFill>
-          <a:ln>
-            <a:solidFill>
-              <a:schemeClr val="bg1">
-                <a:lumMod val="65000"/>
-              </a:schemeClr>
-            </a:solidFill>
-          </a:ln>
-        </p:spPr>
-        <p:style>
-          <a:lnRef idx="1">
-            <a:schemeClr val="accent2"/>
-          </a:lnRef>
-          <a:fillRef idx="2">
-            <a:schemeClr val="accent2"/>
-          </a:fillRef>
-          <a:effectRef idx="1">
-            <a:schemeClr val="accent2"/>
-          </a:effectRef>
-          <a:fontRef idx="minor">
-            <a:schemeClr val="dk1"/>
-          </a:fontRef>
-        </p:style>
-        <p:txBody>
-          <a:bodyPr rtlCol="0" anchor="ctr"/>
-          <a:lstStyle/>
-          <a:p>
-            <a:pPr algn="ctr"/>
-            <a:endParaRPr lang="de-DE"/>
-          </a:p>
-        </p:txBody>
-      </p:sp>
-      <p:graphicFrame>
-        <p:nvGraphicFramePr>
-          <p:cNvPr id="12" name="Table 11"/>
-          <p:cNvGraphicFramePr>
-            <a:graphicFrameLocks noGrp="1"/>
-          </p:cNvGraphicFramePr>
-          <p:nvPr>
-            <p:extLst>
-              <p:ext uri="{D42A27DB-BD31-4B8C-83A1-F6EECF244321}">
-                <p14:modId xmlns:p14="http://schemas.microsoft.com/office/powerpoint/2010/main" val="4003516999"/>
-              </p:ext>
-            </p:extLst>
-          </p:nvPr>
-        </p:nvGraphicFramePr>
-        <p:xfrm>
-          <a:off x="6868282" y="3472763"/>
-          <a:ext cx="2965348" cy="498720"/>
-        </p:xfrm>
-        <a:graphic>
-          <a:graphicData uri="http://schemas.openxmlformats.org/drawingml/2006/table">
-            <a:tbl>
-              <a:tblPr firstRow="1" bandRow="1">
-                <a:tableStyleId>{3B4B98B0-60AC-42C2-AFA5-B58CD77FA1E5}</a:tableStyleId>
-              </a:tblPr>
-              <a:tblGrid>
-                <a:gridCol w="574384"/>
-                <a:gridCol w="574384"/>
-                <a:gridCol w="580152"/>
-                <a:gridCol w="585918"/>
-                <a:gridCol w="650510"/>
-              </a:tblGrid>
-              <a:tr h="370840">
-                <a:tc>
-                  <a:txBody>
-                    <a:bodyPr/>
-                    <a:lstStyle/>
-                    <a:p>
-                      <a:pPr algn="ctr"/>
-                      <a:r>
-                        <a:rPr lang="de-DE" sz="700" b="0" dirty="0" smtClean="0">
-                          <a:solidFill>
-                            <a:schemeClr val="tx1">
-                              <a:lumMod val="50000"/>
-                              <a:lumOff val="50000"/>
-                            </a:schemeClr>
-                          </a:solidFill>
-                        </a:rPr>
-                        <a:t>CH: meist vorhanden, Kosten pro kWh</a:t>
-                      </a:r>
-                      <a:endParaRPr lang="de-DE" sz="700" b="0" dirty="0">
-                        <a:solidFill>
-                          <a:schemeClr val="tx1">
-                            <a:lumMod val="50000"/>
-                            <a:lumOff val="50000"/>
-                          </a:schemeClr>
-                        </a:solidFill>
-                      </a:endParaRPr>
-                    </a:p>
-                  </a:txBody>
-                  <a:tcPr marL="39000" marR="39000" marT="36000" marB="36000">
-                    <a:lnL>
-                      <a:noFill/>
-                    </a:lnL>
-                    <a:lnR>
-                      <a:noFill/>
-                    </a:lnR>
-                    <a:lnT w="12700" cmpd="sng">
-                      <a:noFill/>
-                    </a:lnT>
-                    <a:lnB w="12700" cmpd="sng">
-                      <a:noFill/>
-                    </a:lnB>
-                    <a:lnTlToBr w="12700" cmpd="sng">
-                      <a:noFill/>
-                      <a:prstDash val="solid"/>
-                    </a:lnTlToBr>
-                    <a:lnBlToTr w="12700" cmpd="sng">
-                      <a:noFill/>
-                      <a:prstDash val="solid"/>
-                    </a:lnBlToTr>
-                  </a:tcPr>
-                </a:tc>
-                <a:tc>
-                  <a:txBody>
-                    <a:bodyPr/>
-                    <a:lstStyle/>
-                    <a:p>
-                      <a:pPr algn="ctr"/>
-                      <a:r>
-                        <a:rPr lang="de-DE" sz="700" b="0" dirty="0" smtClean="0">
-                          <a:solidFill>
-                            <a:schemeClr val="tx1">
-                              <a:lumMod val="50000"/>
-                              <a:lumOff val="50000"/>
-                            </a:schemeClr>
-                          </a:solidFill>
-                        </a:rPr>
-                        <a:t>D: meist vorhanden, Kosten</a:t>
-                      </a:r>
-                      <a:r>
-                        <a:rPr lang="de-DE" sz="700" b="0" baseline="0" dirty="0" smtClean="0">
-                          <a:solidFill>
-                            <a:schemeClr val="tx1">
-                              <a:lumMod val="50000"/>
-                              <a:lumOff val="50000"/>
-                            </a:schemeClr>
-                          </a:solidFill>
-                        </a:rPr>
-                        <a:t> pro kWh</a:t>
-                      </a:r>
-                      <a:endParaRPr lang="de-DE" sz="700" b="0" dirty="0">
-                        <a:solidFill>
-                          <a:schemeClr val="tx1">
-                            <a:lumMod val="50000"/>
-                            <a:lumOff val="50000"/>
-                          </a:schemeClr>
-                        </a:solidFill>
-                      </a:endParaRPr>
-                    </a:p>
-                  </a:txBody>
-                  <a:tcPr marL="39000" marR="39000" marT="36000" marB="36000">
-                    <a:lnL>
-                      <a:noFill/>
-                    </a:lnL>
-                    <a:lnR>
-                      <a:noFill/>
-                    </a:lnR>
-                    <a:lnT w="12700" cmpd="sng">
-                      <a:noFill/>
-                    </a:lnT>
-                    <a:lnB w="12700" cmpd="sng">
-                      <a:noFill/>
-                    </a:lnB>
-                    <a:lnTlToBr w="12700" cmpd="sng">
-                      <a:noFill/>
-                      <a:prstDash val="solid"/>
-                    </a:lnTlToBr>
-                    <a:lnBlToTr w="12700" cmpd="sng">
-                      <a:noFill/>
-                      <a:prstDash val="solid"/>
-                    </a:lnBlToTr>
-                  </a:tcPr>
-                </a:tc>
-                <a:tc>
-                  <a:txBody>
-                    <a:bodyPr/>
-                    <a:lstStyle/>
-                    <a:p>
-                      <a:pPr algn="ctr"/>
-                      <a:r>
-                        <a:rPr lang="de-DE" sz="700" dirty="0" smtClean="0">
-                          <a:solidFill>
-                            <a:schemeClr val="tx1">
-                              <a:lumMod val="50000"/>
-                              <a:lumOff val="50000"/>
-                            </a:schemeClr>
-                          </a:solidFill>
-                        </a:rPr>
-                        <a:t>500-1500</a:t>
-                      </a:r>
-                      <a:r>
-                        <a:rPr lang="de-DE" sz="700" baseline="0" dirty="0" smtClean="0">
-                          <a:solidFill>
-                            <a:schemeClr val="tx1">
-                              <a:lumMod val="50000"/>
-                              <a:lumOff val="50000"/>
-                            </a:schemeClr>
-                          </a:solidFill>
-                        </a:rPr>
-                        <a:t> CHF</a:t>
-                      </a:r>
-                      <a:endParaRPr lang="de-DE" sz="700" dirty="0" smtClean="0">
-                        <a:solidFill>
-                          <a:schemeClr val="tx1">
-                            <a:lumMod val="50000"/>
-                            <a:lumOff val="50000"/>
-                          </a:schemeClr>
-                        </a:solidFill>
-                      </a:endParaRPr>
-                    </a:p>
-                    <a:p>
-                      <a:pPr algn="ctr"/>
-                      <a:r>
-                        <a:rPr lang="de-DE" sz="700" b="0" dirty="0" smtClean="0">
-                          <a:solidFill>
-                            <a:schemeClr val="tx1">
-                              <a:lumMod val="50000"/>
-                              <a:lumOff val="50000"/>
-                            </a:schemeClr>
-                          </a:solidFill>
-                        </a:rPr>
-                        <a:t>+ Kosten</a:t>
-                      </a:r>
-                      <a:r>
-                        <a:rPr lang="de-DE" sz="700" b="0" baseline="0" dirty="0" smtClean="0">
-                          <a:solidFill>
-                            <a:schemeClr val="tx1">
-                              <a:lumMod val="50000"/>
-                              <a:lumOff val="50000"/>
-                            </a:schemeClr>
-                          </a:solidFill>
-                        </a:rPr>
-                        <a:t> pro kWh</a:t>
-                      </a:r>
-                      <a:endParaRPr lang="de-DE" sz="700" b="0" dirty="0" smtClean="0">
-                        <a:solidFill>
-                          <a:schemeClr val="tx1">
-                            <a:lumMod val="50000"/>
-                            <a:lumOff val="50000"/>
-                          </a:schemeClr>
-                        </a:solidFill>
-                      </a:endParaRPr>
-                    </a:p>
-                  </a:txBody>
-                  <a:tcPr marL="39000" marR="39000" marT="36000" marB="36000">
-                    <a:lnL>
-                      <a:noFill/>
-                    </a:lnL>
-                    <a:lnR>
-                      <a:noFill/>
-                    </a:lnR>
-                    <a:lnT w="12700" cmpd="sng">
-                      <a:noFill/>
-                    </a:lnT>
-                    <a:lnB w="12700" cmpd="sng">
-                      <a:noFill/>
-                    </a:lnB>
-                    <a:lnTlToBr w="12700" cmpd="sng">
-                      <a:noFill/>
-                      <a:prstDash val="solid"/>
-                    </a:lnTlToBr>
-                    <a:lnBlToTr w="12700" cmpd="sng">
-                      <a:noFill/>
-                      <a:prstDash val="solid"/>
-                    </a:lnBlToTr>
-                  </a:tcPr>
-                </a:tc>
-                <a:tc>
-                  <a:txBody>
-                    <a:bodyPr/>
-                    <a:lstStyle/>
-                    <a:p>
-                      <a:pPr algn="ctr"/>
-                      <a:r>
-                        <a:rPr lang="de-DE" sz="700" dirty="0" smtClean="0">
-                          <a:solidFill>
-                            <a:schemeClr val="tx1">
-                              <a:lumMod val="50000"/>
-                              <a:lumOff val="50000"/>
-                            </a:schemeClr>
-                          </a:solidFill>
-                        </a:rPr>
-                        <a:t>1500-6000</a:t>
-                      </a:r>
-                      <a:r>
-                        <a:rPr lang="de-DE" sz="700" baseline="0" dirty="0" smtClean="0">
-                          <a:solidFill>
-                            <a:schemeClr val="tx1">
-                              <a:lumMod val="50000"/>
-                              <a:lumOff val="50000"/>
-                            </a:schemeClr>
-                          </a:solidFill>
-                        </a:rPr>
-                        <a:t> CHF</a:t>
-                      </a:r>
-                    </a:p>
-                    <a:p>
-                      <a:pPr algn="ctr"/>
-                      <a:r>
-                        <a:rPr lang="de-DE" sz="700" b="0" baseline="0" dirty="0" smtClean="0">
-                          <a:solidFill>
-                            <a:schemeClr val="tx1">
-                              <a:lumMod val="50000"/>
-                              <a:lumOff val="50000"/>
-                            </a:schemeClr>
-                          </a:solidFill>
-                        </a:rPr>
-                        <a:t>Strom oft gratis</a:t>
-                      </a:r>
-                      <a:endParaRPr lang="de-DE" sz="700" b="0" dirty="0">
-                        <a:solidFill>
-                          <a:schemeClr val="tx1">
-                            <a:lumMod val="50000"/>
-                            <a:lumOff val="50000"/>
-                          </a:schemeClr>
-                        </a:solidFill>
-                      </a:endParaRPr>
-                    </a:p>
-                  </a:txBody>
-                  <a:tcPr marL="39000" marR="39000" marT="36000" marB="36000">
-                    <a:lnL>
-                      <a:noFill/>
-                    </a:lnL>
-                    <a:lnR>
-                      <a:noFill/>
-                    </a:lnR>
-                    <a:lnT w="12700" cmpd="sng">
-                      <a:noFill/>
-                    </a:lnT>
-                    <a:lnB w="12700" cmpd="sng">
-                      <a:noFill/>
-                    </a:lnB>
-                    <a:lnTlToBr w="12700" cmpd="sng">
-                      <a:noFill/>
-                      <a:prstDash val="solid"/>
-                    </a:lnTlToBr>
-                    <a:lnBlToTr w="12700" cmpd="sng">
-                      <a:noFill/>
-                      <a:prstDash val="solid"/>
-                    </a:lnBlToTr>
-                  </a:tcPr>
-                </a:tc>
-                <a:tc>
-                  <a:txBody>
-                    <a:bodyPr/>
-                    <a:lstStyle/>
-                    <a:p>
-                      <a:pPr algn="ctr"/>
-                      <a:r>
-                        <a:rPr lang="de-DE" sz="700" dirty="0" smtClean="0">
-                          <a:solidFill>
-                            <a:schemeClr val="tx1">
-                              <a:lumMod val="50000"/>
-                              <a:lumOff val="50000"/>
-                            </a:schemeClr>
-                          </a:solidFill>
-                        </a:rPr>
-                        <a:t>Im Auto- Kaufpreis</a:t>
-                      </a:r>
-                      <a:r>
-                        <a:rPr lang="de-DE" sz="700" baseline="0" dirty="0" smtClean="0">
-                          <a:solidFill>
-                            <a:schemeClr val="tx1">
-                              <a:lumMod val="50000"/>
-                              <a:lumOff val="50000"/>
-                            </a:schemeClr>
-                          </a:solidFill>
-                        </a:rPr>
-                        <a:t> inklusive (Flatrate)</a:t>
-                      </a:r>
-                      <a:endParaRPr lang="de-DE" sz="700" b="0" dirty="0">
-                        <a:solidFill>
-                          <a:schemeClr val="tx1">
-                            <a:lumMod val="50000"/>
-                            <a:lumOff val="50000"/>
-                          </a:schemeClr>
-                        </a:solidFill>
-                      </a:endParaRPr>
-                    </a:p>
-                  </a:txBody>
-                  <a:tcPr marL="39000" marR="39000" marT="36000" marB="36000">
-                    <a:lnL>
-                      <a:noFill/>
-                    </a:lnL>
-                    <a:lnR>
-                      <a:noFill/>
-                    </a:lnR>
-                    <a:lnT w="12700" cmpd="sng">
-                      <a:noFill/>
-                    </a:lnT>
-                    <a:lnB w="12700" cmpd="sng">
-                      <a:noFill/>
-                    </a:lnB>
-                    <a:lnTlToBr w="12700" cmpd="sng">
-                      <a:noFill/>
-                      <a:prstDash val="solid"/>
-                    </a:lnTlToBr>
-                    <a:lnBlToTr w="12700" cmpd="sng">
-                      <a:noFill/>
-                      <a:prstDash val="solid"/>
-                    </a:lnBlToTr>
-                  </a:tcPr>
-                </a:tc>
-              </a:tr>
-            </a:tbl>
-          </a:graphicData>
-        </a:graphic>
-      </p:graphicFrame>
-      <p:sp>
-        <p:nvSpPr>
-          <p:cNvPr id="14" name="TextBox 10"/>
-          <p:cNvSpPr txBox="1"/>
-          <p:nvPr/>
-        </p:nvSpPr>
-        <p:spPr>
-          <a:xfrm>
-            <a:off x="6750252" y="4061790"/>
-            <a:ext cx="2436486" cy="307777"/>
-          </a:xfrm>
-          <a:prstGeom prst="rect">
-            <a:avLst/>
-          </a:prstGeom>
-          <a:solidFill>
-            <a:schemeClr val="bg1"/>
-          </a:solidFill>
-        </p:spPr>
-        <p:txBody>
-          <a:bodyPr wrap="square" rtlCol="0">
-            <a:spAutoFit/>
-          </a:bodyPr>
-          <a:lstStyle/>
-          <a:p>
-            <a:r>
-              <a:rPr lang="de-DE" sz="700" i="1" dirty="0" smtClean="0">
-                <a:solidFill>
-                  <a:srgbClr val="800000"/>
-                </a:solidFill>
-              </a:rPr>
-              <a:t>Falls man den Strom selber zahlt kostet ein Mal von leer bis voll laden ca. 15 CHF -&gt; reicht für ca. </a:t>
-            </a:r>
-            <a:r>
-              <a:rPr lang="de-DE" sz="700" i="1" dirty="0">
-                <a:solidFill>
-                  <a:srgbClr val="800000"/>
-                </a:solidFill>
-              </a:rPr>
-              <a:t>4</a:t>
-            </a:r>
-            <a:r>
-              <a:rPr lang="de-DE" sz="700" i="1" dirty="0" smtClean="0">
-                <a:solidFill>
-                  <a:srgbClr val="800000"/>
-                </a:solidFill>
-              </a:rPr>
-              <a:t>00km</a:t>
-            </a:r>
-            <a:endParaRPr lang="de-DE" sz="700" i="1" dirty="0">
-              <a:solidFill>
-                <a:srgbClr val="800000"/>
-              </a:solidFill>
-            </a:endParaRPr>
-          </a:p>
-        </p:txBody>
-      </p:sp>
-      <p:sp>
-        <p:nvSpPr>
-          <p:cNvPr id="15" name="TextBox 10"/>
-          <p:cNvSpPr txBox="1"/>
-          <p:nvPr/>
-        </p:nvSpPr>
-        <p:spPr>
-          <a:xfrm>
-            <a:off x="9104292" y="4061790"/>
-            <a:ext cx="801841" cy="307777"/>
-          </a:xfrm>
-          <a:prstGeom prst="rect">
-            <a:avLst/>
-          </a:prstGeom>
-          <a:noFill/>
-        </p:spPr>
-        <p:txBody>
-          <a:bodyPr wrap="square" rtlCol="0">
-            <a:spAutoFit/>
-          </a:bodyPr>
-          <a:lstStyle/>
-          <a:p>
-            <a:r>
-              <a:rPr lang="de-DE" sz="700" i="1" dirty="0" smtClean="0">
-                <a:solidFill>
-                  <a:srgbClr val="800000"/>
-                </a:solidFill>
-              </a:rPr>
-              <a:t>Langstrecken für immer gratis!</a:t>
-            </a:r>
-            <a:endParaRPr lang="de-DE" sz="700" i="1" dirty="0">
               <a:solidFill>
                 <a:srgbClr val="800000"/>
               </a:solidFill>
@@ -6071,7 +6662,7 @@
         </p:blipFill>
         <p:spPr>
           <a:xfrm>
-            <a:off x="8022622" y="2886024"/>
+            <a:off x="8022622" y="2977464"/>
             <a:ext cx="578343" cy="502313"/>
           </a:xfrm>
           <a:prstGeom prst="rect">
@@ -6102,7 +6693,7 @@
         </p:blipFill>
         <p:spPr>
           <a:xfrm>
-            <a:off x="8600966" y="2886024"/>
+            <a:off x="8600966" y="2977464"/>
             <a:ext cx="578343" cy="502313"/>
           </a:xfrm>
           <a:prstGeom prst="rect">
@@ -6133,7 +6724,7 @@
         </p:blipFill>
         <p:spPr>
           <a:xfrm>
-            <a:off x="9186738" y="2885045"/>
+            <a:off x="9186738" y="2976485"/>
             <a:ext cx="581898" cy="510618"/>
           </a:xfrm>
           <a:prstGeom prst="rect">
@@ -6164,7 +6755,7 @@
         </p:blipFill>
         <p:spPr>
           <a:xfrm>
-            <a:off x="7443424" y="2885045"/>
+            <a:off x="7443424" y="2976485"/>
             <a:ext cx="579198" cy="503156"/>
           </a:xfrm>
           <a:prstGeom prst="rect">
@@ -6193,7 +6784,7 @@
         </p:blipFill>
         <p:spPr bwMode="auto">
           <a:xfrm>
-            <a:off x="6855656" y="2885931"/>
+            <a:off x="6855656" y="2977371"/>
             <a:ext cx="589622" cy="502406"/>
           </a:xfrm>
           <a:prstGeom prst="rect">
@@ -6213,48 +6804,6 @@
       </p:pic>
       <p:sp>
         <p:nvSpPr>
-          <p:cNvPr id="32" name="TextBox 10"/>
-          <p:cNvSpPr txBox="1"/>
-          <p:nvPr/>
-        </p:nvSpPr>
-        <p:spPr>
-          <a:xfrm>
-            <a:off x="7877175" y="4498072"/>
-            <a:ext cx="1736276" cy="215444"/>
-          </a:xfrm>
-          <a:prstGeom prst="rect">
-            <a:avLst/>
-          </a:prstGeom>
-          <a:solidFill>
-            <a:schemeClr val="bg1"/>
-          </a:solidFill>
-          <a:ln>
-            <a:solidFill>
-              <a:schemeClr val="bg1">
-                <a:lumMod val="85000"/>
-              </a:schemeClr>
-            </a:solidFill>
-          </a:ln>
-        </p:spPr>
-        <p:txBody>
-          <a:bodyPr wrap="square" rtlCol="0">
-            <a:spAutoFit/>
-          </a:bodyPr>
-          <a:lstStyle/>
-          <a:p>
-            <a:r>
-              <a:rPr lang="de-DE" sz="800" i="1" dirty="0" smtClean="0">
-                <a:solidFill>
-                  <a:srgbClr val="800000"/>
-                </a:solidFill>
-              </a:rPr>
-              <a:t>Kofferraumvolumen im Vergleich</a:t>
-            </a:r>
-          </a:p>
-        </p:txBody>
-      </p:sp>
-      <p:sp>
-        <p:nvSpPr>
           <p:cNvPr id="20" name="Rechteck 19"/>
           <p:cNvSpPr/>
           <p:nvPr/>
@@ -6394,6 +6943,270 @@
               <a:t>Handout:</a:t>
             </a:r>
             <a:endParaRPr lang="en-US" sz="700" dirty="0"/>
+          </a:p>
+        </p:txBody>
+      </p:sp>
+      <p:sp>
+        <p:nvSpPr>
+          <p:cNvPr id="24" name="Textfeld 23"/>
+          <p:cNvSpPr txBox="1"/>
+          <p:nvPr/>
+        </p:nvSpPr>
+        <p:spPr>
+          <a:xfrm>
+            <a:off x="6446715" y="25908"/>
+            <a:ext cx="747100" cy="169277"/>
+          </a:xfrm>
+          <a:prstGeom prst="rect">
+            <a:avLst/>
+          </a:prstGeom>
+          <a:solidFill>
+            <a:srgbClr val="000099">
+              <a:alpha val="45098"/>
+            </a:srgbClr>
+          </a:solidFill>
+        </p:spPr>
+        <p:txBody>
+          <a:bodyPr wrap="none" lIns="108000" tIns="0" rIns="108000" bIns="0" rtlCol="0">
+            <a:spAutoFit/>
+          </a:bodyPr>
+          <a:lstStyle/>
+          <a:p>
+            <a:r>
+              <a:rPr lang="de-CH" sz="1100" b="1" i="1" dirty="0" smtClean="0"/>
+              <a:t>Aufladen</a:t>
+            </a:r>
+            <a:endParaRPr lang="en-US" sz="1100" b="1" i="1" dirty="0"/>
+          </a:p>
+        </p:txBody>
+      </p:sp>
+      <p:sp>
+        <p:nvSpPr>
+          <p:cNvPr id="25" name="Textfeld 24"/>
+          <p:cNvSpPr txBox="1"/>
+          <p:nvPr/>
+        </p:nvSpPr>
+        <p:spPr>
+          <a:xfrm>
+            <a:off x="7578539" y="4486641"/>
+            <a:ext cx="888165" cy="169277"/>
+          </a:xfrm>
+          <a:prstGeom prst="rect">
+            <a:avLst/>
+          </a:prstGeom>
+          <a:solidFill>
+            <a:srgbClr val="000099">
+              <a:alpha val="45098"/>
+            </a:srgbClr>
+          </a:solidFill>
+        </p:spPr>
+        <p:txBody>
+          <a:bodyPr wrap="none" lIns="108000" tIns="0" rIns="108000" bIns="0" rtlCol="0">
+            <a:spAutoFit/>
+          </a:bodyPr>
+          <a:lstStyle/>
+          <a:p>
+            <a:r>
+              <a:rPr lang="de-CH" sz="1100" b="1" i="1" dirty="0" smtClean="0"/>
+              <a:t>Kofferraum</a:t>
+            </a:r>
+            <a:endParaRPr lang="en-US" sz="1100" b="1" i="1" dirty="0"/>
+          </a:p>
+        </p:txBody>
+      </p:sp>
+      <p:sp>
+        <p:nvSpPr>
+          <p:cNvPr id="26" name="Textfeld 25"/>
+          <p:cNvSpPr txBox="1"/>
+          <p:nvPr/>
+        </p:nvSpPr>
+        <p:spPr>
+          <a:xfrm>
+            <a:off x="-4891" y="4400098"/>
+            <a:ext cx="971521" cy="169277"/>
+          </a:xfrm>
+          <a:prstGeom prst="rect">
+            <a:avLst/>
+          </a:prstGeom>
+          <a:solidFill>
+            <a:srgbClr val="000099">
+              <a:alpha val="45098"/>
+            </a:srgbClr>
+          </a:solidFill>
+        </p:spPr>
+        <p:txBody>
+          <a:bodyPr wrap="none" lIns="108000" tIns="0" rIns="108000" bIns="0" rtlCol="0">
+            <a:spAutoFit/>
+          </a:bodyPr>
+          <a:lstStyle/>
+          <a:p>
+            <a:r>
+              <a:rPr lang="de-CH" sz="1100" b="1" i="1" dirty="0" smtClean="0"/>
+              <a:t>Konstruktion</a:t>
+            </a:r>
+            <a:endParaRPr lang="en-US" sz="1100" b="1" i="1" dirty="0"/>
+          </a:p>
+        </p:txBody>
+      </p:sp>
+      <p:sp>
+        <p:nvSpPr>
+          <p:cNvPr id="27" name="Textfeld 26"/>
+          <p:cNvSpPr txBox="1"/>
+          <p:nvPr/>
+        </p:nvSpPr>
+        <p:spPr>
+          <a:xfrm>
+            <a:off x="0" y="0"/>
+            <a:ext cx="997169" cy="169277"/>
+          </a:xfrm>
+          <a:prstGeom prst="rect">
+            <a:avLst/>
+          </a:prstGeom>
+          <a:solidFill>
+            <a:srgbClr val="000099">
+              <a:alpha val="45098"/>
+            </a:srgbClr>
+          </a:solidFill>
+        </p:spPr>
+        <p:txBody>
+          <a:bodyPr wrap="none" lIns="108000" tIns="0" rIns="108000" bIns="0" rtlCol="0">
+            <a:spAutoFit/>
+          </a:bodyPr>
+          <a:lstStyle/>
+          <a:p>
+            <a:r>
+              <a:rPr lang="de-CH" sz="1100" b="1" i="1" dirty="0" err="1" smtClean="0"/>
+              <a:t>Supercharger</a:t>
+            </a:r>
+            <a:endParaRPr lang="en-US" sz="1100" b="1" i="1" dirty="0"/>
+          </a:p>
+        </p:txBody>
+      </p:sp>
+      <p:pic>
+        <p:nvPicPr>
+          <p:cNvPr id="2050" name="Picture 2"/>
+          <p:cNvPicPr>
+            <a:picLocks noChangeAspect="1" noChangeArrowheads="1"/>
+          </p:cNvPicPr>
+          <p:nvPr/>
+        </p:nvPicPr>
+        <p:blipFill>
+          <a:blip r:embed="rId17">
+            <a:extLst>
+              <a:ext uri="{28A0092B-C50C-407E-A947-70E740481C1C}">
+                <a14:useLocalDpi xmlns:a14="http://schemas.microsoft.com/office/drawing/2010/main"/>
+              </a:ext>
+            </a:extLst>
+          </a:blip>
+          <a:srcRect/>
+          <a:stretch>
+            <a:fillRect/>
+          </a:stretch>
+        </p:blipFill>
+        <p:spPr bwMode="auto">
+          <a:xfrm>
+            <a:off x="2303836" y="716525"/>
+            <a:ext cx="3994099" cy="1866401"/>
+          </a:xfrm>
+          <a:prstGeom prst="rect">
+            <a:avLst/>
+          </a:prstGeom>
+          <a:noFill/>
+          <a:ln>
+            <a:noFill/>
+          </a:ln>
+          <a:extLst>
+            <a:ext uri="{909E8E84-426E-40DD-AFC4-6F175D3DCCD1}">
+              <a14:hiddenFill xmlns:a14="http://schemas.microsoft.com/office/drawing/2010/main">
+                <a:solidFill>
+                  <a:schemeClr val="accent1"/>
+                </a:solidFill>
+              </a14:hiddenFill>
+            </a:ext>
+            <a:ext uri="{91240B29-F687-4F45-9708-019B960494DF}">
+              <a14:hiddenLine xmlns:a14="http://schemas.microsoft.com/office/drawing/2010/main" w="9525">
+                <a:solidFill>
+                  <a:schemeClr val="tx1"/>
+                </a:solidFill>
+                <a:miter lim="800000"/>
+                <a:headEnd/>
+                <a:tailEnd/>
+              </a14:hiddenLine>
+            </a:ext>
+          </a:extLst>
+        </p:spPr>
+      </p:pic>
+      <p:pic>
+        <p:nvPicPr>
+          <p:cNvPr id="29" name="Picture 3"/>
+          <p:cNvPicPr>
+            <a:picLocks noChangeAspect="1"/>
+          </p:cNvPicPr>
+          <p:nvPr/>
+        </p:nvPicPr>
+        <p:blipFill rotWithShape="1">
+          <a:blip r:embed="rId18" cstate="print">
+            <a:extLst>
+              <a:ext uri="{28A0092B-C50C-407E-A947-70E740481C1C}">
+                <a14:useLocalDpi xmlns:a14="http://schemas.microsoft.com/office/drawing/2010/main"/>
+              </a:ext>
+            </a:extLst>
+          </a:blip>
+          <a:srcRect/>
+          <a:stretch/>
+        </p:blipFill>
+        <p:spPr>
+          <a:xfrm>
+            <a:off x="0" y="4605794"/>
+            <a:ext cx="6384200" cy="1579915"/>
+          </a:xfrm>
+          <a:prstGeom prst="rect">
+            <a:avLst/>
+          </a:prstGeom>
+        </p:spPr>
+      </p:pic>
+      <p:sp>
+        <p:nvSpPr>
+          <p:cNvPr id="2" name="Rechteck 1"/>
+          <p:cNvSpPr/>
+          <p:nvPr/>
+        </p:nvSpPr>
+        <p:spPr>
+          <a:xfrm>
+            <a:off x="5819775" y="4513311"/>
+            <a:ext cx="593000" cy="200205"/>
+          </a:xfrm>
+          <a:prstGeom prst="rect">
+            <a:avLst/>
+          </a:prstGeom>
+          <a:solidFill>
+            <a:schemeClr val="bg1"/>
+          </a:solidFill>
+          <a:ln>
+            <a:noFill/>
+          </a:ln>
+          <a:effectLst/>
+        </p:spPr>
+        <p:style>
+          <a:lnRef idx="1">
+            <a:schemeClr val="accent1"/>
+          </a:lnRef>
+          <a:fillRef idx="3">
+            <a:schemeClr val="accent1"/>
+          </a:fillRef>
+          <a:effectRef idx="2">
+            <a:schemeClr val="accent1"/>
+          </a:effectRef>
+          <a:fontRef idx="minor">
+            <a:schemeClr val="lt1"/>
+          </a:fontRef>
+        </p:style>
+        <p:txBody>
+          <a:bodyPr rtlCol="0" anchor="ctr"/>
+          <a:lstStyle/>
+          <a:p>
+            <a:pPr algn="ctr"/>
+            <a:endParaRPr lang="en-US"/>
           </a:p>
         </p:txBody>
       </p:sp>

</xml_diff>

<commit_message>
base price for tesla adjusted. higher price for ICE with all wheel drive for fair comparison.
</commit_message>
<xml_diff>
--- a/tesla_model_s_handout_chf.pptx
+++ b/tesla_model_s_handout_chf.pptx
@@ -290,7 +290,7 @@
             <a:fld id="{63BB9708-3311-2149-A02D-BFA98F482279}" type="datetimeFigureOut">
               <a:rPr lang="de-DE" smtClean="0"/>
               <a:pPr/>
-              <a:t>15.04.2015</a:t>
+              <a:t>16.04.2015</a:t>
             </a:fld>
             <a:endParaRPr lang="de-DE"/>
           </a:p>
@@ -457,7 +457,7 @@
             <a:fld id="{63BB9708-3311-2149-A02D-BFA98F482279}" type="datetimeFigureOut">
               <a:rPr lang="de-DE" smtClean="0"/>
               <a:pPr/>
-              <a:t>15.04.2015</a:t>
+              <a:t>16.04.2015</a:t>
             </a:fld>
             <a:endParaRPr lang="de-DE"/>
           </a:p>
@@ -634,7 +634,7 @@
             <a:fld id="{63BB9708-3311-2149-A02D-BFA98F482279}" type="datetimeFigureOut">
               <a:rPr lang="de-DE" smtClean="0"/>
               <a:pPr/>
-              <a:t>15.04.2015</a:t>
+              <a:t>16.04.2015</a:t>
             </a:fld>
             <a:endParaRPr lang="de-DE"/>
           </a:p>
@@ -801,7 +801,7 @@
             <a:fld id="{63BB9708-3311-2149-A02D-BFA98F482279}" type="datetimeFigureOut">
               <a:rPr lang="de-DE" smtClean="0"/>
               <a:pPr/>
-              <a:t>15.04.2015</a:t>
+              <a:t>16.04.2015</a:t>
             </a:fld>
             <a:endParaRPr lang="de-DE"/>
           </a:p>
@@ -1044,7 +1044,7 @@
             <a:fld id="{63BB9708-3311-2149-A02D-BFA98F482279}" type="datetimeFigureOut">
               <a:rPr lang="de-DE" smtClean="0"/>
               <a:pPr/>
-              <a:t>15.04.2015</a:t>
+              <a:t>16.04.2015</a:t>
             </a:fld>
             <a:endParaRPr lang="de-DE"/>
           </a:p>
@@ -1329,7 +1329,7 @@
             <a:fld id="{63BB9708-3311-2149-A02D-BFA98F482279}" type="datetimeFigureOut">
               <a:rPr lang="de-DE" smtClean="0"/>
               <a:pPr/>
-              <a:t>15.04.2015</a:t>
+              <a:t>16.04.2015</a:t>
             </a:fld>
             <a:endParaRPr lang="de-DE"/>
           </a:p>
@@ -1748,7 +1748,7 @@
             <a:fld id="{63BB9708-3311-2149-A02D-BFA98F482279}" type="datetimeFigureOut">
               <a:rPr lang="de-DE" smtClean="0"/>
               <a:pPr/>
-              <a:t>15.04.2015</a:t>
+              <a:t>16.04.2015</a:t>
             </a:fld>
             <a:endParaRPr lang="de-DE"/>
           </a:p>
@@ -1863,7 +1863,7 @@
             <a:fld id="{63BB9708-3311-2149-A02D-BFA98F482279}" type="datetimeFigureOut">
               <a:rPr lang="de-DE" smtClean="0"/>
               <a:pPr/>
-              <a:t>15.04.2015</a:t>
+              <a:t>16.04.2015</a:t>
             </a:fld>
             <a:endParaRPr lang="de-DE"/>
           </a:p>
@@ -1955,7 +1955,7 @@
             <a:fld id="{63BB9708-3311-2149-A02D-BFA98F482279}" type="datetimeFigureOut">
               <a:rPr lang="de-DE" smtClean="0"/>
               <a:pPr/>
-              <a:t>15.04.2015</a:t>
+              <a:t>16.04.2015</a:t>
             </a:fld>
             <a:endParaRPr lang="de-DE"/>
           </a:p>
@@ -2229,7 +2229,7 @@
             <a:fld id="{63BB9708-3311-2149-A02D-BFA98F482279}" type="datetimeFigureOut">
               <a:rPr lang="de-DE" smtClean="0"/>
               <a:pPr/>
-              <a:t>15.04.2015</a:t>
+              <a:t>16.04.2015</a:t>
             </a:fld>
             <a:endParaRPr lang="de-DE"/>
           </a:p>
@@ -2479,7 +2479,7 @@
             <a:fld id="{63BB9708-3311-2149-A02D-BFA98F482279}" type="datetimeFigureOut">
               <a:rPr lang="de-DE" smtClean="0"/>
               <a:pPr/>
-              <a:t>15.04.2015</a:t>
+              <a:t>16.04.2015</a:t>
             </a:fld>
             <a:endParaRPr lang="de-DE"/>
           </a:p>
@@ -2689,7 +2689,7 @@
             <a:fld id="{63BB9708-3311-2149-A02D-BFA98F482279}" type="datetimeFigureOut">
               <a:rPr lang="de-DE" smtClean="0"/>
               <a:pPr/>
-              <a:t>15.04.2015</a:t>
+              <a:t>16.04.2015</a:t>
             </a:fld>
             <a:endParaRPr lang="de-DE"/>
           </a:p>
@@ -3973,13 +3973,6 @@
             <a:reflection blurRad="12700" stA="38000" endPos="28000" dist="5000" dir="5400000" sy="-100000" algn="bl" rotWithShape="0"/>
           </a:effectLst>
           <a:extLst>
-            <a:ext uri="{909E8E84-426E-40DD-AFC4-6F175D3DCCD1}">
-              <a14:hiddenFill xmlns:a14="http://schemas.microsoft.com/office/drawing/2010/main">
-                <a:solidFill>
-                  <a:schemeClr val="accent1"/>
-                </a:solidFill>
-              </a14:hiddenFill>
-            </a:ext>
             <a:ext uri="{91240B29-F687-4F45-9708-019B960494DF}">
               <a14:hiddenLine xmlns:a14="http://schemas.microsoft.com/office/drawing/2010/main" w="9525">
                 <a:solidFill>
@@ -4671,60 +4664,6 @@
           </a:p>
         </p:txBody>
       </p:sp>
-      <p:pic>
-        <p:nvPicPr>
-          <p:cNvPr id="1030" name="Picture 6"/>
-          <p:cNvPicPr>
-            <a:picLocks noChangeAspect="1" noChangeArrowheads="1"/>
-          </p:cNvPicPr>
-          <p:nvPr/>
-        </p:nvPicPr>
-        <p:blipFill>
-          <a:blip r:embed="rId13">
-            <a:extLst>
-              <a:ext uri="{28A0092B-C50C-407E-A947-70E740481C1C}">
-                <a14:useLocalDpi xmlns:a14="http://schemas.microsoft.com/office/drawing/2010/main"/>
-              </a:ext>
-            </a:extLst>
-          </a:blip>
-          <a:srcRect/>
-          <a:stretch>
-            <a:fillRect/>
-          </a:stretch>
-        </p:blipFill>
-        <p:spPr bwMode="auto">
-          <a:xfrm>
-            <a:off x="1211740" y="5162550"/>
-            <a:ext cx="3235372" cy="1668800"/>
-          </a:xfrm>
-          <a:prstGeom prst="rect">
-            <a:avLst/>
-          </a:prstGeom>
-          <a:noFill/>
-          <a:ln>
-            <a:noFill/>
-          </a:ln>
-          <a:extLst>
-            <a:ext uri="{909E8E84-426E-40DD-AFC4-6F175D3DCCD1}">
-              <a14:hiddenFill xmlns:a14="http://schemas.microsoft.com/office/drawing/2010/main">
-                <a:solidFill>
-                  <a:schemeClr val="accent1"/>
-                </a:solidFill>
-              </a14:hiddenFill>
-            </a:ext>
-            <a:ext uri="{91240B29-F687-4F45-9708-019B960494DF}">
-              <a14:hiddenLine xmlns:a14="http://schemas.microsoft.com/office/drawing/2010/main" w="9525">
-                <a:solidFill>
-                  <a:schemeClr val="tx1"/>
-                </a:solidFill>
-                <a:miter lim="800000"/>
-                <a:headEnd/>
-                <a:tailEnd/>
-              </a14:hiddenLine>
-            </a:ext>
-          </a:extLst>
-        </p:spPr>
-      </p:pic>
       <p:sp>
         <p:nvSpPr>
           <p:cNvPr id="12" name="Textfeld 11"/>
@@ -4793,6 +4732,60 @@
           </a:p>
         </p:txBody>
       </p:sp>
+      <p:pic>
+        <p:nvPicPr>
+          <p:cNvPr id="1028" name="Picture 4"/>
+          <p:cNvPicPr>
+            <a:picLocks noChangeAspect="1" noChangeArrowheads="1"/>
+          </p:cNvPicPr>
+          <p:nvPr/>
+        </p:nvPicPr>
+        <p:blipFill>
+          <a:blip r:embed="rId13">
+            <a:extLst>
+              <a:ext uri="{28A0092B-C50C-407E-A947-70E740481C1C}">
+                <a14:useLocalDpi xmlns:a14="http://schemas.microsoft.com/office/drawing/2010/main" val="0"/>
+              </a:ext>
+            </a:extLst>
+          </a:blip>
+          <a:srcRect/>
+          <a:stretch>
+            <a:fillRect/>
+          </a:stretch>
+        </p:blipFill>
+        <p:spPr bwMode="auto">
+          <a:xfrm>
+            <a:off x="1228386" y="5157214"/>
+            <a:ext cx="3213211" cy="1619956"/>
+          </a:xfrm>
+          <a:prstGeom prst="rect">
+            <a:avLst/>
+          </a:prstGeom>
+          <a:noFill/>
+          <a:ln>
+            <a:noFill/>
+          </a:ln>
+          <a:extLst>
+            <a:ext uri="{909E8E84-426E-40DD-AFC4-6F175D3DCCD1}">
+              <a14:hiddenFill xmlns:a14="http://schemas.microsoft.com/office/drawing/2010/main">
+                <a:solidFill>
+                  <a:schemeClr val="accent1"/>
+                </a:solidFill>
+              </a14:hiddenFill>
+            </a:ext>
+            <a:ext uri="{91240B29-F687-4F45-9708-019B960494DF}">
+              <a14:hiddenLine xmlns:a14="http://schemas.microsoft.com/office/drawing/2010/main" w="9525">
+                <a:solidFill>
+                  <a:schemeClr val="tx1"/>
+                </a:solidFill>
+                <a:miter lim="800000"/>
+                <a:headEnd/>
+                <a:tailEnd/>
+              </a14:hiddenLine>
+            </a:ext>
+          </a:extLst>
+        </p:spPr>
+      </p:pic>
     </p:spTree>
   </p:cSld>
   <p:clrMapOvr>

</xml_diff>